<commit_message>
add: ppt, lawbench done
</commit_message>
<xml_diff>
--- a/legal_ai/20251107_intro_legal_ai_works.pptx
+++ b/legal_ai/20251107_intro_legal_ai_works.pptx
@@ -6,11 +6,16 @@
   </p:sldMasterIdLst>
   <p:sldIdLst>
     <p:sldId id="257" r:id="rId2"/>
-    <p:sldId id="258" r:id="rId3"/>
-    <p:sldId id="262" r:id="rId4"/>
-    <p:sldId id="259" r:id="rId5"/>
-    <p:sldId id="260" r:id="rId6"/>
-    <p:sldId id="261" r:id="rId7"/>
+    <p:sldId id="263" r:id="rId3"/>
+    <p:sldId id="264" r:id="rId4"/>
+    <p:sldId id="265" r:id="rId5"/>
+    <p:sldId id="258" r:id="rId6"/>
+    <p:sldId id="262" r:id="rId7"/>
+    <p:sldId id="267" r:id="rId8"/>
+    <p:sldId id="266" r:id="rId9"/>
+    <p:sldId id="259" r:id="rId10"/>
+    <p:sldId id="260" r:id="rId11"/>
+    <p:sldId id="261" r:id="rId12"/>
   </p:sldIdLst>
   <p:sldSz cx="12192000" cy="6858000"/>
   <p:notesSz cx="6858000" cy="9144000"/>
@@ -266,7 +271,7 @@
           <a:p>
             <a:fld id="{1900F6BE-B067-BE42-AE82-598173A6B0F9}" type="datetimeFigureOut">
               <a:rPr lang="en-CA" smtClean="0"/>
-              <a:t>2025-11-08</a:t>
+              <a:t>2025-11-10</a:t>
             </a:fld>
             <a:endParaRPr lang="en-CA"/>
           </a:p>
@@ -466,7 +471,7 @@
           <a:p>
             <a:fld id="{1900F6BE-B067-BE42-AE82-598173A6B0F9}" type="datetimeFigureOut">
               <a:rPr lang="en-CA" smtClean="0"/>
-              <a:t>2025-11-08</a:t>
+              <a:t>2025-11-10</a:t>
             </a:fld>
             <a:endParaRPr lang="en-CA"/>
           </a:p>
@@ -676,7 +681,7 @@
           <a:p>
             <a:fld id="{1900F6BE-B067-BE42-AE82-598173A6B0F9}" type="datetimeFigureOut">
               <a:rPr lang="en-CA" smtClean="0"/>
-              <a:t>2025-11-08</a:t>
+              <a:t>2025-11-10</a:t>
             </a:fld>
             <a:endParaRPr lang="en-CA"/>
           </a:p>
@@ -876,7 +881,7 @@
           <a:p>
             <a:fld id="{1900F6BE-B067-BE42-AE82-598173A6B0F9}" type="datetimeFigureOut">
               <a:rPr lang="en-CA" smtClean="0"/>
-              <a:t>2025-11-08</a:t>
+              <a:t>2025-11-10</a:t>
             </a:fld>
             <a:endParaRPr lang="en-CA"/>
           </a:p>
@@ -1152,7 +1157,7 @@
           <a:p>
             <a:fld id="{1900F6BE-B067-BE42-AE82-598173A6B0F9}" type="datetimeFigureOut">
               <a:rPr lang="en-CA" smtClean="0"/>
-              <a:t>2025-11-08</a:t>
+              <a:t>2025-11-10</a:t>
             </a:fld>
             <a:endParaRPr lang="en-CA"/>
           </a:p>
@@ -1420,7 +1425,7 @@
           <a:p>
             <a:fld id="{1900F6BE-B067-BE42-AE82-598173A6B0F9}" type="datetimeFigureOut">
               <a:rPr lang="en-CA" smtClean="0"/>
-              <a:t>2025-11-08</a:t>
+              <a:t>2025-11-10</a:t>
             </a:fld>
             <a:endParaRPr lang="en-CA"/>
           </a:p>
@@ -1835,7 +1840,7 @@
           <a:p>
             <a:fld id="{1900F6BE-B067-BE42-AE82-598173A6B0F9}" type="datetimeFigureOut">
               <a:rPr lang="en-CA" smtClean="0"/>
-              <a:t>2025-11-08</a:t>
+              <a:t>2025-11-10</a:t>
             </a:fld>
             <a:endParaRPr lang="en-CA"/>
           </a:p>
@@ -1977,7 +1982,7 @@
           <a:p>
             <a:fld id="{1900F6BE-B067-BE42-AE82-598173A6B0F9}" type="datetimeFigureOut">
               <a:rPr lang="en-CA" smtClean="0"/>
-              <a:t>2025-11-08</a:t>
+              <a:t>2025-11-10</a:t>
             </a:fld>
             <a:endParaRPr lang="en-CA"/>
           </a:p>
@@ -2090,7 +2095,7 @@
           <a:p>
             <a:fld id="{1900F6BE-B067-BE42-AE82-598173A6B0F9}" type="datetimeFigureOut">
               <a:rPr lang="en-CA" smtClean="0"/>
-              <a:t>2025-11-08</a:t>
+              <a:t>2025-11-10</a:t>
             </a:fld>
             <a:endParaRPr lang="en-CA"/>
           </a:p>
@@ -2403,7 +2408,7 @@
           <a:p>
             <a:fld id="{1900F6BE-B067-BE42-AE82-598173A6B0F9}" type="datetimeFigureOut">
               <a:rPr lang="en-CA" smtClean="0"/>
-              <a:t>2025-11-08</a:t>
+              <a:t>2025-11-10</a:t>
             </a:fld>
             <a:endParaRPr lang="en-CA"/>
           </a:p>
@@ -2692,7 +2697,7 @@
           <a:p>
             <a:fld id="{1900F6BE-B067-BE42-AE82-598173A6B0F9}" type="datetimeFigureOut">
               <a:rPr lang="en-CA" smtClean="0"/>
-              <a:t>2025-11-08</a:t>
+              <a:t>2025-11-10</a:t>
             </a:fld>
             <a:endParaRPr lang="en-CA"/>
           </a:p>
@@ -2935,7 +2940,7 @@
           <a:p>
             <a:fld id="{1900F6BE-B067-BE42-AE82-598173A6B0F9}" type="datetimeFigureOut">
               <a:rPr lang="en-CA" smtClean="0"/>
-              <a:t>2025-11-08</a:t>
+              <a:t>2025-11-10</a:t>
             </a:fld>
             <a:endParaRPr lang="en-CA"/>
           </a:p>
@@ -3410,7 +3415,7 @@
           <a:p>
             <a:pPr lvl="1"/>
             <a:r>
-              <a:rPr lang="en-CA" b="1" dirty="0" err="1"/>
+              <a:rPr lang="en-CA" b="1" dirty="0"/>
               <a:t>LawBench</a:t>
             </a:r>
             <a:r>
@@ -3535,6 +3540,395 @@
     <p:extLst>
       <p:ext uri="{BB962C8B-B14F-4D97-AF65-F5344CB8AC3E}">
         <p14:creationId xmlns:p14="http://schemas.microsoft.com/office/powerpoint/2010/main" val="4270281553"/>
+      </p:ext>
+    </p:extLst>
+  </p:cSld>
+  <p:clrMapOvr>
+    <a:masterClrMapping/>
+  </p:clrMapOvr>
+</p:sld>
+</file>
+
+<file path=ppt/slides/slide10.xml><?xml version="1.0" encoding="utf-8"?>
+<p:sld xmlns:a="http://schemas.openxmlformats.org/drawingml/2006/main" xmlns:r="http://schemas.openxmlformats.org/officeDocument/2006/relationships" xmlns:p="http://schemas.openxmlformats.org/presentationml/2006/main">
+  <p:cSld>
+    <p:spTree>
+      <p:nvGrpSpPr>
+        <p:cNvPr id="1" name=""/>
+        <p:cNvGrpSpPr/>
+        <p:nvPr/>
+      </p:nvGrpSpPr>
+      <p:grpSpPr>
+        <a:xfrm>
+          <a:off x="0" y="0"/>
+          <a:ext cx="0" cy="0"/>
+          <a:chOff x="0" y="0"/>
+          <a:chExt cx="0" cy="0"/>
+        </a:xfrm>
+      </p:grpSpPr>
+      <p:sp>
+        <p:nvSpPr>
+          <p:cNvPr id="2" name="标题 1">
+            <a:extLst>
+              <a:ext uri="{FF2B5EF4-FFF2-40B4-BE49-F238E27FC236}">
+                <a16:creationId xmlns:a16="http://schemas.microsoft.com/office/drawing/2014/main" id="{08C0DF71-BF6E-27FD-F8FD-6AC4DC0370EA}"/>
+              </a:ext>
+            </a:extLst>
+          </p:cNvPr>
+          <p:cNvSpPr>
+            <a:spLocks noGrp="1"/>
+          </p:cNvSpPr>
+          <p:nvPr>
+            <p:ph type="title"/>
+          </p:nvPr>
+        </p:nvSpPr>
+        <p:spPr/>
+        <p:txBody>
+          <a:bodyPr/>
+          <a:lstStyle/>
+          <a:p>
+            <a:r>
+              <a:rPr lang="en-CA" dirty="0" err="1">
+                <a:latin typeface="Times New Roman" panose="02020603050405020304" pitchFamily="18" charset="0"/>
+                <a:cs typeface="Times New Roman" panose="02020603050405020304" pitchFamily="18" charset="0"/>
+              </a:rPr>
+              <a:t>LawShift</a:t>
+            </a:r>
+            <a:endParaRPr lang="en-CA" dirty="0">
+              <a:latin typeface="Times New Roman" panose="02020603050405020304" pitchFamily="18" charset="0"/>
+              <a:cs typeface="Times New Roman" panose="02020603050405020304" pitchFamily="18" charset="0"/>
+            </a:endParaRPr>
+          </a:p>
+        </p:txBody>
+      </p:sp>
+      <p:sp>
+        <p:nvSpPr>
+          <p:cNvPr id="3" name="内容占位符 2">
+            <a:extLst>
+              <a:ext uri="{FF2B5EF4-FFF2-40B4-BE49-F238E27FC236}">
+                <a16:creationId xmlns:a16="http://schemas.microsoft.com/office/drawing/2014/main" id="{7407CE2C-0E7C-A813-8F02-386C96D3F927}"/>
+              </a:ext>
+            </a:extLst>
+          </p:cNvPr>
+          <p:cNvSpPr>
+            <a:spLocks noGrp="1"/>
+          </p:cNvSpPr>
+          <p:nvPr>
+            <p:ph idx="1"/>
+          </p:nvPr>
+        </p:nvSpPr>
+        <p:spPr/>
+        <p:txBody>
+          <a:bodyPr/>
+          <a:lstStyle/>
+          <a:p>
+            <a:r>
+              <a:rPr lang="en-CA" dirty="0" err="1"/>
+              <a:t>动机</a:t>
+            </a:r>
+            <a:r>
+              <a:rPr lang="zh-CN" altLang="en-US" dirty="0"/>
+              <a:t>：法律会变。</a:t>
+            </a:r>
+            <a:endParaRPr lang="en-US" altLang="zh-CN" dirty="0"/>
+          </a:p>
+          <a:p>
+            <a:r>
+              <a:rPr lang="zh-CN" altLang="en-US" dirty="0"/>
+              <a:t>思路：同一案件事实，在旧法和新法下能不能给出符合当前版本的判决结果。</a:t>
+            </a:r>
+            <a:endParaRPr lang="en-US" altLang="zh-CN" dirty="0"/>
+          </a:p>
+          <a:p>
+            <a:r>
+              <a:rPr lang="zh-CN" altLang="en-US" dirty="0"/>
+              <a:t>设计：</a:t>
+            </a:r>
+            <a:endParaRPr lang="en-US" altLang="zh-CN" dirty="0"/>
+          </a:p>
+          <a:p>
+            <a:pPr lvl="1"/>
+            <a:r>
+              <a:rPr lang="zh-CN" altLang="en-US" dirty="0"/>
+              <a:t>蜕变测试，“模型有没有跟着新法走”。</a:t>
+            </a:r>
+            <a:endParaRPr lang="en-US" altLang="zh-CN" dirty="0"/>
+          </a:p>
+          <a:p>
+            <a:pPr lvl="1"/>
+            <a:r>
+              <a:rPr lang="zh-CN" altLang="en-US" dirty="0"/>
+              <a:t>细粒度功能点，功能点符合实际法条更新情况。</a:t>
+            </a:r>
+            <a:endParaRPr lang="en-US" altLang="zh-CN" dirty="0"/>
+          </a:p>
+          <a:p>
+            <a:pPr lvl="1"/>
+            <a:r>
+              <a:rPr lang="zh-CN" altLang="en-US" dirty="0"/>
+              <a:t>如何解决？</a:t>
+            </a:r>
+            <a:endParaRPr lang="en-CA" dirty="0"/>
+          </a:p>
+        </p:txBody>
+      </p:sp>
+    </p:spTree>
+    <p:extLst>
+      <p:ext uri="{BB962C8B-B14F-4D97-AF65-F5344CB8AC3E}">
+        <p14:creationId xmlns:p14="http://schemas.microsoft.com/office/powerpoint/2010/main" val="849852630"/>
+      </p:ext>
+    </p:extLst>
+  </p:cSld>
+  <p:clrMapOvr>
+    <a:masterClrMapping/>
+  </p:clrMapOvr>
+</p:sld>
+</file>
+
+<file path=ppt/slides/slide11.xml><?xml version="1.0" encoding="utf-8"?>
+<p:sld xmlns:a="http://schemas.openxmlformats.org/drawingml/2006/main" xmlns:r="http://schemas.openxmlformats.org/officeDocument/2006/relationships" xmlns:p="http://schemas.openxmlformats.org/presentationml/2006/main">
+  <p:cSld>
+    <p:spTree>
+      <p:nvGrpSpPr>
+        <p:cNvPr id="1" name=""/>
+        <p:cNvGrpSpPr/>
+        <p:nvPr/>
+      </p:nvGrpSpPr>
+      <p:grpSpPr>
+        <a:xfrm>
+          <a:off x="0" y="0"/>
+          <a:ext cx="0" cy="0"/>
+          <a:chOff x="0" y="0"/>
+          <a:chExt cx="0" cy="0"/>
+        </a:xfrm>
+      </p:grpSpPr>
+      <p:sp>
+        <p:nvSpPr>
+          <p:cNvPr id="2" name="标题 1">
+            <a:extLst>
+              <a:ext uri="{FF2B5EF4-FFF2-40B4-BE49-F238E27FC236}">
+                <a16:creationId xmlns:a16="http://schemas.microsoft.com/office/drawing/2014/main" id="{16C24E9E-08B6-B96B-3385-508B3B0F0ABF}"/>
+              </a:ext>
+            </a:extLst>
+          </p:cNvPr>
+          <p:cNvSpPr>
+            <a:spLocks noGrp="1"/>
+          </p:cNvSpPr>
+          <p:nvPr>
+            <p:ph type="title"/>
+          </p:nvPr>
+        </p:nvSpPr>
+        <p:spPr/>
+        <p:txBody>
+          <a:bodyPr/>
+          <a:lstStyle/>
+          <a:p>
+            <a:r>
+              <a:rPr lang="en-CA" dirty="0">
+                <a:latin typeface="Times New Roman" panose="02020603050405020304" pitchFamily="18" charset="0"/>
+                <a:cs typeface="Times New Roman" panose="02020603050405020304" pitchFamily="18" charset="0"/>
+              </a:rPr>
+              <a:t>Next?</a:t>
+            </a:r>
+            <a:r>
+              <a:rPr lang="zh-CN" altLang="en-US" dirty="0">
+                <a:latin typeface="Times New Roman" panose="02020603050405020304" pitchFamily="18" charset="0"/>
+                <a:cs typeface="Times New Roman" panose="02020603050405020304" pitchFamily="18" charset="0"/>
+              </a:rPr>
+              <a:t> </a:t>
+            </a:r>
+            <a:r>
+              <a:rPr lang="en-US" altLang="zh-CN" dirty="0">
+                <a:latin typeface="Times New Roman" panose="02020603050405020304" pitchFamily="18" charset="0"/>
+                <a:cs typeface="Times New Roman" panose="02020603050405020304" pitchFamily="18" charset="0"/>
+              </a:rPr>
+              <a:t>Raw!</a:t>
+            </a:r>
+            <a:endParaRPr lang="en-CA" dirty="0">
+              <a:latin typeface="Times New Roman" panose="02020603050405020304" pitchFamily="18" charset="0"/>
+              <a:cs typeface="Times New Roman" panose="02020603050405020304" pitchFamily="18" charset="0"/>
+            </a:endParaRPr>
+          </a:p>
+        </p:txBody>
+      </p:sp>
+      <p:sp>
+        <p:nvSpPr>
+          <p:cNvPr id="3" name="内容占位符 2">
+            <a:extLst>
+              <a:ext uri="{FF2B5EF4-FFF2-40B4-BE49-F238E27FC236}">
+                <a16:creationId xmlns:a16="http://schemas.microsoft.com/office/drawing/2014/main" id="{88D38D43-E894-0BC1-922D-B0A31B6C701D}"/>
+              </a:ext>
+            </a:extLst>
+          </p:cNvPr>
+          <p:cNvSpPr>
+            <a:spLocks noGrp="1"/>
+          </p:cNvSpPr>
+          <p:nvPr>
+            <p:ph idx="1"/>
+          </p:nvPr>
+        </p:nvSpPr>
+        <p:spPr/>
+        <p:txBody>
+          <a:bodyPr/>
+          <a:lstStyle/>
+          <a:p>
+            <a:r>
+              <a:rPr lang="en-CA" dirty="0" err="1">
+                <a:latin typeface="Times New Roman" panose="02020603050405020304" pitchFamily="18" charset="0"/>
+                <a:cs typeface="Times New Roman" panose="02020603050405020304" pitchFamily="18" charset="0"/>
+              </a:rPr>
+              <a:t>从LawShift来</a:t>
+            </a:r>
+            <a:r>
+              <a:rPr lang="zh-CN" altLang="en-US" dirty="0">
+                <a:latin typeface="Times New Roman" panose="02020603050405020304" pitchFamily="18" charset="0"/>
+                <a:cs typeface="Times New Roman" panose="02020603050405020304" pitchFamily="18" charset="0"/>
+              </a:rPr>
+              <a:t>：通过知识编辑更新模型（</a:t>
+            </a:r>
+            <a:r>
+              <a:rPr lang="en-US" altLang="zh-CN" dirty="0">
+                <a:latin typeface="Times New Roman" panose="02020603050405020304" pitchFamily="18" charset="0"/>
+                <a:cs typeface="Times New Roman" panose="02020603050405020304" pitchFamily="18" charset="0"/>
+              </a:rPr>
+              <a:t>Beyond</a:t>
+            </a:r>
+            <a:r>
+              <a:rPr lang="zh-CN" altLang="en-US" dirty="0">
+                <a:latin typeface="Times New Roman" panose="02020603050405020304" pitchFamily="18" charset="0"/>
+                <a:cs typeface="Times New Roman" panose="02020603050405020304" pitchFamily="18" charset="0"/>
+              </a:rPr>
+              <a:t>法律领域）。</a:t>
+            </a:r>
+            <a:endParaRPr lang="en-US" altLang="zh-CN" dirty="0">
+              <a:latin typeface="Times New Roman" panose="02020603050405020304" pitchFamily="18" charset="0"/>
+              <a:cs typeface="Times New Roman" panose="02020603050405020304" pitchFamily="18" charset="0"/>
+            </a:endParaRPr>
+          </a:p>
+          <a:p>
+            <a:pPr lvl="1"/>
+            <a:r>
+              <a:rPr lang="zh-CN" altLang="en-US" dirty="0">
+                <a:latin typeface="Times New Roman" panose="02020603050405020304" pitchFamily="18" charset="0"/>
+                <a:cs typeface="Times New Roman" panose="02020603050405020304" pitchFamily="18" charset="0"/>
+              </a:rPr>
+              <a:t>知识定位。</a:t>
+            </a:r>
+            <a:endParaRPr lang="en-US" altLang="zh-CN" dirty="0">
+              <a:latin typeface="Times New Roman" panose="02020603050405020304" pitchFamily="18" charset="0"/>
+              <a:cs typeface="Times New Roman" panose="02020603050405020304" pitchFamily="18" charset="0"/>
+            </a:endParaRPr>
+          </a:p>
+          <a:p>
+            <a:pPr lvl="1"/>
+            <a:r>
+              <a:rPr lang="zh-CN" altLang="en-US" dirty="0">
+                <a:latin typeface="Times New Roman" panose="02020603050405020304" pitchFamily="18" charset="0"/>
+                <a:cs typeface="Times New Roman" panose="02020603050405020304" pitchFamily="18" charset="0"/>
+              </a:rPr>
+              <a:t>编辑本身（有效性</a:t>
+            </a:r>
+            <a:r>
+              <a:rPr lang="en-US" altLang="zh-CN" dirty="0">
+                <a:latin typeface="Times New Roman" panose="02020603050405020304" pitchFamily="18" charset="0"/>
+                <a:cs typeface="Times New Roman" panose="02020603050405020304" pitchFamily="18" charset="0"/>
+              </a:rPr>
+              <a:t>/</a:t>
+            </a:r>
+            <a:r>
+              <a:rPr lang="zh-CN" altLang="en-US" dirty="0">
+                <a:latin typeface="Times New Roman" panose="02020603050405020304" pitchFamily="18" charset="0"/>
+                <a:cs typeface="Times New Roman" panose="02020603050405020304" pitchFamily="18" charset="0"/>
+              </a:rPr>
+              <a:t>局部性</a:t>
+            </a:r>
+            <a:r>
+              <a:rPr lang="en-US" altLang="zh-CN" dirty="0">
+                <a:latin typeface="Times New Roman" panose="02020603050405020304" pitchFamily="18" charset="0"/>
+                <a:cs typeface="Times New Roman" panose="02020603050405020304" pitchFamily="18" charset="0"/>
+              </a:rPr>
+              <a:t>/</a:t>
+            </a:r>
+            <a:r>
+              <a:rPr lang="zh-CN" altLang="en-US" dirty="0">
+                <a:latin typeface="Times New Roman" panose="02020603050405020304" pitchFamily="18" charset="0"/>
+                <a:cs typeface="Times New Roman" panose="02020603050405020304" pitchFamily="18" charset="0"/>
+              </a:rPr>
+              <a:t>可推理</a:t>
+            </a:r>
+            <a:r>
+              <a:rPr lang="en-US" altLang="zh-CN" dirty="0">
+                <a:latin typeface="Times New Roman" panose="02020603050405020304" pitchFamily="18" charset="0"/>
+                <a:cs typeface="Times New Roman" panose="02020603050405020304" pitchFamily="18" charset="0"/>
+              </a:rPr>
+              <a:t>/</a:t>
+            </a:r>
+            <a:r>
+              <a:rPr lang="zh-CN" altLang="en-US" dirty="0">
+                <a:latin typeface="Times New Roman" panose="02020603050405020304" pitchFamily="18" charset="0"/>
+                <a:cs typeface="Times New Roman" panose="02020603050405020304" pitchFamily="18" charset="0"/>
+              </a:rPr>
+              <a:t>可串行）。</a:t>
+            </a:r>
+            <a:endParaRPr lang="en-US" altLang="zh-CN" dirty="0">
+              <a:latin typeface="Times New Roman" panose="02020603050405020304" pitchFamily="18" charset="0"/>
+              <a:cs typeface="Times New Roman" panose="02020603050405020304" pitchFamily="18" charset="0"/>
+            </a:endParaRPr>
+          </a:p>
+          <a:p>
+            <a:r>
+              <a:rPr lang="zh-CN" altLang="en-US" dirty="0">
+                <a:latin typeface="Times New Roman" panose="02020603050405020304" pitchFamily="18" charset="0"/>
+                <a:cs typeface="Times New Roman" panose="02020603050405020304" pitchFamily="18" charset="0"/>
+              </a:rPr>
+              <a:t>在这个框架下：</a:t>
+            </a:r>
+            <a:endParaRPr lang="en-US" altLang="zh-CN" dirty="0">
+              <a:latin typeface="Times New Roman" panose="02020603050405020304" pitchFamily="18" charset="0"/>
+              <a:cs typeface="Times New Roman" panose="02020603050405020304" pitchFamily="18" charset="0"/>
+            </a:endParaRPr>
+          </a:p>
+          <a:p>
+            <a:pPr lvl="1"/>
+            <a:r>
+              <a:rPr lang="zh-CN" altLang="en-US" dirty="0">
+                <a:latin typeface="Times New Roman" panose="02020603050405020304" pitchFamily="18" charset="0"/>
+                <a:cs typeface="Times New Roman" panose="02020603050405020304" pitchFamily="18" charset="0"/>
+              </a:rPr>
+              <a:t>把一次回答拆成循环：按照任务</a:t>
+            </a:r>
+            <a:r>
+              <a:rPr lang="en-US" altLang="zh-CN" dirty="0">
+                <a:latin typeface="Times New Roman" panose="02020603050405020304" pitchFamily="18" charset="0"/>
+                <a:cs typeface="Times New Roman" panose="02020603050405020304" pitchFamily="18" charset="0"/>
+              </a:rPr>
+              <a:t>schema</a:t>
+            </a:r>
+            <a:r>
+              <a:rPr lang="zh-CN" altLang="en-US" dirty="0">
+                <a:latin typeface="Times New Roman" panose="02020603050405020304" pitchFamily="18" charset="0"/>
+                <a:cs typeface="Times New Roman" panose="02020603050405020304" pitchFamily="18" charset="0"/>
+              </a:rPr>
+              <a:t>规划原子步，激活对应知识片段（定位后的），生成一小段，并交验该步是否正确运用知识。</a:t>
+            </a:r>
+            <a:endParaRPr lang="en-US" altLang="zh-CN" dirty="0">
+              <a:latin typeface="Times New Roman" panose="02020603050405020304" pitchFamily="18" charset="0"/>
+              <a:cs typeface="Times New Roman" panose="02020603050405020304" pitchFamily="18" charset="0"/>
+            </a:endParaRPr>
+          </a:p>
+          <a:p>
+            <a:pPr lvl="1"/>
+            <a:endParaRPr lang="en-CA" dirty="0">
+              <a:latin typeface="Times New Roman" panose="02020603050405020304" pitchFamily="18" charset="0"/>
+              <a:cs typeface="Times New Roman" panose="02020603050405020304" pitchFamily="18" charset="0"/>
+            </a:endParaRPr>
+          </a:p>
+        </p:txBody>
+      </p:sp>
+    </p:spTree>
+    <p:extLst>
+      <p:ext uri="{BB962C8B-B14F-4D97-AF65-F5344CB8AC3E}">
+        <p14:creationId xmlns:p14="http://schemas.microsoft.com/office/powerpoint/2010/main" val="513386680"/>
       </p:ext>
     </p:extLst>
   </p:cSld>
@@ -3566,7 +3960,7 @@
           <p:cNvPr id="2" name="标题 1">
             <a:extLst>
               <a:ext uri="{FF2B5EF4-FFF2-40B4-BE49-F238E27FC236}">
-                <a16:creationId xmlns:a16="http://schemas.microsoft.com/office/drawing/2014/main" id="{AC5C80B6-71DD-4962-5ECF-72E88B67B789}"/>
+                <a16:creationId xmlns:a16="http://schemas.microsoft.com/office/drawing/2014/main" id="{CFFB3653-0E98-F0C2-8590-E643E76EB428}"/>
               </a:ext>
             </a:extLst>
           </p:cNvPr>
@@ -3583,13 +3977,13 @@
           <a:lstStyle/>
           <a:p>
             <a:r>
-              <a:rPr lang="en-CA">
+              <a:rPr kumimoji="1" lang="en-US" altLang="zh-CN" dirty="0">
                 <a:latin typeface="Times New Roman" panose="02020603050405020304" pitchFamily="18" charset="0"/>
                 <a:cs typeface="Times New Roman" panose="02020603050405020304" pitchFamily="18" charset="0"/>
               </a:rPr>
               <a:t>LawBench</a:t>
             </a:r>
-            <a:endParaRPr lang="en-CA" dirty="0">
+            <a:endParaRPr kumimoji="1" lang="zh-CN" altLang="en-US" dirty="0">
               <a:latin typeface="Times New Roman" panose="02020603050405020304" pitchFamily="18" charset="0"/>
               <a:cs typeface="Times New Roman" panose="02020603050405020304" pitchFamily="18" charset="0"/>
             </a:endParaRPr>
@@ -3601,7 +3995,7 @@
           <p:cNvPr id="3" name="内容占位符 2">
             <a:extLst>
               <a:ext uri="{FF2B5EF4-FFF2-40B4-BE49-F238E27FC236}">
-                <a16:creationId xmlns:a16="http://schemas.microsoft.com/office/drawing/2014/main" id="{24F877D0-B345-7D58-CE3F-61C233CD2079}"/>
+                <a16:creationId xmlns:a16="http://schemas.microsoft.com/office/drawing/2014/main" id="{F265D0D6-91D0-F5D7-271C-61C8D7E7EB5A}"/>
               </a:ext>
             </a:extLst>
           </p:cNvPr>
@@ -3618,77 +4012,243 @@
           <a:lstStyle/>
           <a:p>
             <a:r>
-              <a:rPr lang="en-CA" altLang="zh-CN" b="1"/>
-              <a:t>中国成文法</a:t>
-            </a:r>
-            <a:r>
-              <a:rPr lang="en-CA" altLang="zh-CN"/>
-              <a:t>场景的</a:t>
-            </a:r>
-            <a:r>
-              <a:rPr lang="en-CA" altLang="zh-CN" b="1"/>
-              <a:t>多任务</a:t>
-            </a:r>
-            <a:r>
-              <a:rPr lang="en-CA" altLang="zh-CN"/>
-              <a:t>法律评测基准.</a:t>
-            </a:r>
-          </a:p>
-          <a:p>
-            <a:r>
-              <a:rPr lang="en-CA"/>
-              <a:t>将法律能力分为三个层次</a:t>
-            </a:r>
-            <a:r>
-              <a:rPr lang="zh-CN" altLang="en-US"/>
-              <a:t>，</a:t>
-            </a:r>
-            <a:r>
-              <a:rPr lang="en-CA"/>
-              <a:t>分别测试法律大模型和通用大模型</a:t>
-            </a:r>
-            <a:r>
-              <a:rPr lang="zh-CN" altLang="en-US"/>
-              <a:t>。</a:t>
-            </a:r>
-            <a:endParaRPr lang="en-CA" dirty="0"/>
-          </a:p>
-        </p:txBody>
-      </p:sp>
-      <p:pic>
-        <p:nvPicPr>
-          <p:cNvPr id="4" name="内容占位符 3">
-            <a:extLst>
-              <a:ext uri="{FF2B5EF4-FFF2-40B4-BE49-F238E27FC236}">
-                <a16:creationId xmlns:a16="http://schemas.microsoft.com/office/drawing/2014/main" id="{2985B513-52C7-784E-65A0-15CEC1CECD65}"/>
-              </a:ext>
-            </a:extLst>
-          </p:cNvPr>
-          <p:cNvPicPr>
-            <a:picLocks noChangeAspect="1"/>
-          </p:cNvPicPr>
-          <p:nvPr/>
-        </p:nvPicPr>
-        <p:blipFill>
-          <a:blip r:embed="rId2"/>
-          <a:stretch>
-            <a:fillRect/>
-          </a:stretch>
-        </p:blipFill>
-        <p:spPr>
-          <a:xfrm>
-            <a:off x="2676957" y="2857073"/>
-            <a:ext cx="6838085" cy="4000927"/>
-          </a:xfrm>
-          <a:prstGeom prst="rect">
-            <a:avLst/>
-          </a:prstGeom>
-        </p:spPr>
-      </p:pic>
+              <a:rPr kumimoji="1" lang="zh-CN" altLang="en-US" dirty="0">
+                <a:latin typeface="Times New Roman" panose="02020603050405020304" pitchFamily="18" charset="0"/>
+                <a:cs typeface="Times New Roman" panose="02020603050405020304" pitchFamily="18" charset="0"/>
+              </a:rPr>
+              <a:t>动机</a:t>
+            </a:r>
+            <a:r>
+              <a:rPr kumimoji="1" lang="en-US" altLang="zh-CN" dirty="0">
+                <a:latin typeface="Times New Roman" panose="02020603050405020304" pitchFamily="18" charset="0"/>
+                <a:cs typeface="Times New Roman" panose="02020603050405020304" pitchFamily="18" charset="0"/>
+                <a:sym typeface="Wingdings" pitchFamily="2" charset="2"/>
+              </a:rPr>
+              <a:t>: </a:t>
+            </a:r>
+          </a:p>
+          <a:p>
+            <a:pPr lvl="1"/>
+            <a:r>
+              <a:rPr kumimoji="1" lang="en-US" altLang="zh-CN" dirty="0">
+                <a:latin typeface="Times New Roman" panose="02020603050405020304" pitchFamily="18" charset="0"/>
+                <a:cs typeface="Times New Roman" panose="02020603050405020304" pitchFamily="18" charset="0"/>
+                <a:sym typeface="Wingdings" pitchFamily="2" charset="2"/>
+              </a:rPr>
+              <a:t>(1) </a:t>
+            </a:r>
+            <a:r>
+              <a:rPr kumimoji="1" lang="zh-CN" altLang="en-US" dirty="0">
+                <a:latin typeface="Times New Roman" panose="02020603050405020304" pitchFamily="18" charset="0"/>
+                <a:cs typeface="Times New Roman" panose="02020603050405020304" pitchFamily="18" charset="0"/>
+              </a:rPr>
+              <a:t>现有的法律基准是</a:t>
+            </a:r>
+            <a:r>
+              <a:rPr kumimoji="1" lang="en-US" altLang="zh-CN" dirty="0">
+                <a:latin typeface="Times New Roman" panose="02020603050405020304" pitchFamily="18" charset="0"/>
+                <a:cs typeface="Times New Roman" panose="02020603050405020304" pitchFamily="18" charset="0"/>
+              </a:rPr>
+              <a:t> </a:t>
+            </a:r>
+            <a:r>
+              <a:rPr kumimoji="1" lang="en-US" altLang="zh-CN" b="1" dirty="0">
+                <a:latin typeface="Times New Roman" panose="02020603050405020304" pitchFamily="18" charset="0"/>
+                <a:cs typeface="Times New Roman" panose="02020603050405020304" pitchFamily="18" charset="0"/>
+              </a:rPr>
+              <a:t>Common Law </a:t>
+            </a:r>
+            <a:r>
+              <a:rPr kumimoji="1" lang="zh-CN" altLang="en-US" dirty="0">
+                <a:latin typeface="Times New Roman" panose="02020603050405020304" pitchFamily="18" charset="0"/>
+                <a:cs typeface="Times New Roman" panose="02020603050405020304" pitchFamily="18" charset="0"/>
+              </a:rPr>
+              <a:t>场景（如</a:t>
+            </a:r>
+            <a:r>
+              <a:rPr kumimoji="1" lang="en-US" altLang="zh-CN" dirty="0" err="1">
+                <a:latin typeface="Times New Roman" panose="02020603050405020304" pitchFamily="18" charset="0"/>
+                <a:cs typeface="Times New Roman" panose="02020603050405020304" pitchFamily="18" charset="0"/>
+              </a:rPr>
+              <a:t>LegalBench</a:t>
+            </a:r>
+            <a:r>
+              <a:rPr kumimoji="1" lang="zh-CN" altLang="en-US" dirty="0">
+                <a:latin typeface="Times New Roman" panose="02020603050405020304" pitchFamily="18" charset="0"/>
+                <a:cs typeface="Times New Roman" panose="02020603050405020304" pitchFamily="18" charset="0"/>
+              </a:rPr>
+              <a:t>），任务和中国法系不同；</a:t>
+            </a:r>
+            <a:r>
+              <a:rPr kumimoji="1" lang="en-US" altLang="zh-CN" dirty="0">
+                <a:latin typeface="Times New Roman" panose="02020603050405020304" pitchFamily="18" charset="0"/>
+                <a:cs typeface="Times New Roman" panose="02020603050405020304" pitchFamily="18" charset="0"/>
+              </a:rPr>
+              <a:t>Common Law </a:t>
+            </a:r>
+            <a:r>
+              <a:rPr kumimoji="1" lang="zh-CN" altLang="en-US" dirty="0">
+                <a:latin typeface="Times New Roman" panose="02020603050405020304" pitchFamily="18" charset="0"/>
+                <a:cs typeface="Times New Roman" panose="02020603050405020304" pitchFamily="18" charset="0"/>
+              </a:rPr>
+              <a:t>强调的是对先例案件（</a:t>
+            </a:r>
+            <a:r>
+              <a:rPr kumimoji="1" lang="en-US" altLang="zh-CN" dirty="0">
+                <a:latin typeface="Times New Roman" panose="02020603050405020304" pitchFamily="18" charset="0"/>
+                <a:cs typeface="Times New Roman" panose="02020603050405020304" pitchFamily="18" charset="0"/>
+              </a:rPr>
+              <a:t>precedents</a:t>
+            </a:r>
+            <a:r>
+              <a:rPr kumimoji="1" lang="zh-CN" altLang="en-US" dirty="0">
+                <a:latin typeface="Times New Roman" panose="02020603050405020304" pitchFamily="18" charset="0"/>
+                <a:cs typeface="Times New Roman" panose="02020603050405020304" pitchFamily="18" charset="0"/>
+              </a:rPr>
+              <a:t>）的分析，而</a:t>
+            </a:r>
+            <a:r>
+              <a:rPr kumimoji="1" lang="en-US" altLang="zh-CN" b="1" dirty="0">
+                <a:latin typeface="Times New Roman" panose="02020603050405020304" pitchFamily="18" charset="0"/>
+                <a:cs typeface="Times New Roman" panose="02020603050405020304" pitchFamily="18" charset="0"/>
+              </a:rPr>
+              <a:t>Civil</a:t>
+            </a:r>
+            <a:r>
+              <a:rPr kumimoji="1" lang="zh-CN" altLang="en-US" b="1" dirty="0">
+                <a:latin typeface="Times New Roman" panose="02020603050405020304" pitchFamily="18" charset="0"/>
+                <a:cs typeface="Times New Roman" panose="02020603050405020304" pitchFamily="18" charset="0"/>
+              </a:rPr>
+              <a:t> </a:t>
+            </a:r>
+            <a:r>
+              <a:rPr kumimoji="1" lang="en-US" altLang="zh-CN" b="1" dirty="0">
+                <a:latin typeface="Times New Roman" panose="02020603050405020304" pitchFamily="18" charset="0"/>
+                <a:cs typeface="Times New Roman" panose="02020603050405020304" pitchFamily="18" charset="0"/>
+              </a:rPr>
+              <a:t>Law</a:t>
+            </a:r>
+            <a:r>
+              <a:rPr kumimoji="1" lang="zh-CN" altLang="en-US" b="1" dirty="0">
+                <a:latin typeface="Times New Roman" panose="02020603050405020304" pitchFamily="18" charset="0"/>
+                <a:cs typeface="Times New Roman" panose="02020603050405020304" pitchFamily="18" charset="0"/>
+              </a:rPr>
+              <a:t> </a:t>
+            </a:r>
+            <a:r>
+              <a:rPr kumimoji="1" lang="zh-CN" altLang="en-US" dirty="0">
+                <a:latin typeface="Times New Roman" panose="02020603050405020304" pitchFamily="18" charset="0"/>
+                <a:cs typeface="Times New Roman" panose="02020603050405020304" pitchFamily="18" charset="0"/>
+              </a:rPr>
+              <a:t>强调的是法条适用。</a:t>
+            </a:r>
+            <a:endParaRPr kumimoji="1" lang="en-US" altLang="zh-CN" dirty="0">
+              <a:latin typeface="Times New Roman" panose="02020603050405020304" pitchFamily="18" charset="0"/>
+              <a:cs typeface="Times New Roman" panose="02020603050405020304" pitchFamily="18" charset="0"/>
+            </a:endParaRPr>
+          </a:p>
+          <a:p>
+            <a:pPr lvl="1"/>
+            <a:r>
+              <a:rPr kumimoji="1" lang="en-US" altLang="zh-CN" dirty="0">
+                <a:latin typeface="Times New Roman" panose="02020603050405020304" pitchFamily="18" charset="0"/>
+                <a:cs typeface="Times New Roman" panose="02020603050405020304" pitchFamily="18" charset="0"/>
+              </a:rPr>
+              <a:t>(2) </a:t>
+            </a:r>
+            <a:r>
+              <a:rPr kumimoji="1" lang="zh-CN" altLang="en-US" dirty="0">
+                <a:latin typeface="Times New Roman" panose="02020603050405020304" pitchFamily="18" charset="0"/>
+                <a:cs typeface="Times New Roman" panose="02020603050405020304" pitchFamily="18" charset="0"/>
+              </a:rPr>
+              <a:t>全面的</a:t>
+            </a:r>
+            <a:r>
+              <a:rPr kumimoji="1" lang="zh-CN" altLang="en-US" b="1" dirty="0">
+                <a:latin typeface="Times New Roman" panose="02020603050405020304" pitchFamily="18" charset="0"/>
+                <a:cs typeface="Times New Roman" panose="02020603050405020304" pitchFamily="18" charset="0"/>
+              </a:rPr>
+              <a:t>中文</a:t>
+            </a:r>
+            <a:r>
+              <a:rPr kumimoji="1" lang="zh-CN" altLang="en-US" dirty="0">
+                <a:latin typeface="Times New Roman" panose="02020603050405020304" pitchFamily="18" charset="0"/>
+                <a:cs typeface="Times New Roman" panose="02020603050405020304" pitchFamily="18" charset="0"/>
+              </a:rPr>
+              <a:t>法律基准还有缺失。</a:t>
+            </a:r>
+            <a:endParaRPr kumimoji="1" lang="en-US" altLang="zh-CN" dirty="0">
+              <a:latin typeface="Times New Roman" panose="02020603050405020304" pitchFamily="18" charset="0"/>
+              <a:cs typeface="Times New Roman" panose="02020603050405020304" pitchFamily="18" charset="0"/>
+            </a:endParaRPr>
+          </a:p>
+          <a:p>
+            <a:r>
+              <a:rPr kumimoji="1" lang="en-US" altLang="zh-CN" dirty="0">
+                <a:latin typeface="Times New Roman" panose="02020603050405020304" pitchFamily="18" charset="0"/>
+                <a:cs typeface="Times New Roman" panose="02020603050405020304" pitchFamily="18" charset="0"/>
+              </a:rPr>
+              <a:t>LawBench: </a:t>
+            </a:r>
+          </a:p>
+          <a:p>
+            <a:pPr lvl="1"/>
+            <a:r>
+              <a:rPr kumimoji="1" lang="en-US" altLang="zh-CN" dirty="0">
+                <a:latin typeface="Times New Roman" panose="02020603050405020304" pitchFamily="18" charset="0"/>
+                <a:cs typeface="Times New Roman" panose="02020603050405020304" pitchFamily="18" charset="0"/>
+              </a:rPr>
+              <a:t>(1)</a:t>
+            </a:r>
+            <a:r>
+              <a:rPr kumimoji="1" lang="zh-CN" altLang="en-US" dirty="0">
+                <a:latin typeface="Times New Roman" panose="02020603050405020304" pitchFamily="18" charset="0"/>
+                <a:cs typeface="Times New Roman" panose="02020603050405020304" pitchFamily="18" charset="0"/>
+              </a:rPr>
+              <a:t> 全面的法律任务（</a:t>
+            </a:r>
+            <a:r>
+              <a:rPr kumimoji="1" lang="en-US" altLang="zh-CN" dirty="0">
+                <a:latin typeface="Times New Roman" panose="02020603050405020304" pitchFamily="18" charset="0"/>
+                <a:cs typeface="Times New Roman" panose="02020603050405020304" pitchFamily="18" charset="0"/>
+              </a:rPr>
+              <a:t>20</a:t>
+            </a:r>
+            <a:r>
+              <a:rPr kumimoji="1" lang="zh-CN" altLang="en-US" dirty="0">
+                <a:latin typeface="Times New Roman" panose="02020603050405020304" pitchFamily="18" charset="0"/>
+                <a:cs typeface="Times New Roman" panose="02020603050405020304" pitchFamily="18" charset="0"/>
+              </a:rPr>
+              <a:t>个），中国大陆法律场景。</a:t>
+            </a:r>
+            <a:endParaRPr kumimoji="1" lang="en-US" altLang="zh-CN" dirty="0">
+              <a:latin typeface="Times New Roman" panose="02020603050405020304" pitchFamily="18" charset="0"/>
+              <a:cs typeface="Times New Roman" panose="02020603050405020304" pitchFamily="18" charset="0"/>
+            </a:endParaRPr>
+          </a:p>
+          <a:p>
+            <a:pPr lvl="1"/>
+            <a:r>
+              <a:rPr kumimoji="1" lang="en-US" altLang="zh-CN" dirty="0">
+                <a:latin typeface="Times New Roman" panose="02020603050405020304" pitchFamily="18" charset="0"/>
+                <a:cs typeface="Times New Roman" panose="02020603050405020304" pitchFamily="18" charset="0"/>
+              </a:rPr>
+              <a:t>(2) </a:t>
+            </a:r>
+            <a:r>
+              <a:rPr kumimoji="1" lang="zh-CN" altLang="en-US" dirty="0">
+                <a:latin typeface="Times New Roman" panose="02020603050405020304" pitchFamily="18" charset="0"/>
+                <a:cs typeface="Times New Roman" panose="02020603050405020304" pitchFamily="18" charset="0"/>
+              </a:rPr>
+              <a:t>中文法律基准。</a:t>
+            </a:r>
+          </a:p>
+        </p:txBody>
+      </p:sp>
     </p:spTree>
     <p:extLst>
       <p:ext uri="{BB962C8B-B14F-4D97-AF65-F5344CB8AC3E}">
-        <p14:creationId xmlns:p14="http://schemas.microsoft.com/office/powerpoint/2010/main" val="1773450875"/>
+        <p14:creationId xmlns:p14="http://schemas.microsoft.com/office/powerpoint/2010/main" val="1362299403"/>
       </p:ext>
     </p:extLst>
   </p:cSld>
@@ -3720,7 +4280,7 @@
           <p:cNvPr id="2" name="标题 1">
             <a:extLst>
               <a:ext uri="{FF2B5EF4-FFF2-40B4-BE49-F238E27FC236}">
-                <a16:creationId xmlns:a16="http://schemas.microsoft.com/office/drawing/2014/main" id="{80DFFBD4-47F6-7C9B-FA89-5F38D1848438}"/>
+                <a16:creationId xmlns:a16="http://schemas.microsoft.com/office/drawing/2014/main" id="{161C7900-51D9-9C27-AA22-A804BCA5C35B}"/>
               </a:ext>
             </a:extLst>
           </p:cNvPr>
@@ -3737,44 +4297,13 @@
           <a:lstStyle/>
           <a:p>
             <a:r>
-              <a:rPr lang="en-CA" dirty="0" err="1">
-                <a:latin typeface="Times New Roman" panose="02020603050405020304" pitchFamily="18" charset="0"/>
-                <a:cs typeface="Times New Roman" panose="02020603050405020304" pitchFamily="18" charset="0"/>
-              </a:rPr>
-              <a:t>LawBench</a:t>
-            </a:r>
-            <a:r>
-              <a:rPr lang="en-CA" dirty="0">
-                <a:latin typeface="Times New Roman" panose="02020603050405020304" pitchFamily="18" charset="0"/>
-                <a:cs typeface="Times New Roman" panose="02020603050405020304" pitchFamily="18" charset="0"/>
-              </a:rPr>
-              <a:t> (cont.)</a:t>
-            </a:r>
-          </a:p>
-        </p:txBody>
-      </p:sp>
-      <p:sp>
-        <p:nvSpPr>
-          <p:cNvPr id="3" name="内容占位符 2">
-            <a:extLst>
-              <a:ext uri="{FF2B5EF4-FFF2-40B4-BE49-F238E27FC236}">
-                <a16:creationId xmlns:a16="http://schemas.microsoft.com/office/drawing/2014/main" id="{161027CB-2FF8-B959-39A6-431A7B90B71C}"/>
-              </a:ext>
-            </a:extLst>
-          </p:cNvPr>
-          <p:cNvSpPr>
-            <a:spLocks noGrp="1"/>
-          </p:cNvSpPr>
-          <p:nvPr>
-            <p:ph idx="1"/>
-          </p:nvPr>
-        </p:nvSpPr>
-        <p:spPr/>
-        <p:txBody>
-          <a:bodyPr/>
-          <a:lstStyle/>
-          <a:p>
-            <a:endParaRPr lang="en-CA">
+              <a:rPr kumimoji="1" lang="en-US" altLang="zh-CN" dirty="0">
+                <a:latin typeface="Times New Roman" panose="02020603050405020304" pitchFamily="18" charset="0"/>
+                <a:cs typeface="Times New Roman" panose="02020603050405020304" pitchFamily="18" charset="0"/>
+              </a:rPr>
+              <a:t>LawBench (cont.)</a:t>
+            </a:r>
+            <a:endParaRPr kumimoji="1" lang="zh-CN" altLang="en-US" dirty="0">
               <a:latin typeface="Times New Roman" panose="02020603050405020304" pitchFamily="18" charset="0"/>
               <a:cs typeface="Times New Roman" panose="02020603050405020304" pitchFamily="18" charset="0"/>
             </a:endParaRPr>
@@ -3783,68 +4312,598 @@
       </p:sp>
       <p:pic>
         <p:nvPicPr>
-          <p:cNvPr id="4" name="图片 3">
-            <a:extLst>
-              <a:ext uri="{FF2B5EF4-FFF2-40B4-BE49-F238E27FC236}">
-                <a16:creationId xmlns:a16="http://schemas.microsoft.com/office/drawing/2014/main" id="{CD3CE21D-F6E6-ECFC-7A00-7DF09980F4B8}"/>
+          <p:cNvPr id="16" name="内容占位符 15" descr="分层金字塔 轮廓">
+            <a:extLst>
+              <a:ext uri="{FF2B5EF4-FFF2-40B4-BE49-F238E27FC236}">
+                <a16:creationId xmlns:a16="http://schemas.microsoft.com/office/drawing/2014/main" id="{3EB9BD0D-B38B-99CE-AC46-A19120890207}"/>
               </a:ext>
             </a:extLst>
           </p:cNvPr>
           <p:cNvPicPr>
-            <a:picLocks noChangeAspect="1"/>
+            <a:picLocks noGrp="1" noChangeAspect="1"/>
           </p:cNvPicPr>
-          <p:nvPr/>
+          <p:nvPr>
+            <p:ph idx="1"/>
+          </p:nvPr>
         </p:nvPicPr>
         <p:blipFill>
-          <a:blip r:embed="rId2"/>
+          <a:blip r:embed="rId2">
+            <a:extLst>
+              <a:ext uri="{96DAC541-7B7A-43D3-8B79-37D633B846F1}">
+                <asvg:svgBlip xmlns:asvg="http://schemas.microsoft.com/office/drawing/2016/SVG/main" r:embed="rId3"/>
+              </a:ext>
+            </a:extLst>
+          </a:blip>
           <a:stretch>
             <a:fillRect/>
           </a:stretch>
         </p:blipFill>
         <p:spPr>
           <a:xfrm>
-            <a:off x="152401" y="1825625"/>
-            <a:ext cx="5767981" cy="4059216"/>
+            <a:off x="8508229" y="1825625"/>
+            <a:ext cx="3386667" cy="3386667"/>
+          </a:xfrm>
+        </p:spPr>
+      </p:pic>
+      <p:grpSp>
+        <p:nvGrpSpPr>
+          <p:cNvPr id="22" name="组合 21">
+            <a:extLst>
+              <a:ext uri="{FF2B5EF4-FFF2-40B4-BE49-F238E27FC236}">
+                <a16:creationId xmlns:a16="http://schemas.microsoft.com/office/drawing/2014/main" id="{4084F2D7-4551-99DC-8145-97F667D32D50}"/>
+              </a:ext>
+            </a:extLst>
+          </p:cNvPr>
+          <p:cNvGrpSpPr/>
+          <p:nvPr/>
+        </p:nvGrpSpPr>
+        <p:grpSpPr>
+          <a:xfrm>
+            <a:off x="9429556" y="3123602"/>
+            <a:ext cx="1544012" cy="1437439"/>
+            <a:chOff x="8888460" y="3488265"/>
+            <a:chExt cx="1544012" cy="1437439"/>
+          </a:xfrm>
+        </p:grpSpPr>
+        <p:sp>
+          <p:nvSpPr>
+            <p:cNvPr id="18" name="文本框 17">
+              <a:extLst>
+                <a:ext uri="{FF2B5EF4-FFF2-40B4-BE49-F238E27FC236}">
+                  <a16:creationId xmlns:a16="http://schemas.microsoft.com/office/drawing/2014/main" id="{4216DEB5-78AA-D5A8-7DF4-F532989343AD}"/>
+                </a:ext>
+              </a:extLst>
+            </p:cNvPr>
+            <p:cNvSpPr txBox="1"/>
+            <p:nvPr/>
+          </p:nvSpPr>
+          <p:spPr>
+            <a:xfrm>
+              <a:off x="9132116" y="3488265"/>
+              <a:ext cx="1056700" cy="369332"/>
+            </a:xfrm>
+            <a:prstGeom prst="rect">
+              <a:avLst/>
+            </a:prstGeom>
+            <a:noFill/>
+          </p:spPr>
+          <p:txBody>
+            <a:bodyPr wrap="none" rtlCol="0">
+              <a:spAutoFit/>
+            </a:bodyPr>
+            <a:lstStyle/>
+            <a:p>
+              <a:r>
+                <a:rPr kumimoji="1" lang="en-US" altLang="zh-CN" dirty="0">
+                  <a:latin typeface="Times New Roman" panose="02020603050405020304" pitchFamily="18" charset="0"/>
+                  <a:cs typeface="Times New Roman" panose="02020603050405020304" pitchFamily="18" charset="0"/>
+                </a:rPr>
+                <a:t>Applying</a:t>
+              </a:r>
+              <a:endParaRPr kumimoji="1" lang="zh-CN" altLang="en-US" dirty="0">
+                <a:latin typeface="Times New Roman" panose="02020603050405020304" pitchFamily="18" charset="0"/>
+                <a:cs typeface="Times New Roman" panose="02020603050405020304" pitchFamily="18" charset="0"/>
+              </a:endParaRPr>
+            </a:p>
+          </p:txBody>
+        </p:sp>
+        <p:sp>
+          <p:nvSpPr>
+            <p:cNvPr id="19" name="文本框 18">
+              <a:extLst>
+                <a:ext uri="{FF2B5EF4-FFF2-40B4-BE49-F238E27FC236}">
+                  <a16:creationId xmlns:a16="http://schemas.microsoft.com/office/drawing/2014/main" id="{3E460388-C710-455C-43EE-FC2354209A7F}"/>
+                </a:ext>
+              </a:extLst>
+            </p:cNvPr>
+            <p:cNvSpPr txBox="1"/>
+            <p:nvPr/>
+          </p:nvSpPr>
+          <p:spPr>
+            <a:xfrm>
+              <a:off x="8888460" y="4079330"/>
+              <a:ext cx="1544012" cy="369332"/>
+            </a:xfrm>
+            <a:prstGeom prst="rect">
+              <a:avLst/>
+            </a:prstGeom>
+            <a:noFill/>
+          </p:spPr>
+          <p:txBody>
+            <a:bodyPr wrap="none" rtlCol="0">
+              <a:spAutoFit/>
+            </a:bodyPr>
+            <a:lstStyle/>
+            <a:p>
+              <a:r>
+                <a:rPr kumimoji="1" lang="en-US" altLang="zh-CN" dirty="0">
+                  <a:latin typeface="Times New Roman" panose="02020603050405020304" pitchFamily="18" charset="0"/>
+                  <a:cs typeface="Times New Roman" panose="02020603050405020304" pitchFamily="18" charset="0"/>
+                </a:rPr>
+                <a:t>Understanding</a:t>
+              </a:r>
+              <a:endParaRPr kumimoji="1" lang="zh-CN" altLang="en-US" dirty="0">
+                <a:latin typeface="Times New Roman" panose="02020603050405020304" pitchFamily="18" charset="0"/>
+                <a:cs typeface="Times New Roman" panose="02020603050405020304" pitchFamily="18" charset="0"/>
+              </a:endParaRPr>
+            </a:p>
+          </p:txBody>
+        </p:sp>
+        <p:sp>
+          <p:nvSpPr>
+            <p:cNvPr id="20" name="文本框 19">
+              <a:extLst>
+                <a:ext uri="{FF2B5EF4-FFF2-40B4-BE49-F238E27FC236}">
+                  <a16:creationId xmlns:a16="http://schemas.microsoft.com/office/drawing/2014/main" id="{6EB9AAF6-9021-9E84-4BA2-BFC608EEA107}"/>
+                </a:ext>
+              </a:extLst>
+            </p:cNvPr>
+            <p:cNvSpPr txBox="1"/>
+            <p:nvPr/>
+          </p:nvSpPr>
+          <p:spPr>
+            <a:xfrm>
+              <a:off x="8914108" y="4556372"/>
+              <a:ext cx="1492716" cy="369332"/>
+            </a:xfrm>
+            <a:prstGeom prst="rect">
+              <a:avLst/>
+            </a:prstGeom>
+            <a:noFill/>
+          </p:spPr>
+          <p:txBody>
+            <a:bodyPr wrap="none" rtlCol="0">
+              <a:spAutoFit/>
+            </a:bodyPr>
+            <a:lstStyle/>
+            <a:p>
+              <a:r>
+                <a:rPr kumimoji="1" lang="en-US" altLang="zh-CN" dirty="0">
+                  <a:latin typeface="Times New Roman" panose="02020603050405020304" pitchFamily="18" charset="0"/>
+                  <a:cs typeface="Times New Roman" panose="02020603050405020304" pitchFamily="18" charset="0"/>
+                </a:rPr>
+                <a:t>Remembering</a:t>
+              </a:r>
+              <a:endParaRPr kumimoji="1" lang="zh-CN" altLang="en-US" dirty="0">
+                <a:latin typeface="Times New Roman" panose="02020603050405020304" pitchFamily="18" charset="0"/>
+                <a:cs typeface="Times New Roman" panose="02020603050405020304" pitchFamily="18" charset="0"/>
+              </a:endParaRPr>
+            </a:p>
+          </p:txBody>
+        </p:sp>
+      </p:grpSp>
+      <p:sp>
+        <p:nvSpPr>
+          <p:cNvPr id="21" name="内容占位符 2">
+            <a:extLst>
+              <a:ext uri="{FF2B5EF4-FFF2-40B4-BE49-F238E27FC236}">
+                <a16:creationId xmlns:a16="http://schemas.microsoft.com/office/drawing/2014/main" id="{7C24EECA-8E2F-3928-26DE-2E041D45CBFE}"/>
+              </a:ext>
+            </a:extLst>
+          </p:cNvPr>
+          <p:cNvSpPr txBox="1">
+            <a:spLocks/>
+          </p:cNvSpPr>
+          <p:nvPr/>
+        </p:nvSpPr>
+        <p:spPr>
+          <a:xfrm>
+            <a:off x="838200" y="1825625"/>
+            <a:ext cx="7272867" cy="4351338"/>
           </a:xfrm>
           <a:prstGeom prst="rect">
             <a:avLst/>
           </a:prstGeom>
         </p:spPr>
-      </p:pic>
-      <p:pic>
-        <p:nvPicPr>
-          <p:cNvPr id="5" name="图片 4">
-            <a:extLst>
-              <a:ext uri="{FF2B5EF4-FFF2-40B4-BE49-F238E27FC236}">
-                <a16:creationId xmlns:a16="http://schemas.microsoft.com/office/drawing/2014/main" id="{44D762AB-0CE8-1833-53C7-ECC2C3F19A0C}"/>
-              </a:ext>
-            </a:extLst>
-          </p:cNvPr>
-          <p:cNvPicPr>
-            <a:picLocks noChangeAspect="1"/>
-          </p:cNvPicPr>
+        <p:txBody>
+          <a:bodyPr vert="horz" lIns="91440" tIns="45720" rIns="91440" bIns="45720" rtlCol="0">
+            <a:normAutofit/>
+          </a:bodyPr>
+          <a:lstStyle>
+            <a:lvl1pPr marL="228600" indent="-228600" algn="l" defTabSz="914400" rtl="0" eaLnBrk="1" latinLnBrk="0" hangingPunct="1">
+              <a:lnSpc>
+                <a:spcPct val="90000"/>
+              </a:lnSpc>
+              <a:spcBef>
+                <a:spcPts val="1000"/>
+              </a:spcBef>
+              <a:buFont typeface="Arial" panose="020B0604020202020204" pitchFamily="34" charset="0"/>
+              <a:buChar char="•"/>
+              <a:defRPr sz="2800" kern="1200">
+                <a:solidFill>
+                  <a:schemeClr val="tx1"/>
+                </a:solidFill>
+                <a:latin typeface="+mn-lt"/>
+                <a:ea typeface="+mn-ea"/>
+                <a:cs typeface="+mn-cs"/>
+              </a:defRPr>
+            </a:lvl1pPr>
+            <a:lvl2pPr marL="685800" indent="-228600" algn="l" defTabSz="914400" rtl="0" eaLnBrk="1" latinLnBrk="0" hangingPunct="1">
+              <a:lnSpc>
+                <a:spcPct val="90000"/>
+              </a:lnSpc>
+              <a:spcBef>
+                <a:spcPts val="500"/>
+              </a:spcBef>
+              <a:buFont typeface="Arial" panose="020B0604020202020204" pitchFamily="34" charset="0"/>
+              <a:buChar char="•"/>
+              <a:defRPr sz="2400" kern="1200">
+                <a:solidFill>
+                  <a:schemeClr val="tx1"/>
+                </a:solidFill>
+                <a:latin typeface="+mn-lt"/>
+                <a:ea typeface="+mn-ea"/>
+                <a:cs typeface="+mn-cs"/>
+              </a:defRPr>
+            </a:lvl2pPr>
+            <a:lvl3pPr marL="1143000" indent="-228600" algn="l" defTabSz="914400" rtl="0" eaLnBrk="1" latinLnBrk="0" hangingPunct="1">
+              <a:lnSpc>
+                <a:spcPct val="90000"/>
+              </a:lnSpc>
+              <a:spcBef>
+                <a:spcPts val="500"/>
+              </a:spcBef>
+              <a:buFont typeface="Arial" panose="020B0604020202020204" pitchFamily="34" charset="0"/>
+              <a:buChar char="•"/>
+              <a:defRPr sz="2000" kern="1200">
+                <a:solidFill>
+                  <a:schemeClr val="tx1"/>
+                </a:solidFill>
+                <a:latin typeface="+mn-lt"/>
+                <a:ea typeface="+mn-ea"/>
+                <a:cs typeface="+mn-cs"/>
+              </a:defRPr>
+            </a:lvl3pPr>
+            <a:lvl4pPr marL="1600200" indent="-228600" algn="l" defTabSz="914400" rtl="0" eaLnBrk="1" latinLnBrk="0" hangingPunct="1">
+              <a:lnSpc>
+                <a:spcPct val="90000"/>
+              </a:lnSpc>
+              <a:spcBef>
+                <a:spcPts val="500"/>
+              </a:spcBef>
+              <a:buFont typeface="Arial" panose="020B0604020202020204" pitchFamily="34" charset="0"/>
+              <a:buChar char="•"/>
+              <a:defRPr sz="1800" kern="1200">
+                <a:solidFill>
+                  <a:schemeClr val="tx1"/>
+                </a:solidFill>
+                <a:latin typeface="+mn-lt"/>
+                <a:ea typeface="+mn-ea"/>
+                <a:cs typeface="+mn-cs"/>
+              </a:defRPr>
+            </a:lvl4pPr>
+            <a:lvl5pPr marL="2057400" indent="-228600" algn="l" defTabSz="914400" rtl="0" eaLnBrk="1" latinLnBrk="0" hangingPunct="1">
+              <a:lnSpc>
+                <a:spcPct val="90000"/>
+              </a:lnSpc>
+              <a:spcBef>
+                <a:spcPts val="500"/>
+              </a:spcBef>
+              <a:buFont typeface="Arial" panose="020B0604020202020204" pitchFamily="34" charset="0"/>
+              <a:buChar char="•"/>
+              <a:defRPr sz="1800" kern="1200">
+                <a:solidFill>
+                  <a:schemeClr val="tx1"/>
+                </a:solidFill>
+                <a:latin typeface="+mn-lt"/>
+                <a:ea typeface="+mn-ea"/>
+                <a:cs typeface="+mn-cs"/>
+              </a:defRPr>
+            </a:lvl5pPr>
+            <a:lvl6pPr marL="2514600" indent="-228600" algn="l" defTabSz="914400" rtl="0" eaLnBrk="1" latinLnBrk="0" hangingPunct="1">
+              <a:lnSpc>
+                <a:spcPct val="90000"/>
+              </a:lnSpc>
+              <a:spcBef>
+                <a:spcPts val="500"/>
+              </a:spcBef>
+              <a:buFont typeface="Arial" panose="020B0604020202020204" pitchFamily="34" charset="0"/>
+              <a:buChar char="•"/>
+              <a:defRPr sz="1800" kern="1200">
+                <a:solidFill>
+                  <a:schemeClr val="tx1"/>
+                </a:solidFill>
+                <a:latin typeface="+mn-lt"/>
+                <a:ea typeface="+mn-ea"/>
+                <a:cs typeface="+mn-cs"/>
+              </a:defRPr>
+            </a:lvl6pPr>
+            <a:lvl7pPr marL="2971800" indent="-228600" algn="l" defTabSz="914400" rtl="0" eaLnBrk="1" latinLnBrk="0" hangingPunct="1">
+              <a:lnSpc>
+                <a:spcPct val="90000"/>
+              </a:lnSpc>
+              <a:spcBef>
+                <a:spcPts val="500"/>
+              </a:spcBef>
+              <a:buFont typeface="Arial" panose="020B0604020202020204" pitchFamily="34" charset="0"/>
+              <a:buChar char="•"/>
+              <a:defRPr sz="1800" kern="1200">
+                <a:solidFill>
+                  <a:schemeClr val="tx1"/>
+                </a:solidFill>
+                <a:latin typeface="+mn-lt"/>
+                <a:ea typeface="+mn-ea"/>
+                <a:cs typeface="+mn-cs"/>
+              </a:defRPr>
+            </a:lvl7pPr>
+            <a:lvl8pPr marL="3429000" indent="-228600" algn="l" defTabSz="914400" rtl="0" eaLnBrk="1" latinLnBrk="0" hangingPunct="1">
+              <a:lnSpc>
+                <a:spcPct val="90000"/>
+              </a:lnSpc>
+              <a:spcBef>
+                <a:spcPts val="500"/>
+              </a:spcBef>
+              <a:buFont typeface="Arial" panose="020B0604020202020204" pitchFamily="34" charset="0"/>
+              <a:buChar char="•"/>
+              <a:defRPr sz="1800" kern="1200">
+                <a:solidFill>
+                  <a:schemeClr val="tx1"/>
+                </a:solidFill>
+                <a:latin typeface="+mn-lt"/>
+                <a:ea typeface="+mn-ea"/>
+                <a:cs typeface="+mn-cs"/>
+              </a:defRPr>
+            </a:lvl8pPr>
+            <a:lvl9pPr marL="3886200" indent="-228600" algn="l" defTabSz="914400" rtl="0" eaLnBrk="1" latinLnBrk="0" hangingPunct="1">
+              <a:lnSpc>
+                <a:spcPct val="90000"/>
+              </a:lnSpc>
+              <a:spcBef>
+                <a:spcPts val="500"/>
+              </a:spcBef>
+              <a:buFont typeface="Arial" panose="020B0604020202020204" pitchFamily="34" charset="0"/>
+              <a:buChar char="•"/>
+              <a:defRPr sz="1800" kern="1200">
+                <a:solidFill>
+                  <a:schemeClr val="tx1"/>
+                </a:solidFill>
+                <a:latin typeface="+mn-lt"/>
+                <a:ea typeface="+mn-ea"/>
+                <a:cs typeface="+mn-cs"/>
+              </a:defRPr>
+            </a:lvl9pPr>
+          </a:lstStyle>
+          <a:p>
+            <a:r>
+              <a:rPr kumimoji="1" lang="zh-CN" altLang="en-US" dirty="0">
+                <a:latin typeface="Times New Roman" panose="02020603050405020304" pitchFamily="18" charset="0"/>
+                <a:cs typeface="Times New Roman" panose="02020603050405020304" pitchFamily="18" charset="0"/>
+              </a:rPr>
+              <a:t>任务：</a:t>
+            </a:r>
+            <a:endParaRPr kumimoji="1" lang="en-US" altLang="zh-CN" dirty="0">
+              <a:latin typeface="Times New Roman" panose="02020603050405020304" pitchFamily="18" charset="0"/>
+              <a:cs typeface="Times New Roman" panose="02020603050405020304" pitchFamily="18" charset="0"/>
+            </a:endParaRPr>
+          </a:p>
+          <a:p>
+            <a:pPr lvl="1"/>
+            <a:r>
+              <a:rPr kumimoji="1" lang="zh-CN" altLang="en-US" dirty="0">
+                <a:latin typeface="Times New Roman" panose="02020603050405020304" pitchFamily="18" charset="0"/>
+                <a:cs typeface="Times New Roman" panose="02020603050405020304" pitchFamily="18" charset="0"/>
+              </a:rPr>
+              <a:t>设计：验证三个水平的认知能力，对应 </a:t>
+            </a:r>
+            <a:r>
+              <a:rPr kumimoji="1" lang="en-US" altLang="zh-CN" dirty="0">
+                <a:latin typeface="Times New Roman" panose="02020603050405020304" pitchFamily="18" charset="0"/>
+                <a:cs typeface="Times New Roman" panose="02020603050405020304" pitchFamily="18" charset="0"/>
+              </a:rPr>
+              <a:t>Bloom</a:t>
+            </a:r>
+            <a:r>
+              <a:rPr kumimoji="1" lang="zh-CN" altLang="en-US" dirty="0">
+                <a:latin typeface="Times New Roman" panose="02020603050405020304" pitchFamily="18" charset="0"/>
+                <a:cs typeface="Times New Roman" panose="02020603050405020304" pitchFamily="18" charset="0"/>
+              </a:rPr>
+              <a:t> 认知结构前三层，做一个分层诊断框架。</a:t>
+            </a:r>
+            <a:endParaRPr kumimoji="1" lang="en-US" altLang="zh-CN" dirty="0">
+              <a:latin typeface="Times New Roman" panose="02020603050405020304" pitchFamily="18" charset="0"/>
+              <a:cs typeface="Times New Roman" panose="02020603050405020304" pitchFamily="18" charset="0"/>
+            </a:endParaRPr>
+          </a:p>
+          <a:p>
+            <a:pPr lvl="1"/>
+            <a:r>
+              <a:rPr kumimoji="1" lang="zh-CN" altLang="en-US" dirty="0">
+                <a:latin typeface="Times New Roman" panose="02020603050405020304" pitchFamily="18" charset="0"/>
+                <a:cs typeface="Times New Roman" panose="02020603050405020304" pitchFamily="18" charset="0"/>
+              </a:rPr>
+              <a:t>每个任务都固定约</a:t>
+            </a:r>
+            <a:r>
+              <a:rPr kumimoji="1" lang="en-US" altLang="zh-CN" dirty="0">
+                <a:latin typeface="Times New Roman" panose="02020603050405020304" pitchFamily="18" charset="0"/>
+                <a:cs typeface="Times New Roman" panose="02020603050405020304" pitchFamily="18" charset="0"/>
+              </a:rPr>
+              <a:t>500</a:t>
+            </a:r>
+            <a:r>
+              <a:rPr kumimoji="1" lang="zh-CN" altLang="en-US" dirty="0">
+                <a:latin typeface="Times New Roman" panose="02020603050405020304" pitchFamily="18" charset="0"/>
+                <a:cs typeface="Times New Roman" panose="02020603050405020304" pitchFamily="18" charset="0"/>
+              </a:rPr>
+              <a:t>条测试样本，方便横向比较。</a:t>
+            </a:r>
+            <a:endParaRPr kumimoji="1" lang="en-US" altLang="zh-CN" dirty="0">
+              <a:latin typeface="Times New Roman" panose="02020603050405020304" pitchFamily="18" charset="0"/>
+              <a:cs typeface="Times New Roman" panose="02020603050405020304" pitchFamily="18" charset="0"/>
+            </a:endParaRPr>
+          </a:p>
+          <a:p>
+            <a:pPr lvl="1"/>
+            <a:r>
+              <a:rPr kumimoji="1" lang="zh-CN" altLang="en-US" dirty="0">
+                <a:latin typeface="Times New Roman" panose="02020603050405020304" pitchFamily="18" charset="0"/>
+                <a:cs typeface="Times New Roman" panose="02020603050405020304" pitchFamily="18" charset="0"/>
+              </a:rPr>
+              <a:t>数据来源：司法考试、司法比赛、司法论坛等，如</a:t>
+            </a:r>
+            <a:r>
+              <a:rPr kumimoji="1" lang="en-US" altLang="zh-CN" dirty="0">
+                <a:latin typeface="Times New Roman" panose="02020603050405020304" pitchFamily="18" charset="0"/>
+                <a:cs typeface="Times New Roman" panose="02020603050405020304" pitchFamily="18" charset="0"/>
+              </a:rPr>
+              <a:t>CAIL</a:t>
+            </a:r>
+            <a:r>
+              <a:rPr kumimoji="1" lang="zh-CN" altLang="en-US" dirty="0">
+                <a:latin typeface="Times New Roman" panose="02020603050405020304" pitchFamily="18" charset="0"/>
+                <a:cs typeface="Times New Roman" panose="02020603050405020304" pitchFamily="18" charset="0"/>
+              </a:rPr>
+              <a:t>，</a:t>
+            </a:r>
+            <a:r>
+              <a:rPr kumimoji="1" lang="en-US" altLang="zh-CN" dirty="0">
+                <a:latin typeface="Times New Roman" panose="02020603050405020304" pitchFamily="18" charset="0"/>
+                <a:cs typeface="Times New Roman" panose="02020603050405020304" pitchFamily="18" charset="0"/>
+              </a:rPr>
+              <a:t>JEC-QA</a:t>
+            </a:r>
+            <a:r>
+              <a:rPr kumimoji="1" lang="zh-CN" altLang="en-US" dirty="0">
+                <a:latin typeface="Times New Roman" panose="02020603050405020304" pitchFamily="18" charset="0"/>
+                <a:cs typeface="Times New Roman" panose="02020603050405020304" pitchFamily="18" charset="0"/>
+              </a:rPr>
+              <a:t>，</a:t>
+            </a:r>
+            <a:r>
+              <a:rPr kumimoji="1" lang="en-US" altLang="zh-CN" dirty="0">
+                <a:latin typeface="Times New Roman" panose="02020603050405020304" pitchFamily="18" charset="0"/>
+                <a:cs typeface="Times New Roman" panose="02020603050405020304" pitchFamily="18" charset="0"/>
+              </a:rPr>
+              <a:t>……</a:t>
+            </a:r>
+          </a:p>
+          <a:p>
+            <a:pPr lvl="1"/>
+            <a:r>
+              <a:rPr kumimoji="1" lang="zh-CN" altLang="en-US" dirty="0">
+                <a:latin typeface="Times New Roman" panose="02020603050405020304" pitchFamily="18" charset="0"/>
+                <a:cs typeface="Times New Roman" panose="02020603050405020304" pitchFamily="18" charset="0"/>
+              </a:rPr>
+              <a:t>任务类型：生成、单标签分类、多标签分类、抽取、回归等。</a:t>
+            </a:r>
+            <a:endParaRPr kumimoji="1" lang="en-US" altLang="zh-CN" dirty="0">
+              <a:latin typeface="Times New Roman" panose="02020603050405020304" pitchFamily="18" charset="0"/>
+              <a:cs typeface="Times New Roman" panose="02020603050405020304" pitchFamily="18" charset="0"/>
+            </a:endParaRPr>
+          </a:p>
+        </p:txBody>
+      </p:sp>
+      <p:sp>
+        <p:nvSpPr>
+          <p:cNvPr id="23" name="文本框 22">
+            <a:extLst>
+              <a:ext uri="{FF2B5EF4-FFF2-40B4-BE49-F238E27FC236}">
+                <a16:creationId xmlns:a16="http://schemas.microsoft.com/office/drawing/2014/main" id="{F694780B-7139-8C89-2634-E443EEA1C746}"/>
+              </a:ext>
+            </a:extLst>
+          </p:cNvPr>
+          <p:cNvSpPr txBox="1"/>
           <p:nvPr/>
-        </p:nvPicPr>
-        <p:blipFill>
-          <a:blip r:embed="rId3"/>
-          <a:stretch>
-            <a:fillRect/>
-          </a:stretch>
-        </p:blipFill>
+        </p:nvSpPr>
         <p:spPr>
           <a:xfrm>
-            <a:off x="6096000" y="1825625"/>
-            <a:ext cx="5767981" cy="4082294"/>
+            <a:off x="9189105" y="4842960"/>
+            <a:ext cx="2024913" cy="369332"/>
           </a:xfrm>
           <a:prstGeom prst="rect">
             <a:avLst/>
           </a:prstGeom>
+          <a:noFill/>
         </p:spPr>
-      </p:pic>
+        <p:txBody>
+          <a:bodyPr wrap="none" rtlCol="0">
+            <a:spAutoFit/>
+          </a:bodyPr>
+          <a:lstStyle/>
+          <a:p>
+            <a:r>
+              <a:rPr kumimoji="1" lang="en-US" altLang="zh-CN" dirty="0">
+                <a:latin typeface="Times New Roman" panose="02020603050405020304" pitchFamily="18" charset="0"/>
+                <a:cs typeface="Times New Roman" panose="02020603050405020304" pitchFamily="18" charset="0"/>
+              </a:rPr>
+              <a:t>Bloom</a:t>
+            </a:r>
+            <a:r>
+              <a:rPr kumimoji="1" lang="zh-CN" altLang="en-US" dirty="0">
+                <a:latin typeface="Times New Roman" panose="02020603050405020304" pitchFamily="18" charset="0"/>
+                <a:cs typeface="Times New Roman" panose="02020603050405020304" pitchFamily="18" charset="0"/>
+              </a:rPr>
+              <a:t> 的认知结构</a:t>
+            </a:r>
+          </a:p>
+        </p:txBody>
+      </p:sp>
+      <p:sp>
+        <p:nvSpPr>
+          <p:cNvPr id="24" name="文本框 23">
+            <a:extLst>
+              <a:ext uri="{FF2B5EF4-FFF2-40B4-BE49-F238E27FC236}">
+                <a16:creationId xmlns:a16="http://schemas.microsoft.com/office/drawing/2014/main" id="{E7F565F9-27BB-304D-3CC6-C01A49A29914}"/>
+              </a:ext>
+            </a:extLst>
+          </p:cNvPr>
+          <p:cNvSpPr txBox="1"/>
+          <p:nvPr/>
+        </p:nvSpPr>
+        <p:spPr>
+          <a:xfrm>
+            <a:off x="9993812" y="2643404"/>
+            <a:ext cx="415498" cy="369332"/>
+          </a:xfrm>
+          <a:prstGeom prst="rect">
+            <a:avLst/>
+          </a:prstGeom>
+          <a:noFill/>
+        </p:spPr>
+        <p:txBody>
+          <a:bodyPr wrap="none" rtlCol="0">
+            <a:spAutoFit/>
+          </a:bodyPr>
+          <a:lstStyle/>
+          <a:p>
+            <a:r>
+              <a:rPr kumimoji="1" lang="en-US" altLang="zh-CN" dirty="0">
+                <a:latin typeface="Times New Roman" panose="02020603050405020304" pitchFamily="18" charset="0"/>
+                <a:cs typeface="Times New Roman" panose="02020603050405020304" pitchFamily="18" charset="0"/>
+              </a:rPr>
+              <a:t>…</a:t>
+            </a:r>
+            <a:endParaRPr kumimoji="1" lang="zh-CN" altLang="en-US" dirty="0">
+              <a:latin typeface="Times New Roman" panose="02020603050405020304" pitchFamily="18" charset="0"/>
+              <a:cs typeface="Times New Roman" panose="02020603050405020304" pitchFamily="18" charset="0"/>
+            </a:endParaRPr>
+          </a:p>
+        </p:txBody>
+      </p:sp>
     </p:spTree>
     <p:extLst>
       <p:ext uri="{BB962C8B-B14F-4D97-AF65-F5344CB8AC3E}">
-        <p14:creationId xmlns:p14="http://schemas.microsoft.com/office/powerpoint/2010/main" val="1064596822"/>
+        <p14:creationId xmlns:p14="http://schemas.microsoft.com/office/powerpoint/2010/main" val="3714727624"/>
       </p:ext>
     </p:extLst>
   </p:cSld>
@@ -3876,7 +4935,7 @@
           <p:cNvPr id="2" name="标题 1">
             <a:extLst>
               <a:ext uri="{FF2B5EF4-FFF2-40B4-BE49-F238E27FC236}">
-                <a16:creationId xmlns:a16="http://schemas.microsoft.com/office/drawing/2014/main" id="{B2B12C30-7D0A-A0FE-36FE-80BAA342A318}"/>
+                <a16:creationId xmlns:a16="http://schemas.microsoft.com/office/drawing/2014/main" id="{42F4EF14-C6CC-ACCC-369B-2DD78C7EEF42}"/>
               </a:ext>
             </a:extLst>
           </p:cNvPr>
@@ -3893,12 +4952,16 @@
           <a:lstStyle/>
           <a:p>
             <a:r>
-              <a:rPr lang="en-CA" dirty="0">
-                <a:latin typeface="Times New Roman" panose="02020603050405020304" pitchFamily="18" charset="0"/>
-                <a:cs typeface="Times New Roman" panose="02020603050405020304" pitchFamily="18" charset="0"/>
-              </a:rPr>
-              <a:t>QR-LJP</a:t>
-            </a:r>
+              <a:rPr kumimoji="1" lang="en-US" altLang="zh-CN" dirty="0">
+                <a:latin typeface="Times New Roman" panose="02020603050405020304" pitchFamily="18" charset="0"/>
+                <a:cs typeface="Times New Roman" panose="02020603050405020304" pitchFamily="18" charset="0"/>
+              </a:rPr>
+              <a:t>LawBench (cont.)</a:t>
+            </a:r>
+            <a:endParaRPr kumimoji="1" lang="zh-CN" altLang="en-US" dirty="0">
+              <a:latin typeface="Times New Roman" panose="02020603050405020304" pitchFamily="18" charset="0"/>
+              <a:cs typeface="Times New Roman" panose="02020603050405020304" pitchFamily="18" charset="0"/>
+            </a:endParaRPr>
           </a:p>
         </p:txBody>
       </p:sp>
@@ -3907,7 +4970,7 @@
           <p:cNvPr id="3" name="内容占位符 2">
             <a:extLst>
               <a:ext uri="{FF2B5EF4-FFF2-40B4-BE49-F238E27FC236}">
-                <a16:creationId xmlns:a16="http://schemas.microsoft.com/office/drawing/2014/main" id="{762723CF-D998-0D59-D6A1-64014D1D3B40}"/>
+                <a16:creationId xmlns:a16="http://schemas.microsoft.com/office/drawing/2014/main" id="{1EC5FD87-4512-5C83-0752-F75EC82B3F67}"/>
               </a:ext>
             </a:extLst>
           </p:cNvPr>
@@ -3924,34 +4987,21 @@
           <a:lstStyle/>
           <a:p>
             <a:r>
-              <a:rPr lang="en-CA" dirty="0" err="1"/>
-              <a:t>中文LJP</a:t>
-            </a:r>
-            <a:r>
-              <a:rPr lang="zh-CN" altLang="en-US" dirty="0"/>
-              <a:t>：罪名预测，法条预测，刑期预测。</a:t>
-            </a:r>
-            <a:endParaRPr lang="en-US" altLang="zh-CN" dirty="0"/>
-          </a:p>
-          <a:p>
-            <a:r>
-              <a:rPr lang="en-US" altLang="zh-CN" dirty="0"/>
-              <a:t>QR-LJP</a:t>
-            </a:r>
-            <a:r>
-              <a:rPr lang="zh-CN" altLang="en-US" dirty="0"/>
-              <a:t>：罪行严重程度的量化。</a:t>
-            </a:r>
-            <a:endParaRPr lang="en-CA" dirty="0"/>
+              <a:rPr kumimoji="1" lang="zh-CN" altLang="en-US" dirty="0">
+                <a:latin typeface="Times New Roman" panose="02020603050405020304" pitchFamily="18" charset="0"/>
+                <a:cs typeface="Times New Roman" panose="02020603050405020304" pitchFamily="18" charset="0"/>
+              </a:rPr>
+              <a:t>任务信息表</a:t>
+            </a:r>
           </a:p>
         </p:txBody>
       </p:sp>
       <p:pic>
         <p:nvPicPr>
-          <p:cNvPr id="5" name="图片 4">
-            <a:extLst>
-              <a:ext uri="{FF2B5EF4-FFF2-40B4-BE49-F238E27FC236}">
-                <a16:creationId xmlns:a16="http://schemas.microsoft.com/office/drawing/2014/main" id="{903CFA53-EE57-98CA-E4B7-57D243D9508A}"/>
+          <p:cNvPr id="4" name="图片 3">
+            <a:extLst>
+              <a:ext uri="{FF2B5EF4-FFF2-40B4-BE49-F238E27FC236}">
+                <a16:creationId xmlns:a16="http://schemas.microsoft.com/office/drawing/2014/main" id="{B81F904C-6DF3-D39B-87D8-72658D75BC40}"/>
               </a:ext>
             </a:extLst>
           </p:cNvPr>
@@ -3968,8 +5018,8 @@
         </p:blipFill>
         <p:spPr>
           <a:xfrm>
-            <a:off x="2209800" y="2895365"/>
-            <a:ext cx="7772400" cy="3597510"/>
+            <a:off x="3395133" y="1825625"/>
+            <a:ext cx="7772400" cy="4186582"/>
           </a:xfrm>
           <a:prstGeom prst="rect">
             <a:avLst/>
@@ -3979,7 +5029,7 @@
     </p:spTree>
     <p:extLst>
       <p:ext uri="{BB962C8B-B14F-4D97-AF65-F5344CB8AC3E}">
-        <p14:creationId xmlns:p14="http://schemas.microsoft.com/office/powerpoint/2010/main" val="3462803669"/>
+        <p14:creationId xmlns:p14="http://schemas.microsoft.com/office/powerpoint/2010/main" val="156593724"/>
       </p:ext>
     </p:extLst>
   </p:cSld>
@@ -4011,7 +5061,7 @@
           <p:cNvPr id="2" name="标题 1">
             <a:extLst>
               <a:ext uri="{FF2B5EF4-FFF2-40B4-BE49-F238E27FC236}">
-                <a16:creationId xmlns:a16="http://schemas.microsoft.com/office/drawing/2014/main" id="{08C0DF71-BF6E-27FD-F8FD-6AC4DC0370EA}"/>
+                <a16:creationId xmlns:a16="http://schemas.microsoft.com/office/drawing/2014/main" id="{AC5C80B6-71DD-4962-5ECF-72E88B67B789}"/>
               </a:ext>
             </a:extLst>
           </p:cNvPr>
@@ -4028,11 +5078,18 @@
           <a:lstStyle/>
           <a:p>
             <a:r>
-              <a:rPr lang="en-CA" dirty="0" err="1">
-                <a:latin typeface="Times New Roman" panose="02020603050405020304" pitchFamily="18" charset="0"/>
-                <a:cs typeface="Times New Roman" panose="02020603050405020304" pitchFamily="18" charset="0"/>
-              </a:rPr>
-              <a:t>LawShift</a:t>
+              <a:rPr lang="en-CA" dirty="0">
+                <a:latin typeface="Times New Roman" panose="02020603050405020304" pitchFamily="18" charset="0"/>
+                <a:cs typeface="Times New Roman" panose="02020603050405020304" pitchFamily="18" charset="0"/>
+              </a:rPr>
+              <a:t>LawBench </a:t>
+            </a:r>
+            <a:r>
+              <a:rPr kumimoji="1" lang="en-US" altLang="zh-CN" dirty="0">
+                <a:latin typeface="Times New Roman" panose="02020603050405020304" pitchFamily="18" charset="0"/>
+                <a:cs typeface="Times New Roman" panose="02020603050405020304" pitchFamily="18" charset="0"/>
+              </a:rPr>
+              <a:t>(cont.)</a:t>
             </a:r>
             <a:endParaRPr lang="en-CA" dirty="0">
               <a:latin typeface="Times New Roman" panose="02020603050405020304" pitchFamily="18" charset="0"/>
@@ -4046,7 +5103,7 @@
           <p:cNvPr id="3" name="内容占位符 2">
             <a:extLst>
               <a:ext uri="{FF2B5EF4-FFF2-40B4-BE49-F238E27FC236}">
-                <a16:creationId xmlns:a16="http://schemas.microsoft.com/office/drawing/2014/main" id="{7407CE2C-0E7C-A813-8F02-386C96D3F927}"/>
+                <a16:creationId xmlns:a16="http://schemas.microsoft.com/office/drawing/2014/main" id="{24F877D0-B345-7D58-CE3F-61C233CD2079}"/>
               </a:ext>
             </a:extLst>
           </p:cNvPr>
@@ -4063,59 +5120,65 @@
           <a:lstStyle/>
           <a:p>
             <a:r>
-              <a:rPr lang="en-CA" dirty="0" err="1"/>
-              <a:t>动机</a:t>
-            </a:r>
-            <a:r>
               <a:rPr lang="zh-CN" altLang="en-US" dirty="0"/>
-              <a:t>：法律会变。</a:t>
+              <a:t>测评设置：</a:t>
+            </a:r>
+            <a:endParaRPr lang="en-CA" altLang="zh-CN" dirty="0"/>
+          </a:p>
+          <a:p>
+            <a:pPr lvl="1"/>
+            <a:r>
+              <a:rPr lang="zh-CN" altLang="en-CA" dirty="0"/>
+              <a:t>统一</a:t>
+            </a:r>
+            <a:r>
+              <a:rPr lang="zh-CN" altLang="en-US" dirty="0"/>
+              <a:t>使用</a:t>
+            </a:r>
+            <a:r>
+              <a:rPr lang="en-US" altLang="zh-CN" dirty="0"/>
+              <a:t>OpenCompass</a:t>
+            </a:r>
+            <a:r>
+              <a:rPr lang="zh-CN" altLang="en-US" dirty="0"/>
+              <a:t>。</a:t>
             </a:r>
             <a:endParaRPr lang="en-US" altLang="zh-CN" dirty="0"/>
           </a:p>
           <a:p>
+            <a:pPr lvl="1"/>
+            <a:r>
+              <a:rPr lang="en-US" altLang="zh-CN" dirty="0"/>
+              <a:t>Zero-shot</a:t>
+            </a:r>
             <a:r>
               <a:rPr lang="zh-CN" altLang="en-US" dirty="0"/>
-              <a:t>思路：同一案件事实，在旧法和新法下能不能给出符合当前版本的判决结果。</a:t>
+              <a:t> 和 </a:t>
+            </a:r>
+            <a:r>
+              <a:rPr lang="en-US" altLang="zh-CN" dirty="0"/>
+              <a:t>One-shot</a:t>
+            </a:r>
+            <a:r>
+              <a:rPr lang="zh-CN" altLang="en-US" dirty="0"/>
+              <a:t>两种提示模式。</a:t>
             </a:r>
             <a:endParaRPr lang="en-US" altLang="zh-CN" dirty="0"/>
           </a:p>
           <a:p>
+            <a:pPr lvl="1"/>
             <a:r>
               <a:rPr lang="zh-CN" altLang="en-US" dirty="0"/>
-              <a:t>设计：</a:t>
+              <a:t>输出要先做答案抽取再按照各任务指标算分。</a:t>
             </a:r>
             <a:endParaRPr lang="en-US" altLang="zh-CN" dirty="0"/>
-          </a:p>
-          <a:p>
-            <a:pPr lvl="1"/>
-            <a:r>
-              <a:rPr lang="zh-CN" altLang="en-US" dirty="0"/>
-              <a:t>蜕变测试，“模型有没有跟着新法走”。</a:t>
-            </a:r>
-            <a:endParaRPr lang="en-US" altLang="zh-CN" dirty="0"/>
-          </a:p>
-          <a:p>
-            <a:pPr lvl="1"/>
-            <a:r>
-              <a:rPr lang="zh-CN" altLang="en-US" dirty="0"/>
-              <a:t>细粒度功能点，功能点符合实际法条更新情况。</a:t>
-            </a:r>
-            <a:endParaRPr lang="en-US" altLang="zh-CN" dirty="0"/>
-          </a:p>
-          <a:p>
-            <a:pPr lvl="1"/>
-            <a:r>
-              <a:rPr lang="zh-CN" altLang="en-US" dirty="0"/>
-              <a:t>如何解决？</a:t>
-            </a:r>
-            <a:endParaRPr lang="en-CA" dirty="0"/>
           </a:p>
         </p:txBody>
       </p:sp>
     </p:spTree>
     <p:extLst>
       <p:ext uri="{BB962C8B-B14F-4D97-AF65-F5344CB8AC3E}">
-        <p14:creationId xmlns:p14="http://schemas.microsoft.com/office/powerpoint/2010/main" val="849852630"/>
+        <p14:creationId xmlns:p14="http://schemas.microsoft.com/office/powerpoint/2010/main" val="1773450875"/>
       </p:ext>
     </p:extLst>
   </p:cSld>
@@ -4147,7 +5210,7 @@
           <p:cNvPr id="2" name="标题 1">
             <a:extLst>
               <a:ext uri="{FF2B5EF4-FFF2-40B4-BE49-F238E27FC236}">
-                <a16:creationId xmlns:a16="http://schemas.microsoft.com/office/drawing/2014/main" id="{16C24E9E-08B6-B96B-3385-508B3B0F0ABF}"/>
+                <a16:creationId xmlns:a16="http://schemas.microsoft.com/office/drawing/2014/main" id="{80DFFBD4-47F6-7C9B-FA89-5F38D1848438}"/>
               </a:ext>
             </a:extLst>
           </p:cNvPr>
@@ -4168,21 +5231,38 @@
                 <a:latin typeface="Times New Roman" panose="02020603050405020304" pitchFamily="18" charset="0"/>
                 <a:cs typeface="Times New Roman" panose="02020603050405020304" pitchFamily="18" charset="0"/>
               </a:rPr>
-              <a:t>Next?</a:t>
-            </a:r>
-            <a:r>
-              <a:rPr lang="zh-CN" altLang="en-US" dirty="0">
-                <a:latin typeface="Times New Roman" panose="02020603050405020304" pitchFamily="18" charset="0"/>
-                <a:cs typeface="Times New Roman" panose="02020603050405020304" pitchFamily="18" charset="0"/>
-              </a:rPr>
-              <a:t> </a:t>
-            </a:r>
-            <a:r>
-              <a:rPr lang="en-US" altLang="zh-CN" dirty="0">
-                <a:latin typeface="Times New Roman" panose="02020603050405020304" pitchFamily="18" charset="0"/>
-                <a:cs typeface="Times New Roman" panose="02020603050405020304" pitchFamily="18" charset="0"/>
-              </a:rPr>
-              <a:t>Raw!</a:t>
+              <a:t>LawBench (cont.)</a:t>
+            </a:r>
+          </a:p>
+        </p:txBody>
+      </p:sp>
+      <p:sp>
+        <p:nvSpPr>
+          <p:cNvPr id="3" name="内容占位符 2">
+            <a:extLst>
+              <a:ext uri="{FF2B5EF4-FFF2-40B4-BE49-F238E27FC236}">
+                <a16:creationId xmlns:a16="http://schemas.microsoft.com/office/drawing/2014/main" id="{161027CB-2FF8-B959-39A6-431A7B90B71C}"/>
+              </a:ext>
+            </a:extLst>
+          </p:cNvPr>
+          <p:cNvSpPr>
+            <a:spLocks noGrp="1"/>
+          </p:cNvSpPr>
+          <p:nvPr>
+            <p:ph idx="1"/>
+          </p:nvPr>
+        </p:nvSpPr>
+        <p:spPr/>
+        <p:txBody>
+          <a:bodyPr/>
+          <a:lstStyle/>
+          <a:p>
+            <a:r>
+              <a:rPr lang="en-CA" dirty="0" err="1">
+                <a:latin typeface="Times New Roman" panose="02020603050405020304" pitchFamily="18" charset="0"/>
+                <a:cs typeface="Times New Roman" panose="02020603050405020304" pitchFamily="18" charset="0"/>
+              </a:rPr>
+              <a:t>测试结果</a:t>
             </a:r>
             <a:endParaRPr lang="en-CA" dirty="0">
               <a:latin typeface="Times New Roman" panose="02020603050405020304" pitchFamily="18" charset="0"/>
@@ -4191,20 +5271,110 @@
           </a:p>
         </p:txBody>
       </p:sp>
-      <p:sp>
-        <p:nvSpPr>
-          <p:cNvPr id="3" name="内容占位符 2">
-            <a:extLst>
-              <a:ext uri="{FF2B5EF4-FFF2-40B4-BE49-F238E27FC236}">
-                <a16:creationId xmlns:a16="http://schemas.microsoft.com/office/drawing/2014/main" id="{88D38D43-E894-0BC1-922D-B0A31B6C701D}"/>
-              </a:ext>
-            </a:extLst>
-          </p:cNvPr>
-          <p:cNvSpPr>
-            <a:spLocks noGrp="1"/>
-          </p:cNvSpPr>
-          <p:nvPr>
-            <p:ph idx="1"/>
+      <p:pic>
+        <p:nvPicPr>
+          <p:cNvPr id="4" name="图片 3">
+            <a:extLst>
+              <a:ext uri="{FF2B5EF4-FFF2-40B4-BE49-F238E27FC236}">
+                <a16:creationId xmlns:a16="http://schemas.microsoft.com/office/drawing/2014/main" id="{CD3CE21D-F6E6-ECFC-7A00-7DF09980F4B8}"/>
+              </a:ext>
+            </a:extLst>
+          </p:cNvPr>
+          <p:cNvPicPr>
+            <a:picLocks noChangeAspect="1"/>
+          </p:cNvPicPr>
+          <p:nvPr/>
+        </p:nvPicPr>
+        <p:blipFill>
+          <a:blip r:embed="rId2"/>
+          <a:stretch>
+            <a:fillRect/>
+          </a:stretch>
+        </p:blipFill>
+        <p:spPr>
+          <a:xfrm>
+            <a:off x="192553" y="2445198"/>
+            <a:ext cx="5767981" cy="4059216"/>
+          </a:xfrm>
+          <a:prstGeom prst="rect">
+            <a:avLst/>
+          </a:prstGeom>
+        </p:spPr>
+      </p:pic>
+      <p:pic>
+        <p:nvPicPr>
+          <p:cNvPr id="5" name="图片 4">
+            <a:extLst>
+              <a:ext uri="{FF2B5EF4-FFF2-40B4-BE49-F238E27FC236}">
+                <a16:creationId xmlns:a16="http://schemas.microsoft.com/office/drawing/2014/main" id="{44D762AB-0CE8-1833-53C7-ECC2C3F19A0C}"/>
+              </a:ext>
+            </a:extLst>
+          </p:cNvPr>
+          <p:cNvPicPr>
+            <a:picLocks noChangeAspect="1"/>
+          </p:cNvPicPr>
+          <p:nvPr/>
+        </p:nvPicPr>
+        <p:blipFill>
+          <a:blip r:embed="rId3"/>
+          <a:stretch>
+            <a:fillRect/>
+          </a:stretch>
+        </p:blipFill>
+        <p:spPr>
+          <a:xfrm>
+            <a:off x="6231467" y="2422120"/>
+            <a:ext cx="5767981" cy="4082294"/>
+          </a:xfrm>
+          <a:prstGeom prst="rect">
+            <a:avLst/>
+          </a:prstGeom>
+        </p:spPr>
+      </p:pic>
+    </p:spTree>
+    <p:extLst>
+      <p:ext uri="{BB962C8B-B14F-4D97-AF65-F5344CB8AC3E}">
+        <p14:creationId xmlns:p14="http://schemas.microsoft.com/office/powerpoint/2010/main" val="1064596822"/>
+      </p:ext>
+    </p:extLst>
+  </p:cSld>
+  <p:clrMapOvr>
+    <a:masterClrMapping/>
+  </p:clrMapOvr>
+</p:sld>
+</file>
+
+<file path=ppt/slides/slide7.xml><?xml version="1.0" encoding="utf-8"?>
+<p:sld xmlns:a="http://schemas.openxmlformats.org/drawingml/2006/main" xmlns:r="http://schemas.openxmlformats.org/officeDocument/2006/relationships" xmlns:p="http://schemas.openxmlformats.org/presentationml/2006/main">
+  <p:cSld>
+    <p:spTree>
+      <p:nvGrpSpPr>
+        <p:cNvPr id="1" name=""/>
+        <p:cNvGrpSpPr/>
+        <p:nvPr/>
+      </p:nvGrpSpPr>
+      <p:grpSpPr>
+        <a:xfrm>
+          <a:off x="0" y="0"/>
+          <a:ext cx="0" cy="0"/>
+          <a:chOff x="0" y="0"/>
+          <a:chExt cx="0" cy="0"/>
+        </a:xfrm>
+      </p:grpSpPr>
+      <p:sp>
+        <p:nvSpPr>
+          <p:cNvPr id="2" name="标题 1">
+            <a:extLst>
+              <a:ext uri="{FF2B5EF4-FFF2-40B4-BE49-F238E27FC236}">
+                <a16:creationId xmlns:a16="http://schemas.microsoft.com/office/drawing/2014/main" id="{68C85F84-51BC-853A-0498-D99268743ACF}"/>
+              </a:ext>
+            </a:extLst>
+          </p:cNvPr>
+          <p:cNvSpPr>
+            <a:spLocks noGrp="1"/>
+          </p:cNvSpPr>
+          <p:nvPr>
+            <p:ph type="title"/>
           </p:nvPr>
         </p:nvSpPr>
         <p:spPr/>
@@ -4213,162 +5383,418 @@
           <a:lstStyle/>
           <a:p>
             <a:r>
-              <a:rPr lang="en-CA" dirty="0" err="1">
-                <a:latin typeface="Times New Roman" panose="02020603050405020304" pitchFamily="18" charset="0"/>
-                <a:cs typeface="Times New Roman" panose="02020603050405020304" pitchFamily="18" charset="0"/>
-              </a:rPr>
-              <a:t>从LawShift来</a:t>
-            </a:r>
-            <a:r>
-              <a:rPr lang="zh-CN" altLang="en-US" dirty="0">
-                <a:latin typeface="Times New Roman" panose="02020603050405020304" pitchFamily="18" charset="0"/>
-                <a:cs typeface="Times New Roman" panose="02020603050405020304" pitchFamily="18" charset="0"/>
-              </a:rPr>
-              <a:t>：通过知识编辑更新模型（</a:t>
-            </a:r>
-            <a:r>
-              <a:rPr lang="en-US" altLang="zh-CN" dirty="0">
-                <a:latin typeface="Times New Roman" panose="02020603050405020304" pitchFamily="18" charset="0"/>
-                <a:cs typeface="Times New Roman" panose="02020603050405020304" pitchFamily="18" charset="0"/>
-              </a:rPr>
-              <a:t>Beyond</a:t>
-            </a:r>
-            <a:r>
-              <a:rPr lang="zh-CN" altLang="en-US" dirty="0">
-                <a:latin typeface="Times New Roman" panose="02020603050405020304" pitchFamily="18" charset="0"/>
-                <a:cs typeface="Times New Roman" panose="02020603050405020304" pitchFamily="18" charset="0"/>
-              </a:rPr>
-              <a:t>法律领域）。</a:t>
-            </a:r>
-            <a:endParaRPr lang="en-US" altLang="zh-CN" dirty="0">
+              <a:rPr kumimoji="1" lang="en-US" altLang="zh-CN" dirty="0">
+                <a:latin typeface="Times New Roman" panose="02020603050405020304" pitchFamily="18" charset="0"/>
+                <a:cs typeface="Times New Roman" panose="02020603050405020304" pitchFamily="18" charset="0"/>
+              </a:rPr>
+              <a:t>LawBench (cont.)</a:t>
+            </a:r>
+            <a:endParaRPr kumimoji="1" lang="zh-CN" altLang="en-US" dirty="0">
               <a:latin typeface="Times New Roman" panose="02020603050405020304" pitchFamily="18" charset="0"/>
               <a:cs typeface="Times New Roman" panose="02020603050405020304" pitchFamily="18" charset="0"/>
             </a:endParaRPr>
           </a:p>
-          <a:p>
-            <a:pPr lvl="1"/>
-            <a:r>
-              <a:rPr lang="zh-CN" altLang="en-US" dirty="0">
-                <a:latin typeface="Times New Roman" panose="02020603050405020304" pitchFamily="18" charset="0"/>
-                <a:cs typeface="Times New Roman" panose="02020603050405020304" pitchFamily="18" charset="0"/>
-              </a:rPr>
-              <a:t>知识定位。</a:t>
-            </a:r>
-            <a:endParaRPr lang="en-US" altLang="zh-CN" dirty="0">
+        </p:txBody>
+      </p:sp>
+      <p:sp>
+        <p:nvSpPr>
+          <p:cNvPr id="3" name="内容占位符 2">
+            <a:extLst>
+              <a:ext uri="{FF2B5EF4-FFF2-40B4-BE49-F238E27FC236}">
+                <a16:creationId xmlns:a16="http://schemas.microsoft.com/office/drawing/2014/main" id="{C2940A57-D872-20A8-EE4E-752F530D77C1}"/>
+              </a:ext>
+            </a:extLst>
+          </p:cNvPr>
+          <p:cNvSpPr>
+            <a:spLocks noGrp="1"/>
+          </p:cNvSpPr>
+          <p:nvPr>
+            <p:ph idx="1"/>
+          </p:nvPr>
+        </p:nvSpPr>
+        <p:spPr/>
+        <p:txBody>
+          <a:bodyPr/>
+          <a:lstStyle/>
+          <a:p>
+            <a:r>
+              <a:rPr kumimoji="1" lang="zh-CN" altLang="en-US" dirty="0">
+                <a:latin typeface="Times New Roman" panose="02020603050405020304" pitchFamily="18" charset="0"/>
+                <a:cs typeface="Times New Roman" panose="02020603050405020304" pitchFamily="18" charset="0"/>
+              </a:rPr>
+              <a:t>模型平均测试结果</a:t>
+            </a:r>
+          </a:p>
+        </p:txBody>
+      </p:sp>
+      <p:pic>
+        <p:nvPicPr>
+          <p:cNvPr id="4" name="图片 3">
+            <a:extLst>
+              <a:ext uri="{FF2B5EF4-FFF2-40B4-BE49-F238E27FC236}">
+                <a16:creationId xmlns:a16="http://schemas.microsoft.com/office/drawing/2014/main" id="{E7119BA7-9939-E2FF-3458-8D6EE47D6A9E}"/>
+              </a:ext>
+            </a:extLst>
+          </p:cNvPr>
+          <p:cNvPicPr>
+            <a:picLocks noChangeAspect="1"/>
+          </p:cNvPicPr>
+          <p:nvPr/>
+        </p:nvPicPr>
+        <p:blipFill>
+          <a:blip r:embed="rId2"/>
+          <a:stretch>
+            <a:fillRect/>
+          </a:stretch>
+        </p:blipFill>
+        <p:spPr>
+          <a:xfrm>
+            <a:off x="1580037" y="2358166"/>
+            <a:ext cx="9031925" cy="3818797"/>
+          </a:xfrm>
+          <a:prstGeom prst="rect">
+            <a:avLst/>
+          </a:prstGeom>
+        </p:spPr>
+      </p:pic>
+    </p:spTree>
+    <p:extLst>
+      <p:ext uri="{BB962C8B-B14F-4D97-AF65-F5344CB8AC3E}">
+        <p14:creationId xmlns:p14="http://schemas.microsoft.com/office/powerpoint/2010/main" val="589303108"/>
+      </p:ext>
+    </p:extLst>
+  </p:cSld>
+  <p:clrMapOvr>
+    <a:masterClrMapping/>
+  </p:clrMapOvr>
+</p:sld>
+</file>
+
+<file path=ppt/slides/slide8.xml><?xml version="1.0" encoding="utf-8"?>
+<p:sld xmlns:a="http://schemas.openxmlformats.org/drawingml/2006/main" xmlns:r="http://schemas.openxmlformats.org/officeDocument/2006/relationships" xmlns:p="http://schemas.openxmlformats.org/presentationml/2006/main">
+  <p:cSld>
+    <p:spTree>
+      <p:nvGrpSpPr>
+        <p:cNvPr id="1" name=""/>
+        <p:cNvGrpSpPr/>
+        <p:nvPr/>
+      </p:nvGrpSpPr>
+      <p:grpSpPr>
+        <a:xfrm>
+          <a:off x="0" y="0"/>
+          <a:ext cx="0" cy="0"/>
+          <a:chOff x="0" y="0"/>
+          <a:chExt cx="0" cy="0"/>
+        </a:xfrm>
+      </p:grpSpPr>
+      <p:sp>
+        <p:nvSpPr>
+          <p:cNvPr id="2" name="标题 1">
+            <a:extLst>
+              <a:ext uri="{FF2B5EF4-FFF2-40B4-BE49-F238E27FC236}">
+                <a16:creationId xmlns:a16="http://schemas.microsoft.com/office/drawing/2014/main" id="{0D07D3C7-124E-D6A5-1A7A-FD1DAE2D1079}"/>
+              </a:ext>
+            </a:extLst>
+          </p:cNvPr>
+          <p:cNvSpPr>
+            <a:spLocks noGrp="1"/>
+          </p:cNvSpPr>
+          <p:nvPr>
+            <p:ph type="title"/>
+          </p:nvPr>
+        </p:nvSpPr>
+        <p:spPr/>
+        <p:txBody>
+          <a:bodyPr/>
+          <a:lstStyle/>
+          <a:p>
+            <a:r>
+              <a:rPr kumimoji="1" lang="zh-CN" altLang="en-US" dirty="0">
+                <a:latin typeface="Times New Roman" panose="02020603050405020304" pitchFamily="18" charset="0"/>
+                <a:cs typeface="Times New Roman" panose="02020603050405020304" pitchFamily="18" charset="0"/>
+              </a:rPr>
+              <a:t> </a:t>
+            </a:r>
+            <a:r>
+              <a:rPr kumimoji="1" lang="en-US" altLang="zh-CN" dirty="0">
+                <a:latin typeface="Times New Roman" panose="02020603050405020304" pitchFamily="18" charset="0"/>
+                <a:cs typeface="Times New Roman" panose="02020603050405020304" pitchFamily="18" charset="0"/>
+              </a:rPr>
+              <a:t>LawBench (cont.)</a:t>
+            </a:r>
+            <a:endParaRPr kumimoji="1" lang="zh-CN" altLang="en-US" dirty="0">
               <a:latin typeface="Times New Roman" panose="02020603050405020304" pitchFamily="18" charset="0"/>
               <a:cs typeface="Times New Roman" panose="02020603050405020304" pitchFamily="18" charset="0"/>
             </a:endParaRPr>
           </a:p>
+        </p:txBody>
+      </p:sp>
+      <p:sp>
+        <p:nvSpPr>
+          <p:cNvPr id="3" name="内容占位符 2">
+            <a:extLst>
+              <a:ext uri="{FF2B5EF4-FFF2-40B4-BE49-F238E27FC236}">
+                <a16:creationId xmlns:a16="http://schemas.microsoft.com/office/drawing/2014/main" id="{4BCB00E0-96B0-E924-090A-379BC7B7ABF1}"/>
+              </a:ext>
+            </a:extLst>
+          </p:cNvPr>
+          <p:cNvSpPr>
+            <a:spLocks noGrp="1"/>
+          </p:cNvSpPr>
+          <p:nvPr>
+            <p:ph idx="1"/>
+          </p:nvPr>
+        </p:nvSpPr>
+        <p:spPr/>
+        <p:txBody>
+          <a:bodyPr/>
+          <a:lstStyle/>
+          <a:p>
+            <a:r>
+              <a:rPr kumimoji="1" lang="zh-CN" altLang="en-US" dirty="0"/>
+              <a:t>核心发现</a:t>
+            </a:r>
+            <a:endParaRPr kumimoji="1" lang="en-US" altLang="zh-CN" dirty="0"/>
+          </a:p>
           <a:p>
             <a:pPr lvl="1"/>
             <a:r>
-              <a:rPr lang="zh-CN" altLang="en-US" dirty="0">
-                <a:latin typeface="Times New Roman" panose="02020603050405020304" pitchFamily="18" charset="0"/>
-                <a:cs typeface="Times New Roman" panose="02020603050405020304" pitchFamily="18" charset="0"/>
-              </a:rPr>
-              <a:t>编辑本身（有效性</a:t>
-            </a:r>
-            <a:r>
-              <a:rPr lang="en-US" altLang="zh-CN" dirty="0">
-                <a:latin typeface="Times New Roman" panose="02020603050405020304" pitchFamily="18" charset="0"/>
-                <a:cs typeface="Times New Roman" panose="02020603050405020304" pitchFamily="18" charset="0"/>
-              </a:rPr>
-              <a:t>/</a:t>
-            </a:r>
-            <a:r>
-              <a:rPr lang="zh-CN" altLang="en-US" dirty="0">
-                <a:latin typeface="Times New Roman" panose="02020603050405020304" pitchFamily="18" charset="0"/>
-                <a:cs typeface="Times New Roman" panose="02020603050405020304" pitchFamily="18" charset="0"/>
-              </a:rPr>
-              <a:t>局部性</a:t>
-            </a:r>
-            <a:r>
-              <a:rPr lang="en-US" altLang="zh-CN" dirty="0">
-                <a:latin typeface="Times New Roman" panose="02020603050405020304" pitchFamily="18" charset="0"/>
-                <a:cs typeface="Times New Roman" panose="02020603050405020304" pitchFamily="18" charset="0"/>
-              </a:rPr>
-              <a:t>/</a:t>
-            </a:r>
-            <a:r>
-              <a:rPr lang="zh-CN" altLang="en-US" dirty="0">
-                <a:latin typeface="Times New Roman" panose="02020603050405020304" pitchFamily="18" charset="0"/>
-                <a:cs typeface="Times New Roman" panose="02020603050405020304" pitchFamily="18" charset="0"/>
-              </a:rPr>
-              <a:t>可推理</a:t>
-            </a:r>
-            <a:r>
-              <a:rPr lang="en-US" altLang="zh-CN" dirty="0">
-                <a:latin typeface="Times New Roman" panose="02020603050405020304" pitchFamily="18" charset="0"/>
-                <a:cs typeface="Times New Roman" panose="02020603050405020304" pitchFamily="18" charset="0"/>
-              </a:rPr>
-              <a:t>/</a:t>
-            </a:r>
-            <a:r>
-              <a:rPr lang="zh-CN" altLang="en-US" dirty="0">
-                <a:latin typeface="Times New Roman" panose="02020603050405020304" pitchFamily="18" charset="0"/>
-                <a:cs typeface="Times New Roman" panose="02020603050405020304" pitchFamily="18" charset="0"/>
-              </a:rPr>
-              <a:t>可串行）。</a:t>
-            </a:r>
-            <a:endParaRPr lang="en-US" altLang="zh-CN" dirty="0">
-              <a:latin typeface="Times New Roman" panose="02020603050405020304" pitchFamily="18" charset="0"/>
-              <a:cs typeface="Times New Roman" panose="02020603050405020304" pitchFamily="18" charset="0"/>
-            </a:endParaRPr>
-          </a:p>
-          <a:p>
-            <a:r>
-              <a:rPr lang="zh-CN" altLang="en-US" dirty="0">
-                <a:latin typeface="Times New Roman" panose="02020603050405020304" pitchFamily="18" charset="0"/>
-                <a:cs typeface="Times New Roman" panose="02020603050405020304" pitchFamily="18" charset="0"/>
-              </a:rPr>
-              <a:t>在这个框架下：</a:t>
-            </a:r>
-            <a:endParaRPr lang="en-US" altLang="zh-CN" dirty="0">
-              <a:latin typeface="Times New Roman" panose="02020603050405020304" pitchFamily="18" charset="0"/>
-              <a:cs typeface="Times New Roman" panose="02020603050405020304" pitchFamily="18" charset="0"/>
-            </a:endParaRPr>
+              <a:rPr kumimoji="1" lang="zh-CN" altLang="en-US" dirty="0"/>
+              <a:t>所有任务上的平均水平：</a:t>
+            </a:r>
+            <a:r>
+              <a:rPr kumimoji="1" lang="en-US" altLang="zh-CN" dirty="0"/>
+              <a:t>Qwen-1.5-72B</a:t>
+            </a:r>
+            <a:r>
+              <a:rPr kumimoji="1" lang="zh-CN" altLang="en-US" dirty="0"/>
+              <a:t> 和 </a:t>
+            </a:r>
+            <a:r>
+              <a:rPr kumimoji="1" lang="en-US" altLang="zh-CN" dirty="0"/>
+              <a:t>GPT-4</a:t>
+            </a:r>
+            <a:r>
+              <a:rPr kumimoji="1" lang="zh-CN" altLang="en-US" dirty="0"/>
+              <a:t> 是天花板选手，但是在不同任务层面互有强弱；一些法律模型只在记忆型任务里特别高。</a:t>
+            </a:r>
+            <a:endParaRPr kumimoji="1" lang="en-US" altLang="zh-CN" dirty="0"/>
           </a:p>
           <a:p>
             <a:pPr lvl="1"/>
             <a:r>
-              <a:rPr lang="zh-CN" altLang="en-US" dirty="0">
-                <a:latin typeface="Times New Roman" panose="02020603050405020304" pitchFamily="18" charset="0"/>
-                <a:cs typeface="Times New Roman" panose="02020603050405020304" pitchFamily="18" charset="0"/>
-              </a:rPr>
-              <a:t>把一次回答拆成循环：按照任务</a:t>
-            </a:r>
-            <a:r>
-              <a:rPr lang="en-US" altLang="zh-CN" dirty="0">
-                <a:latin typeface="Times New Roman" panose="02020603050405020304" pitchFamily="18" charset="0"/>
-                <a:cs typeface="Times New Roman" panose="02020603050405020304" pitchFamily="18" charset="0"/>
-              </a:rPr>
-              <a:t>schema</a:t>
-            </a:r>
-            <a:r>
-              <a:rPr lang="zh-CN" altLang="en-US" dirty="0">
-                <a:latin typeface="Times New Roman" panose="02020603050405020304" pitchFamily="18" charset="0"/>
-                <a:cs typeface="Times New Roman" panose="02020603050405020304" pitchFamily="18" charset="0"/>
-              </a:rPr>
-              <a:t>规划原子步，激活对应知识片段（定位后的），生成一小段，并交验该步是否正确运用知识。</a:t>
-            </a:r>
-            <a:endParaRPr lang="en-US" altLang="zh-CN" dirty="0">
-              <a:latin typeface="Times New Roman" panose="02020603050405020304" pitchFamily="18" charset="0"/>
-              <a:cs typeface="Times New Roman" panose="02020603050405020304" pitchFamily="18" charset="0"/>
-            </a:endParaRPr>
+              <a:rPr kumimoji="1" lang="zh-CN" altLang="en-US" dirty="0"/>
+              <a:t>难度较大的是 </a:t>
+            </a:r>
+            <a:r>
+              <a:rPr kumimoji="1" lang="en-US" altLang="zh-CN" dirty="0"/>
+              <a:t>Understanding</a:t>
+            </a:r>
+            <a:r>
+              <a:rPr kumimoji="1" lang="zh-CN" altLang="en-US" dirty="0"/>
+              <a:t> 和 </a:t>
+            </a:r>
+            <a:r>
+              <a:rPr kumimoji="1" lang="en-US" altLang="zh-CN" dirty="0"/>
+              <a:t>Applying</a:t>
+            </a:r>
+            <a:r>
+              <a:rPr kumimoji="1" lang="zh-CN" altLang="en-US" dirty="0"/>
+              <a:t> 层的任务，特别是需要精确出发词、精确法条匹配、冷门罪名的时候，模型间表现差距会更加参差。</a:t>
+            </a:r>
+            <a:endParaRPr kumimoji="1" lang="en-US" altLang="zh-CN" dirty="0"/>
           </a:p>
           <a:p>
             <a:pPr lvl="1"/>
-            <a:endParaRPr lang="en-CA" dirty="0">
-              <a:latin typeface="Times New Roman" panose="02020603050405020304" pitchFamily="18" charset="0"/>
-              <a:cs typeface="Times New Roman" panose="02020603050405020304" pitchFamily="18" charset="0"/>
-            </a:endParaRPr>
+            <a:r>
+              <a:rPr kumimoji="1" lang="zh-CN" altLang="en-US" dirty="0"/>
+              <a:t>通用大模型指令跟随好所以不容易乱回答，法律模型更容易</a:t>
+            </a:r>
+            <a:r>
+              <a:rPr kumimoji="1" lang="en-US" altLang="zh-CN" dirty="0"/>
+              <a:t> go wild.</a:t>
+            </a:r>
+          </a:p>
+          <a:p>
+            <a:pPr lvl="1"/>
+            <a:r>
+              <a:rPr kumimoji="1" lang="zh-CN" altLang="en-US" dirty="0"/>
+              <a:t>整体评价：所有模型的表现都不足以承担实际的法律咨询强度。</a:t>
+            </a:r>
+            <a:endParaRPr kumimoji="1" lang="en-US" altLang="zh-CN" dirty="0"/>
+          </a:p>
+          <a:p>
+            <a:r>
+              <a:rPr kumimoji="1" lang="zh-CN" altLang="en-US" dirty="0"/>
+              <a:t>局限点：</a:t>
+            </a:r>
+            <a:endParaRPr kumimoji="1" lang="en-US" altLang="zh-CN" dirty="0"/>
+          </a:p>
+          <a:p>
+            <a:pPr lvl="1"/>
+            <a:r>
+              <a:rPr kumimoji="1" lang="zh-CN" altLang="en-US" dirty="0"/>
+              <a:t>用的都是公开数据，可能存在数据被模型见过的风险。</a:t>
+            </a:r>
+            <a:endParaRPr kumimoji="1" lang="en-US" altLang="zh-CN" dirty="0"/>
+          </a:p>
+          <a:p>
+            <a:pPr lvl="1"/>
+            <a:r>
+              <a:rPr kumimoji="1" lang="zh-CN" altLang="en-US" dirty="0"/>
+              <a:t>指标比如生成任务使用的 </a:t>
+            </a:r>
+            <a:r>
+              <a:rPr kumimoji="1" lang="en-US" altLang="zh-CN" dirty="0"/>
+              <a:t>Rogue-L</a:t>
+            </a:r>
+            <a:r>
+              <a:rPr kumimoji="1" lang="zh-CN" altLang="en-US" dirty="0"/>
+              <a:t>，不一定足够评出最好的答案。</a:t>
+            </a:r>
+            <a:endParaRPr kumimoji="1" lang="en-US" altLang="zh-CN" dirty="0"/>
           </a:p>
         </p:txBody>
       </p:sp>
     </p:spTree>
     <p:extLst>
       <p:ext uri="{BB962C8B-B14F-4D97-AF65-F5344CB8AC3E}">
-        <p14:creationId xmlns:p14="http://schemas.microsoft.com/office/powerpoint/2010/main" val="513386680"/>
+        <p14:creationId xmlns:p14="http://schemas.microsoft.com/office/powerpoint/2010/main" val="2277162293"/>
+      </p:ext>
+    </p:extLst>
+  </p:cSld>
+  <p:clrMapOvr>
+    <a:masterClrMapping/>
+  </p:clrMapOvr>
+</p:sld>
+</file>
+
+<file path=ppt/slides/slide9.xml><?xml version="1.0" encoding="utf-8"?>
+<p:sld xmlns:a="http://schemas.openxmlformats.org/drawingml/2006/main" xmlns:r="http://schemas.openxmlformats.org/officeDocument/2006/relationships" xmlns:p="http://schemas.openxmlformats.org/presentationml/2006/main">
+  <p:cSld>
+    <p:spTree>
+      <p:nvGrpSpPr>
+        <p:cNvPr id="1" name=""/>
+        <p:cNvGrpSpPr/>
+        <p:nvPr/>
+      </p:nvGrpSpPr>
+      <p:grpSpPr>
+        <a:xfrm>
+          <a:off x="0" y="0"/>
+          <a:ext cx="0" cy="0"/>
+          <a:chOff x="0" y="0"/>
+          <a:chExt cx="0" cy="0"/>
+        </a:xfrm>
+      </p:grpSpPr>
+      <p:sp>
+        <p:nvSpPr>
+          <p:cNvPr id="2" name="标题 1">
+            <a:extLst>
+              <a:ext uri="{FF2B5EF4-FFF2-40B4-BE49-F238E27FC236}">
+                <a16:creationId xmlns:a16="http://schemas.microsoft.com/office/drawing/2014/main" id="{B2B12C30-7D0A-A0FE-36FE-80BAA342A318}"/>
+              </a:ext>
+            </a:extLst>
+          </p:cNvPr>
+          <p:cNvSpPr>
+            <a:spLocks noGrp="1"/>
+          </p:cNvSpPr>
+          <p:nvPr>
+            <p:ph type="title"/>
+          </p:nvPr>
+        </p:nvSpPr>
+        <p:spPr/>
+        <p:txBody>
+          <a:bodyPr/>
+          <a:lstStyle/>
+          <a:p>
+            <a:r>
+              <a:rPr lang="en-CA" dirty="0">
+                <a:latin typeface="Times New Roman" panose="02020603050405020304" pitchFamily="18" charset="0"/>
+                <a:cs typeface="Times New Roman" panose="02020603050405020304" pitchFamily="18" charset="0"/>
+              </a:rPr>
+              <a:t>QR-LJP</a:t>
+            </a:r>
+          </a:p>
+        </p:txBody>
+      </p:sp>
+      <p:sp>
+        <p:nvSpPr>
+          <p:cNvPr id="3" name="内容占位符 2">
+            <a:extLst>
+              <a:ext uri="{FF2B5EF4-FFF2-40B4-BE49-F238E27FC236}">
+                <a16:creationId xmlns:a16="http://schemas.microsoft.com/office/drawing/2014/main" id="{762723CF-D998-0D59-D6A1-64014D1D3B40}"/>
+              </a:ext>
+            </a:extLst>
+          </p:cNvPr>
+          <p:cNvSpPr>
+            <a:spLocks noGrp="1"/>
+          </p:cNvSpPr>
+          <p:nvPr>
+            <p:ph idx="1"/>
+          </p:nvPr>
+        </p:nvSpPr>
+        <p:spPr/>
+        <p:txBody>
+          <a:bodyPr/>
+          <a:lstStyle/>
+          <a:p>
+            <a:r>
+              <a:rPr lang="en-CA" dirty="0" err="1"/>
+              <a:t>中文LJP</a:t>
+            </a:r>
+            <a:r>
+              <a:rPr lang="zh-CN" altLang="en-US" dirty="0"/>
+              <a:t>：罪名预测，法条预测，刑期预测。</a:t>
+            </a:r>
+            <a:endParaRPr lang="en-US" altLang="zh-CN" dirty="0"/>
+          </a:p>
+          <a:p>
+            <a:r>
+              <a:rPr lang="en-US" altLang="zh-CN" dirty="0"/>
+              <a:t>QR-LJP</a:t>
+            </a:r>
+            <a:r>
+              <a:rPr lang="zh-CN" altLang="en-US" dirty="0"/>
+              <a:t>：罪行严重程度的量化。</a:t>
+            </a:r>
+            <a:endParaRPr lang="en-CA" dirty="0"/>
+          </a:p>
+        </p:txBody>
+      </p:sp>
+      <p:pic>
+        <p:nvPicPr>
+          <p:cNvPr id="5" name="图片 4">
+            <a:extLst>
+              <a:ext uri="{FF2B5EF4-FFF2-40B4-BE49-F238E27FC236}">
+                <a16:creationId xmlns:a16="http://schemas.microsoft.com/office/drawing/2014/main" id="{903CFA53-EE57-98CA-E4B7-57D243D9508A}"/>
+              </a:ext>
+            </a:extLst>
+          </p:cNvPr>
+          <p:cNvPicPr>
+            <a:picLocks noChangeAspect="1"/>
+          </p:cNvPicPr>
+          <p:nvPr/>
+        </p:nvPicPr>
+        <p:blipFill>
+          <a:blip r:embed="rId2"/>
+          <a:stretch>
+            <a:fillRect/>
+          </a:stretch>
+        </p:blipFill>
+        <p:spPr>
+          <a:xfrm>
+            <a:off x="2209800" y="2895365"/>
+            <a:ext cx="7772400" cy="3597510"/>
+          </a:xfrm>
+          <a:prstGeom prst="rect">
+            <a:avLst/>
+          </a:prstGeom>
+        </p:spPr>
+      </p:pic>
+    </p:spTree>
+    <p:extLst>
+      <p:ext uri="{BB962C8B-B14F-4D97-AF65-F5344CB8AC3E}">
+        <p14:creationId xmlns:p14="http://schemas.microsoft.com/office/powerpoint/2010/main" val="3462803669"/>
       </p:ext>
     </p:extLst>
   </p:cSld>

</xml_diff>

<commit_message>
add: qr-ljp slides done
</commit_message>
<xml_diff>
--- a/legal_ai/20251107_intro_legal_ai_works.pptx
+++ b/legal_ai/20251107_intro_legal_ai_works.pptx
@@ -13,9 +13,13 @@
     <p:sldId id="262" r:id="rId7"/>
     <p:sldId id="267" r:id="rId8"/>
     <p:sldId id="266" r:id="rId9"/>
-    <p:sldId id="259" r:id="rId10"/>
-    <p:sldId id="260" r:id="rId11"/>
-    <p:sldId id="261" r:id="rId12"/>
+    <p:sldId id="268" r:id="rId10"/>
+    <p:sldId id="269" r:id="rId11"/>
+    <p:sldId id="270" r:id="rId12"/>
+    <p:sldId id="271" r:id="rId13"/>
+    <p:sldId id="272" r:id="rId14"/>
+    <p:sldId id="260" r:id="rId15"/>
+    <p:sldId id="261" r:id="rId16"/>
   </p:sldIdLst>
   <p:sldSz cx="12192000" cy="6858000"/>
   <p:notesSz cx="6858000" cy="9144000"/>
@@ -271,7 +275,7 @@
           <a:p>
             <a:fld id="{1900F6BE-B067-BE42-AE82-598173A6B0F9}" type="datetimeFigureOut">
               <a:rPr lang="en-CA" smtClean="0"/>
-              <a:t>2025-11-10</a:t>
+              <a:t>2025-11-11</a:t>
             </a:fld>
             <a:endParaRPr lang="en-CA"/>
           </a:p>
@@ -471,7 +475,7 @@
           <a:p>
             <a:fld id="{1900F6BE-B067-BE42-AE82-598173A6B0F9}" type="datetimeFigureOut">
               <a:rPr lang="en-CA" smtClean="0"/>
-              <a:t>2025-11-10</a:t>
+              <a:t>2025-11-11</a:t>
             </a:fld>
             <a:endParaRPr lang="en-CA"/>
           </a:p>
@@ -681,7 +685,7 @@
           <a:p>
             <a:fld id="{1900F6BE-B067-BE42-AE82-598173A6B0F9}" type="datetimeFigureOut">
               <a:rPr lang="en-CA" smtClean="0"/>
-              <a:t>2025-11-10</a:t>
+              <a:t>2025-11-11</a:t>
             </a:fld>
             <a:endParaRPr lang="en-CA"/>
           </a:p>
@@ -793,10 +797,10 @@
           <a:lstStyle/>
           <a:p>
             <a:r>
-              <a:rPr lang="zh-CN" altLang="en-US"/>
+              <a:rPr lang="zh-CN" altLang="en-US" dirty="0"/>
               <a:t>单击此处编辑母版标题样式</a:t>
             </a:r>
-            <a:endParaRPr lang="en-CA"/>
+            <a:endParaRPr lang="en-CA" dirty="0"/>
           </a:p>
         </p:txBody>
       </p:sp>
@@ -881,7 +885,7 @@
           <a:p>
             <a:fld id="{1900F6BE-B067-BE42-AE82-598173A6B0F9}" type="datetimeFigureOut">
               <a:rPr lang="en-CA" smtClean="0"/>
-              <a:t>2025-11-10</a:t>
+              <a:t>2025-11-11</a:t>
             </a:fld>
             <a:endParaRPr lang="en-CA"/>
           </a:p>
@@ -1157,7 +1161,7 @@
           <a:p>
             <a:fld id="{1900F6BE-B067-BE42-AE82-598173A6B0F9}" type="datetimeFigureOut">
               <a:rPr lang="en-CA" smtClean="0"/>
-              <a:t>2025-11-10</a:t>
+              <a:t>2025-11-11</a:t>
             </a:fld>
             <a:endParaRPr lang="en-CA"/>
           </a:p>
@@ -1425,7 +1429,7 @@
           <a:p>
             <a:fld id="{1900F6BE-B067-BE42-AE82-598173A6B0F9}" type="datetimeFigureOut">
               <a:rPr lang="en-CA" smtClean="0"/>
-              <a:t>2025-11-10</a:t>
+              <a:t>2025-11-11</a:t>
             </a:fld>
             <a:endParaRPr lang="en-CA"/>
           </a:p>
@@ -1840,7 +1844,7 @@
           <a:p>
             <a:fld id="{1900F6BE-B067-BE42-AE82-598173A6B0F9}" type="datetimeFigureOut">
               <a:rPr lang="en-CA" smtClean="0"/>
-              <a:t>2025-11-10</a:t>
+              <a:t>2025-11-11</a:t>
             </a:fld>
             <a:endParaRPr lang="en-CA"/>
           </a:p>
@@ -1982,7 +1986,7 @@
           <a:p>
             <a:fld id="{1900F6BE-B067-BE42-AE82-598173A6B0F9}" type="datetimeFigureOut">
               <a:rPr lang="en-CA" smtClean="0"/>
-              <a:t>2025-11-10</a:t>
+              <a:t>2025-11-11</a:t>
             </a:fld>
             <a:endParaRPr lang="en-CA"/>
           </a:p>
@@ -2095,7 +2099,7 @@
           <a:p>
             <a:fld id="{1900F6BE-B067-BE42-AE82-598173A6B0F9}" type="datetimeFigureOut">
               <a:rPr lang="en-CA" smtClean="0"/>
-              <a:t>2025-11-10</a:t>
+              <a:t>2025-11-11</a:t>
             </a:fld>
             <a:endParaRPr lang="en-CA"/>
           </a:p>
@@ -2408,7 +2412,7 @@
           <a:p>
             <a:fld id="{1900F6BE-B067-BE42-AE82-598173A6B0F9}" type="datetimeFigureOut">
               <a:rPr lang="en-CA" smtClean="0"/>
-              <a:t>2025-11-10</a:t>
+              <a:t>2025-11-11</a:t>
             </a:fld>
             <a:endParaRPr lang="en-CA"/>
           </a:p>
@@ -2697,7 +2701,7 @@
           <a:p>
             <a:fld id="{1900F6BE-B067-BE42-AE82-598173A6B0F9}" type="datetimeFigureOut">
               <a:rPr lang="en-CA" smtClean="0"/>
-              <a:t>2025-11-10</a:t>
+              <a:t>2025-11-11</a:t>
             </a:fld>
             <a:endParaRPr lang="en-CA"/>
           </a:p>
@@ -2824,10 +2828,10 @@
           <a:lstStyle/>
           <a:p>
             <a:r>
-              <a:rPr lang="zh-CN" altLang="en-US"/>
+              <a:rPr lang="zh-CN" altLang="en-US" dirty="0"/>
               <a:t>单击此处编辑母版标题样式</a:t>
             </a:r>
-            <a:endParaRPr lang="en-CA"/>
+            <a:endParaRPr lang="en-CA" dirty="0"/>
           </a:p>
         </p:txBody>
       </p:sp>
@@ -2940,7 +2944,7 @@
           <a:p>
             <a:fld id="{1900F6BE-B067-BE42-AE82-598173A6B0F9}" type="datetimeFigureOut">
               <a:rPr lang="en-CA" smtClean="0"/>
-              <a:t>2025-11-10</a:t>
+              <a:t>2025-11-11</a:t>
             </a:fld>
             <a:endParaRPr lang="en-CA"/>
           </a:p>
@@ -3379,10 +3383,16 @@
           <a:lstStyle/>
           <a:p>
             <a:r>
-              <a:rPr lang="en-CA" dirty="0" err="1"/>
+              <a:rPr lang="en-CA" dirty="0" err="1">
+                <a:latin typeface="+mn-ea"/>
+                <a:ea typeface="+mn-ea"/>
+              </a:rPr>
               <a:t>内容简介</a:t>
             </a:r>
-            <a:endParaRPr lang="en-CA" dirty="0"/>
+            <a:endParaRPr lang="en-CA" dirty="0">
+              <a:latin typeface="+mn-ea"/>
+              <a:ea typeface="+mn-ea"/>
+            </a:endParaRPr>
           </a:p>
         </p:txBody>
       </p:sp>
@@ -3408,131 +3418,205 @@
           <a:lstStyle/>
           <a:p>
             <a:r>
-              <a:rPr lang="en-CA" dirty="0"/>
+              <a:rPr lang="en-CA" dirty="0">
+                <a:latin typeface="+mj-lt"/>
+              </a:rPr>
               <a:t>Legal NLP</a:t>
             </a:r>
           </a:p>
           <a:p>
             <a:pPr lvl="1"/>
             <a:r>
-              <a:rPr lang="en-CA" b="1" dirty="0"/>
+              <a:rPr lang="en-CA" b="1" dirty="0">
+                <a:latin typeface="+mj-lt"/>
+              </a:rPr>
               <a:t>LawBench</a:t>
             </a:r>
             <a:r>
-              <a:rPr lang="en-CA" dirty="0"/>
+              <a:rPr lang="en-CA" dirty="0">
+                <a:latin typeface="+mj-lt"/>
+              </a:rPr>
               <a:t>: </a:t>
             </a:r>
             <a:r>
-              <a:rPr lang="en-CA" dirty="0" err="1"/>
+              <a:rPr lang="en-CA" dirty="0" err="1">
+                <a:latin typeface="+mn-ea"/>
+              </a:rPr>
               <a:t>构建</a:t>
             </a:r>
             <a:r>
-              <a:rPr lang="en-CA" b="1" dirty="0" err="1"/>
+              <a:rPr lang="en-CA" b="1" dirty="0" err="1">
+                <a:latin typeface="+mn-ea"/>
+              </a:rPr>
               <a:t>中国成文法</a:t>
             </a:r>
             <a:r>
-              <a:rPr lang="en-CA" dirty="0" err="1"/>
+              <a:rPr lang="en-CA" dirty="0" err="1">
+                <a:latin typeface="+mn-ea"/>
+              </a:rPr>
               <a:t>场景的</a:t>
             </a:r>
             <a:r>
-              <a:rPr lang="en-CA" b="1" dirty="0" err="1"/>
+              <a:rPr lang="en-CA" b="1" dirty="0" err="1">
+                <a:latin typeface="+mn-ea"/>
+              </a:rPr>
               <a:t>多任务</a:t>
             </a:r>
             <a:r>
-              <a:rPr lang="en-CA" dirty="0" err="1"/>
+              <a:rPr lang="en-CA" dirty="0" err="1">
+                <a:latin typeface="+mn-ea"/>
+              </a:rPr>
               <a:t>法律评测基准</a:t>
             </a:r>
             <a:r>
-              <a:rPr lang="zh-CN" altLang="en-US" dirty="0"/>
+              <a:rPr lang="zh-CN" altLang="en-US" dirty="0">
+                <a:latin typeface="+mn-ea"/>
+              </a:rPr>
               <a:t>，用于比较通用模型和法律模型在法律任务上的能力。</a:t>
             </a:r>
-            <a:endParaRPr lang="en-CA" dirty="0"/>
+            <a:endParaRPr lang="en-CA" dirty="0">
+              <a:latin typeface="+mn-ea"/>
+            </a:endParaRPr>
           </a:p>
           <a:p>
             <a:pPr lvl="1"/>
             <a:r>
-              <a:rPr lang="en-CA" b="1" dirty="0"/>
+              <a:rPr lang="en-CA" b="1" dirty="0">
+                <a:latin typeface="+mj-lt"/>
+              </a:rPr>
               <a:t>QR-LJP</a:t>
             </a:r>
             <a:r>
-              <a:rPr lang="en-US" dirty="0"/>
+              <a:rPr lang="en-US" dirty="0">
+                <a:latin typeface="+mj-lt"/>
+              </a:rPr>
               <a:t>:</a:t>
             </a:r>
             <a:r>
-              <a:rPr lang="zh-CN" altLang="en-US" dirty="0"/>
-              <a:t> 把案件事实中</a:t>
-            </a:r>
-            <a:r>
-              <a:rPr lang="zh-CN" altLang="en-US" b="1" dirty="0"/>
+              <a:rPr lang="zh-CN" altLang="en-US" dirty="0">
+                <a:latin typeface="+mj-lt"/>
+              </a:rPr>
+              <a:t> </a:t>
+            </a:r>
+            <a:r>
+              <a:rPr lang="zh-CN" altLang="en-US" dirty="0">
+                <a:latin typeface="+mn-ea"/>
+              </a:rPr>
+              <a:t>把案件事实中</a:t>
+            </a:r>
+            <a:r>
+              <a:rPr lang="zh-CN" altLang="en-US" b="1" dirty="0">
+                <a:latin typeface="+mn-ea"/>
+              </a:rPr>
               <a:t>可量化的数值特征</a:t>
             </a:r>
             <a:r>
-              <a:rPr lang="zh-CN" altLang="en-US" dirty="0"/>
+              <a:rPr lang="zh-CN" altLang="en-US" dirty="0">
+                <a:latin typeface="+mn-ea"/>
+              </a:rPr>
               <a:t>抽出来并对齐到法律量刑区间，让判决预测能够依据量化的</a:t>
             </a:r>
             <a:r>
-              <a:rPr lang="zh-CN" altLang="en-US" b="1" dirty="0"/>
+              <a:rPr lang="zh-CN" altLang="en-US" b="1" dirty="0">
+                <a:latin typeface="+mn-ea"/>
+              </a:rPr>
               <a:t>犯罪严重程度</a:t>
             </a:r>
             <a:r>
-              <a:rPr lang="zh-CN" altLang="en-US" dirty="0"/>
+              <a:rPr lang="zh-CN" altLang="en-US" dirty="0">
+                <a:latin typeface="+mn-ea"/>
+              </a:rPr>
               <a:t>作出判罚。</a:t>
             </a:r>
-            <a:endParaRPr lang="en-US" dirty="0"/>
+            <a:endParaRPr lang="en-US" dirty="0">
+              <a:latin typeface="+mn-ea"/>
+            </a:endParaRPr>
           </a:p>
           <a:p>
             <a:pPr lvl="1"/>
             <a:r>
-              <a:rPr lang="en-US" b="1" dirty="0" err="1"/>
+              <a:rPr lang="en-US" b="1" dirty="0" err="1">
+                <a:latin typeface="+mj-lt"/>
+              </a:rPr>
               <a:t>LawShift</a:t>
             </a:r>
             <a:r>
-              <a:rPr lang="en-US" dirty="0"/>
+              <a:rPr lang="en-US" dirty="0">
+                <a:latin typeface="+mj-lt"/>
+              </a:rPr>
               <a:t>: </a:t>
             </a:r>
             <a:r>
-              <a:rPr lang="en-US" dirty="0" err="1"/>
+              <a:rPr lang="en-US" dirty="0" err="1">
+                <a:latin typeface="+mn-ea"/>
+              </a:rPr>
               <a:t>针对法条修订的场景测试的评测集</a:t>
             </a:r>
             <a:r>
-              <a:rPr lang="zh-CN" altLang="en-US" dirty="0"/>
-              <a:t>，测试模型在法律版本变化后能否同步更新判决结果。</a:t>
-            </a:r>
-            <a:endParaRPr lang="en-CA" dirty="0"/>
-          </a:p>
-          <a:p>
-            <a:r>
-              <a:rPr lang="en-CA" dirty="0"/>
+              <a:rPr lang="zh-CN" altLang="en-US" dirty="0">
+                <a:latin typeface="+mn-ea"/>
+              </a:rPr>
+              <a:t>，</a:t>
+            </a:r>
+            <a:r>
+              <a:rPr lang="zh-CN" altLang="en-US" dirty="0">
+                <a:latin typeface="+mj-lt"/>
+              </a:rPr>
+              <a:t>测试模型在法律版本变化后能否同步更新判决结果。</a:t>
+            </a:r>
+            <a:endParaRPr lang="en-CA" dirty="0">
+              <a:latin typeface="+mj-lt"/>
+            </a:endParaRPr>
+          </a:p>
+          <a:p>
+            <a:r>
+              <a:rPr lang="en-CA" dirty="0">
+                <a:latin typeface="+mj-lt"/>
+              </a:rPr>
               <a:t>Interpretable NLP</a:t>
             </a:r>
           </a:p>
           <a:p>
             <a:pPr lvl="1"/>
             <a:r>
-              <a:rPr lang="en-CA" dirty="0" err="1"/>
+              <a:rPr lang="en-CA" dirty="0" err="1">
+                <a:latin typeface="+mn-ea"/>
+              </a:rPr>
               <a:t>知识定位</a:t>
             </a:r>
             <a:r>
-              <a:rPr lang="en-US" altLang="zh-CN" dirty="0"/>
+              <a:rPr lang="en-US" altLang="zh-CN" dirty="0">
+                <a:latin typeface="+mn-ea"/>
+              </a:rPr>
               <a:t>/</a:t>
             </a:r>
             <a:r>
-              <a:rPr lang="zh-CN" altLang="en-US" dirty="0"/>
+              <a:rPr lang="zh-CN" altLang="en-US" dirty="0">
+                <a:latin typeface="+mj-lt"/>
+              </a:rPr>
               <a:t>定点编辑</a:t>
             </a:r>
-            <a:endParaRPr lang="en-US" altLang="zh-CN" dirty="0"/>
+            <a:endParaRPr lang="en-US" altLang="zh-CN" dirty="0">
+              <a:latin typeface="+mj-lt"/>
+            </a:endParaRPr>
           </a:p>
           <a:p>
             <a:pPr lvl="1"/>
             <a:r>
-              <a:rPr lang="zh-CN" altLang="en-US" dirty="0"/>
+              <a:rPr lang="zh-CN" altLang="en-US" dirty="0">
+                <a:latin typeface="+mj-lt"/>
+              </a:rPr>
               <a:t>可解释知识的控制输出</a:t>
             </a:r>
-            <a:endParaRPr lang="en-CA" dirty="0"/>
+            <a:endParaRPr lang="en-CA" dirty="0">
+              <a:latin typeface="+mj-lt"/>
+            </a:endParaRPr>
           </a:p>
           <a:p>
             <a:pPr lvl="1"/>
-            <a:endParaRPr lang="en-CA" dirty="0"/>
+            <a:endParaRPr lang="en-CA" dirty="0">
+              <a:latin typeface="+mj-lt"/>
+            </a:endParaRPr>
           </a:p>
         </p:txBody>
       </p:sp>
@@ -3571,6 +3655,580 @@
           <p:cNvPr id="2" name="标题 1">
             <a:extLst>
               <a:ext uri="{FF2B5EF4-FFF2-40B4-BE49-F238E27FC236}">
+                <a16:creationId xmlns:a16="http://schemas.microsoft.com/office/drawing/2014/main" id="{24077DEF-EC10-64DD-DB66-7623E17AA9C4}"/>
+              </a:ext>
+            </a:extLst>
+          </p:cNvPr>
+          <p:cNvSpPr>
+            <a:spLocks noGrp="1"/>
+          </p:cNvSpPr>
+          <p:nvPr>
+            <p:ph type="title"/>
+          </p:nvPr>
+        </p:nvSpPr>
+        <p:spPr/>
+        <p:txBody>
+          <a:bodyPr/>
+          <a:lstStyle/>
+          <a:p>
+            <a:r>
+              <a:rPr kumimoji="1" lang="en-US" altLang="zh-CN" dirty="0"/>
+              <a:t>QR-LJP (cont.)</a:t>
+            </a:r>
+            <a:endParaRPr kumimoji="1" lang="zh-CN" altLang="en-US" dirty="0"/>
+          </a:p>
+        </p:txBody>
+      </p:sp>
+      <p:sp>
+        <p:nvSpPr>
+          <p:cNvPr id="3" name="内容占位符 2">
+            <a:extLst>
+              <a:ext uri="{FF2B5EF4-FFF2-40B4-BE49-F238E27FC236}">
+                <a16:creationId xmlns:a16="http://schemas.microsoft.com/office/drawing/2014/main" id="{5928A363-D7F9-7647-214D-88044F09D365}"/>
+              </a:ext>
+            </a:extLst>
+          </p:cNvPr>
+          <p:cNvSpPr>
+            <a:spLocks noGrp="1"/>
+          </p:cNvSpPr>
+          <p:nvPr>
+            <p:ph idx="1"/>
+          </p:nvPr>
+        </p:nvSpPr>
+        <p:spPr/>
+        <p:txBody>
+          <a:bodyPr/>
+          <a:lstStyle/>
+          <a:p>
+            <a:r>
+              <a:rPr kumimoji="1" lang="zh-CN" altLang="en-US" dirty="0"/>
+              <a:t>思路：现有模型都是对文本建模。缺少对数值特征量化处理的过程。</a:t>
+            </a:r>
+            <a:endParaRPr kumimoji="1" lang="en-US" altLang="zh-CN" dirty="0"/>
+          </a:p>
+          <a:p>
+            <a:r>
+              <a:rPr kumimoji="1" lang="zh-CN" altLang="en-US" dirty="0"/>
+              <a:t>解决方式：</a:t>
+            </a:r>
+            <a:endParaRPr kumimoji="1" lang="en-US" altLang="zh-CN" dirty="0"/>
+          </a:p>
+          <a:p>
+            <a:pPr lvl="1"/>
+            <a:r>
+              <a:rPr kumimoji="1" lang="zh-CN" altLang="en-US" dirty="0"/>
+              <a:t>先精确计算显示数值特征，以此为依据作为量化犯罪严重程度。</a:t>
+            </a:r>
+            <a:endParaRPr kumimoji="1" lang="en-US" altLang="zh-CN" dirty="0"/>
+          </a:p>
+          <a:p>
+            <a:pPr lvl="1"/>
+            <a:r>
+              <a:rPr kumimoji="1" lang="zh-CN" altLang="en-US" dirty="0"/>
+              <a:t>将量化的严重程度与法条文本对齐。</a:t>
+            </a:r>
+          </a:p>
+        </p:txBody>
+      </p:sp>
+    </p:spTree>
+    <p:extLst>
+      <p:ext uri="{BB962C8B-B14F-4D97-AF65-F5344CB8AC3E}">
+        <p14:creationId xmlns:p14="http://schemas.microsoft.com/office/powerpoint/2010/main" val="804150775"/>
+      </p:ext>
+    </p:extLst>
+  </p:cSld>
+  <p:clrMapOvr>
+    <a:masterClrMapping/>
+  </p:clrMapOvr>
+</p:sld>
+</file>
+
+<file path=ppt/slides/slide11.xml><?xml version="1.0" encoding="utf-8"?>
+<p:sld xmlns:a="http://schemas.openxmlformats.org/drawingml/2006/main" xmlns:r="http://schemas.openxmlformats.org/officeDocument/2006/relationships" xmlns:p="http://schemas.openxmlformats.org/presentationml/2006/main">
+  <p:cSld>
+    <p:spTree>
+      <p:nvGrpSpPr>
+        <p:cNvPr id="1" name=""/>
+        <p:cNvGrpSpPr/>
+        <p:nvPr/>
+      </p:nvGrpSpPr>
+      <p:grpSpPr>
+        <a:xfrm>
+          <a:off x="0" y="0"/>
+          <a:ext cx="0" cy="0"/>
+          <a:chOff x="0" y="0"/>
+          <a:chExt cx="0" cy="0"/>
+        </a:xfrm>
+      </p:grpSpPr>
+      <p:sp>
+        <p:nvSpPr>
+          <p:cNvPr id="2" name="标题 1">
+            <a:extLst>
+              <a:ext uri="{FF2B5EF4-FFF2-40B4-BE49-F238E27FC236}">
+                <a16:creationId xmlns:a16="http://schemas.microsoft.com/office/drawing/2014/main" id="{0BD0021D-0664-6D16-9998-C11D15A7754F}"/>
+              </a:ext>
+            </a:extLst>
+          </p:cNvPr>
+          <p:cNvSpPr>
+            <a:spLocks noGrp="1"/>
+          </p:cNvSpPr>
+          <p:nvPr>
+            <p:ph type="title"/>
+          </p:nvPr>
+        </p:nvSpPr>
+        <p:spPr/>
+        <p:txBody>
+          <a:bodyPr/>
+          <a:lstStyle/>
+          <a:p>
+            <a:r>
+              <a:rPr kumimoji="1" lang="en-US" altLang="zh-CN" dirty="0"/>
+              <a:t>QR-LJP (cont.)</a:t>
+            </a:r>
+            <a:endParaRPr kumimoji="1" lang="zh-CN" altLang="en-US" dirty="0"/>
+          </a:p>
+        </p:txBody>
+      </p:sp>
+      <p:sp>
+        <p:nvSpPr>
+          <p:cNvPr id="6" name="内容占位符 5">
+            <a:extLst>
+              <a:ext uri="{FF2B5EF4-FFF2-40B4-BE49-F238E27FC236}">
+                <a16:creationId xmlns:a16="http://schemas.microsoft.com/office/drawing/2014/main" id="{BC055FCE-3374-8F0C-2300-CB7EB8E2A503}"/>
+              </a:ext>
+            </a:extLst>
+          </p:cNvPr>
+          <p:cNvSpPr>
+            <a:spLocks noGrp="1"/>
+          </p:cNvSpPr>
+          <p:nvPr>
+            <p:ph idx="1"/>
+          </p:nvPr>
+        </p:nvSpPr>
+        <p:spPr/>
+        <p:txBody>
+          <a:bodyPr/>
+          <a:lstStyle/>
+          <a:p>
+            <a:r>
+              <a:rPr lang="zh-CN" altLang="en-US" dirty="0"/>
+              <a:t>整体流程</a:t>
+            </a:r>
+          </a:p>
+        </p:txBody>
+      </p:sp>
+      <p:pic>
+        <p:nvPicPr>
+          <p:cNvPr id="7" name="内容占位符 3">
+            <a:extLst>
+              <a:ext uri="{FF2B5EF4-FFF2-40B4-BE49-F238E27FC236}">
+                <a16:creationId xmlns:a16="http://schemas.microsoft.com/office/drawing/2014/main" id="{612BDF4B-D3E8-666E-24A1-4EB08DD74D43}"/>
+              </a:ext>
+            </a:extLst>
+          </p:cNvPr>
+          <p:cNvPicPr>
+            <a:picLocks noChangeAspect="1"/>
+          </p:cNvPicPr>
+          <p:nvPr/>
+        </p:nvPicPr>
+        <p:blipFill>
+          <a:blip r:embed="rId2"/>
+          <a:stretch>
+            <a:fillRect/>
+          </a:stretch>
+        </p:blipFill>
+        <p:spPr>
+          <a:xfrm>
+            <a:off x="1390483" y="2443956"/>
+            <a:ext cx="9411033" cy="4351338"/>
+          </a:xfrm>
+          <a:prstGeom prst="rect">
+            <a:avLst/>
+          </a:prstGeom>
+        </p:spPr>
+      </p:pic>
+    </p:spTree>
+    <p:extLst>
+      <p:ext uri="{BB962C8B-B14F-4D97-AF65-F5344CB8AC3E}">
+        <p14:creationId xmlns:p14="http://schemas.microsoft.com/office/powerpoint/2010/main" val="1755004762"/>
+      </p:ext>
+    </p:extLst>
+  </p:cSld>
+  <p:clrMapOvr>
+    <a:masterClrMapping/>
+  </p:clrMapOvr>
+</p:sld>
+</file>
+
+<file path=ppt/slides/slide12.xml><?xml version="1.0" encoding="utf-8"?>
+<p:sld xmlns:a="http://schemas.openxmlformats.org/drawingml/2006/main" xmlns:r="http://schemas.openxmlformats.org/officeDocument/2006/relationships" xmlns:p="http://schemas.openxmlformats.org/presentationml/2006/main">
+  <p:cSld>
+    <p:spTree>
+      <p:nvGrpSpPr>
+        <p:cNvPr id="1" name=""/>
+        <p:cNvGrpSpPr/>
+        <p:nvPr/>
+      </p:nvGrpSpPr>
+      <p:grpSpPr>
+        <a:xfrm>
+          <a:off x="0" y="0"/>
+          <a:ext cx="0" cy="0"/>
+          <a:chOff x="0" y="0"/>
+          <a:chExt cx="0" cy="0"/>
+        </a:xfrm>
+      </p:grpSpPr>
+      <p:sp>
+        <p:nvSpPr>
+          <p:cNvPr id="2" name="标题 1">
+            <a:extLst>
+              <a:ext uri="{FF2B5EF4-FFF2-40B4-BE49-F238E27FC236}">
+                <a16:creationId xmlns:a16="http://schemas.microsoft.com/office/drawing/2014/main" id="{18DA11D1-17CA-36E5-7A24-8AEAB5535683}"/>
+              </a:ext>
+            </a:extLst>
+          </p:cNvPr>
+          <p:cNvSpPr>
+            <a:spLocks noGrp="1"/>
+          </p:cNvSpPr>
+          <p:nvPr>
+            <p:ph type="title"/>
+          </p:nvPr>
+        </p:nvSpPr>
+        <p:spPr/>
+        <p:txBody>
+          <a:bodyPr/>
+          <a:lstStyle/>
+          <a:p>
+            <a:r>
+              <a:rPr kumimoji="1" lang="en-US" altLang="zh-CN" dirty="0"/>
+              <a:t>QR-LJP (cont.)</a:t>
+            </a:r>
+            <a:endParaRPr kumimoji="1" lang="zh-CN" altLang="en-US" dirty="0"/>
+          </a:p>
+        </p:txBody>
+      </p:sp>
+      <p:sp>
+        <p:nvSpPr>
+          <p:cNvPr id="3" name="内容占位符 2">
+            <a:extLst>
+              <a:ext uri="{FF2B5EF4-FFF2-40B4-BE49-F238E27FC236}">
+                <a16:creationId xmlns:a16="http://schemas.microsoft.com/office/drawing/2014/main" id="{0BF66EEE-C60B-2A42-FA54-087FDD567085}"/>
+              </a:ext>
+            </a:extLst>
+          </p:cNvPr>
+          <p:cNvSpPr>
+            <a:spLocks noGrp="1"/>
+          </p:cNvSpPr>
+          <p:nvPr>
+            <p:ph idx="1"/>
+          </p:nvPr>
+        </p:nvSpPr>
+        <p:spPr/>
+        <p:txBody>
+          <a:bodyPr/>
+          <a:lstStyle/>
+          <a:p>
+            <a:r>
+              <a:rPr kumimoji="1" lang="zh-CN" altLang="en-US" dirty="0"/>
+              <a:t>实验设置：</a:t>
+            </a:r>
+            <a:endParaRPr kumimoji="1" lang="en-US" altLang="zh-CN" dirty="0"/>
+          </a:p>
+          <a:p>
+            <a:pPr lvl="1"/>
+            <a:r>
+              <a:rPr kumimoji="1" lang="zh-CN" altLang="en-US" dirty="0"/>
+              <a:t>数据集：</a:t>
+            </a:r>
+            <a:r>
+              <a:rPr kumimoji="1" lang="en-US" altLang="zh-CN" dirty="0"/>
+              <a:t>CAIL-2018</a:t>
+            </a:r>
+            <a:r>
+              <a:rPr kumimoji="1" lang="zh-CN" altLang="en-US" dirty="0"/>
+              <a:t>；</a:t>
+            </a:r>
+            <a:r>
+              <a:rPr kumimoji="1" lang="en-US" altLang="zh-CN" dirty="0"/>
+              <a:t>LAIC-2021</a:t>
+            </a:r>
+          </a:p>
+          <a:p>
+            <a:pPr lvl="1"/>
+            <a:r>
+              <a:rPr kumimoji="1" lang="zh-CN" altLang="en-US" dirty="0"/>
+              <a:t>指标：</a:t>
+            </a:r>
+            <a:r>
+              <a:rPr kumimoji="1" lang="en-US" altLang="zh-CN" dirty="0"/>
+              <a:t>Acc / </a:t>
+            </a:r>
+            <a:r>
+              <a:rPr kumimoji="1" lang="en-US" altLang="zh-CN" dirty="0" err="1"/>
+              <a:t>MaP</a:t>
+            </a:r>
+            <a:r>
+              <a:rPr kumimoji="1" lang="en-US" altLang="zh-CN" dirty="0"/>
+              <a:t> / </a:t>
+            </a:r>
+            <a:r>
+              <a:rPr kumimoji="1" lang="en-US" altLang="zh-CN" dirty="0" err="1"/>
+              <a:t>MaR</a:t>
+            </a:r>
+            <a:r>
+              <a:rPr kumimoji="1" lang="en-US" altLang="zh-CN" dirty="0"/>
+              <a:t> / </a:t>
+            </a:r>
+            <a:r>
+              <a:rPr kumimoji="1" lang="en-US" altLang="zh-CN" dirty="0" err="1"/>
+              <a:t>MaF</a:t>
+            </a:r>
+            <a:endParaRPr kumimoji="1" lang="en-US" altLang="zh-CN" dirty="0"/>
+          </a:p>
+          <a:p>
+            <a:pPr lvl="1"/>
+            <a:r>
+              <a:rPr kumimoji="1" lang="zh-CN" altLang="en-US" dirty="0"/>
+              <a:t>基线：</a:t>
+            </a:r>
+            <a:r>
+              <a:rPr kumimoji="1" lang="en-US" altLang="zh-CN" dirty="0" err="1"/>
+              <a:t>TopJudge</a:t>
+            </a:r>
+            <a:r>
+              <a:rPr kumimoji="1" lang="en-US" altLang="zh-CN" dirty="0"/>
+              <a:t>, </a:t>
+            </a:r>
+            <a:r>
+              <a:rPr kumimoji="1" lang="en-US" altLang="zh-CN" dirty="0" err="1"/>
+              <a:t>NeurJudge</a:t>
+            </a:r>
+            <a:r>
+              <a:rPr kumimoji="1" lang="en-US" altLang="zh-CN" dirty="0"/>
+              <a:t>, CEEN, </a:t>
+            </a:r>
+            <a:r>
+              <a:rPr kumimoji="1" lang="en-US" altLang="zh-CN" dirty="0" err="1"/>
+              <a:t>NumSCL</a:t>
+            </a:r>
+            <a:r>
+              <a:rPr kumimoji="1" lang="en-US" altLang="zh-CN" dirty="0"/>
+              <a:t>, </a:t>
+            </a:r>
+            <a:r>
+              <a:rPr kumimoji="1" lang="en-US" altLang="zh-CN" dirty="0" err="1"/>
+              <a:t>Gjudge</a:t>
+            </a:r>
+            <a:r>
+              <a:rPr kumimoji="1" lang="en-US" altLang="zh-CN" dirty="0"/>
+              <a:t>, ML-LJP, </a:t>
+            </a:r>
+            <a:r>
+              <a:rPr kumimoji="1" lang="en-US" altLang="zh-CN" dirty="0" err="1"/>
+              <a:t>ChatGLM</a:t>
+            </a:r>
+            <a:r>
+              <a:rPr kumimoji="1" lang="en-US" altLang="zh-CN" dirty="0"/>
+              <a:t>, </a:t>
+            </a:r>
+            <a:r>
+              <a:rPr kumimoji="1" lang="en-US" altLang="zh-CN" dirty="0" err="1"/>
+              <a:t>LexiLaw</a:t>
+            </a:r>
+            <a:r>
+              <a:rPr kumimoji="1" lang="en-US" altLang="zh-CN" dirty="0"/>
+              <a:t>, </a:t>
+            </a:r>
+            <a:r>
+              <a:rPr kumimoji="1" lang="en-US" altLang="zh-CN" dirty="0" err="1"/>
+              <a:t>LLaMa</a:t>
+            </a:r>
+            <a:r>
+              <a:rPr kumimoji="1" lang="en-US" altLang="zh-CN" dirty="0"/>
+              <a:t>, Qwen.</a:t>
+            </a:r>
+            <a:endParaRPr kumimoji="1" lang="zh-CN" altLang="en-US" dirty="0"/>
+          </a:p>
+        </p:txBody>
+      </p:sp>
+    </p:spTree>
+    <p:extLst>
+      <p:ext uri="{BB962C8B-B14F-4D97-AF65-F5344CB8AC3E}">
+        <p14:creationId xmlns:p14="http://schemas.microsoft.com/office/powerpoint/2010/main" val="895351228"/>
+      </p:ext>
+    </p:extLst>
+  </p:cSld>
+  <p:clrMapOvr>
+    <a:masterClrMapping/>
+  </p:clrMapOvr>
+</p:sld>
+</file>
+
+<file path=ppt/slides/slide13.xml><?xml version="1.0" encoding="utf-8"?>
+<p:sld xmlns:a="http://schemas.openxmlformats.org/drawingml/2006/main" xmlns:r="http://schemas.openxmlformats.org/officeDocument/2006/relationships" xmlns:p="http://schemas.openxmlformats.org/presentationml/2006/main">
+  <p:cSld>
+    <p:spTree>
+      <p:nvGrpSpPr>
+        <p:cNvPr id="1" name=""/>
+        <p:cNvGrpSpPr/>
+        <p:nvPr/>
+      </p:nvGrpSpPr>
+      <p:grpSpPr>
+        <a:xfrm>
+          <a:off x="0" y="0"/>
+          <a:ext cx="0" cy="0"/>
+          <a:chOff x="0" y="0"/>
+          <a:chExt cx="0" cy="0"/>
+        </a:xfrm>
+      </p:grpSpPr>
+      <p:sp>
+        <p:nvSpPr>
+          <p:cNvPr id="2" name="标题 1">
+            <a:extLst>
+              <a:ext uri="{FF2B5EF4-FFF2-40B4-BE49-F238E27FC236}">
+                <a16:creationId xmlns:a16="http://schemas.microsoft.com/office/drawing/2014/main" id="{5CA33666-2050-7060-BCDA-715A3DFA31A4}"/>
+              </a:ext>
+            </a:extLst>
+          </p:cNvPr>
+          <p:cNvSpPr>
+            <a:spLocks noGrp="1"/>
+          </p:cNvSpPr>
+          <p:nvPr>
+            <p:ph type="title"/>
+          </p:nvPr>
+        </p:nvSpPr>
+        <p:spPr/>
+        <p:txBody>
+          <a:bodyPr/>
+          <a:lstStyle/>
+          <a:p>
+            <a:r>
+              <a:rPr kumimoji="1" lang="en-US" altLang="zh-CN" dirty="0"/>
+              <a:t>QR-LJP</a:t>
+            </a:r>
+            <a:r>
+              <a:rPr kumimoji="1" lang="zh-CN" altLang="en-US" dirty="0"/>
+              <a:t> </a:t>
+            </a:r>
+            <a:r>
+              <a:rPr kumimoji="1" lang="en-US" altLang="zh-CN" dirty="0"/>
+              <a:t>(cont.)</a:t>
+            </a:r>
+            <a:endParaRPr kumimoji="1" lang="zh-CN" altLang="en-US" dirty="0"/>
+          </a:p>
+        </p:txBody>
+      </p:sp>
+      <p:sp>
+        <p:nvSpPr>
+          <p:cNvPr id="3" name="内容占位符 2">
+            <a:extLst>
+              <a:ext uri="{FF2B5EF4-FFF2-40B4-BE49-F238E27FC236}">
+                <a16:creationId xmlns:a16="http://schemas.microsoft.com/office/drawing/2014/main" id="{692EAF73-D5BA-6465-FE88-B829FA504CDE}"/>
+              </a:ext>
+            </a:extLst>
+          </p:cNvPr>
+          <p:cNvSpPr>
+            <a:spLocks noGrp="1"/>
+          </p:cNvSpPr>
+          <p:nvPr>
+            <p:ph idx="1"/>
+          </p:nvPr>
+        </p:nvSpPr>
+        <p:spPr/>
+        <p:txBody>
+          <a:bodyPr/>
+          <a:lstStyle/>
+          <a:p>
+            <a:r>
+              <a:rPr kumimoji="1" lang="zh-CN" altLang="en-US" dirty="0"/>
+              <a:t>主要结论：</a:t>
+            </a:r>
+            <a:endParaRPr kumimoji="1" lang="en-US" altLang="zh-CN" dirty="0"/>
+          </a:p>
+          <a:p>
+            <a:pPr lvl="1"/>
+            <a:r>
+              <a:rPr kumimoji="1" lang="zh-CN" altLang="en-US" dirty="0"/>
+              <a:t>引入定量推理机制的</a:t>
+            </a:r>
+            <a:r>
+              <a:rPr kumimoji="1" lang="en-US" altLang="zh-CN" dirty="0"/>
+              <a:t>QR-LJP</a:t>
+            </a:r>
+            <a:r>
+              <a:rPr kumimoji="1" lang="zh-CN" altLang="en-US" dirty="0"/>
+              <a:t>模型比基线模型在刑期预测任务上的表现更好。</a:t>
+            </a:r>
+            <a:endParaRPr kumimoji="1" lang="en-US" altLang="zh-CN" dirty="0"/>
+          </a:p>
+          <a:p>
+            <a:pPr lvl="1"/>
+            <a:r>
+              <a:rPr kumimoji="1" lang="zh-CN" altLang="en-US" dirty="0"/>
+              <a:t>消融实验（去掉定量推理模块）说明增益的确来源于数值特征的推理。</a:t>
+            </a:r>
+            <a:endParaRPr kumimoji="1" lang="en-US" altLang="zh-CN" dirty="0"/>
+          </a:p>
+          <a:p>
+            <a:pPr lvl="1"/>
+            <a:r>
+              <a:rPr kumimoji="1" lang="zh-CN" altLang="en-US" dirty="0"/>
+              <a:t>定量推理机制加入基线模型后又表现提升。</a:t>
+            </a:r>
+            <a:endParaRPr kumimoji="1" lang="en-US" altLang="zh-CN" dirty="0"/>
+          </a:p>
+          <a:p>
+            <a:pPr lvl="1"/>
+            <a:r>
+              <a:rPr kumimoji="1" lang="en-US" altLang="zh-CN" dirty="0"/>
+              <a:t>Oracle</a:t>
+            </a:r>
+            <a:r>
+              <a:rPr kumimoji="1" lang="zh-CN" altLang="en-US" dirty="0"/>
+              <a:t>实验说明，如果金额算的更准确一些，刑期预测上的表现还会</a:t>
+            </a:r>
+            <a:r>
+              <a:rPr kumimoji="1" lang="zh-CN" altLang="en-US"/>
+              <a:t>提高。</a:t>
+            </a:r>
+            <a:endParaRPr kumimoji="1" lang="en-US" altLang="zh-CN" dirty="0"/>
+          </a:p>
+        </p:txBody>
+      </p:sp>
+    </p:spTree>
+    <p:extLst>
+      <p:ext uri="{BB962C8B-B14F-4D97-AF65-F5344CB8AC3E}">
+        <p14:creationId xmlns:p14="http://schemas.microsoft.com/office/powerpoint/2010/main" val="1442809231"/>
+      </p:ext>
+    </p:extLst>
+  </p:cSld>
+  <p:clrMapOvr>
+    <a:masterClrMapping/>
+  </p:clrMapOvr>
+</p:sld>
+</file>
+
+<file path=ppt/slides/slide14.xml><?xml version="1.0" encoding="utf-8"?>
+<p:sld xmlns:a="http://schemas.openxmlformats.org/drawingml/2006/main" xmlns:r="http://schemas.openxmlformats.org/officeDocument/2006/relationships" xmlns:p="http://schemas.openxmlformats.org/presentationml/2006/main">
+  <p:cSld>
+    <p:spTree>
+      <p:nvGrpSpPr>
+        <p:cNvPr id="1" name=""/>
+        <p:cNvGrpSpPr/>
+        <p:nvPr/>
+      </p:nvGrpSpPr>
+      <p:grpSpPr>
+        <a:xfrm>
+          <a:off x="0" y="0"/>
+          <a:ext cx="0" cy="0"/>
+          <a:chOff x="0" y="0"/>
+          <a:chExt cx="0" cy="0"/>
+        </a:xfrm>
+      </p:grpSpPr>
+      <p:sp>
+        <p:nvSpPr>
+          <p:cNvPr id="2" name="标题 1">
+            <a:extLst>
+              <a:ext uri="{FF2B5EF4-FFF2-40B4-BE49-F238E27FC236}">
                 <a16:creationId xmlns:a16="http://schemas.microsoft.com/office/drawing/2014/main" id="{08C0DF71-BF6E-27FD-F8FD-6AC4DC0370EA}"/>
               </a:ext>
             </a:extLst>
@@ -3685,7 +4343,7 @@
 </p:sld>
 </file>
 
-<file path=ppt/slides/slide11.xml><?xml version="1.0" encoding="utf-8"?>
+<file path=ppt/slides/slide15.xml><?xml version="1.0" encoding="utf-8"?>
 <p:sld xmlns:a="http://schemas.openxmlformats.org/drawingml/2006/main" xmlns:r="http://schemas.openxmlformats.org/officeDocument/2006/relationships" xmlns:p="http://schemas.openxmlformats.org/presentationml/2006/main">
   <p:cSld>
     <p:spTree>
@@ -4991,7 +5649,7 @@
                 <a:latin typeface="Times New Roman" panose="02020603050405020304" pitchFamily="18" charset="0"/>
                 <a:cs typeface="Times New Roman" panose="02020603050405020304" pitchFamily="18" charset="0"/>
               </a:rPr>
-              <a:t>任务信息表</a:t>
+              <a:t>法律任务</a:t>
             </a:r>
           </a:p>
         </p:txBody>
@@ -5136,7 +5794,9 @@
               <a:t>使用</a:t>
             </a:r>
             <a:r>
-              <a:rPr lang="en-US" altLang="zh-CN" dirty="0"/>
+              <a:rPr lang="en-US" altLang="zh-CN" dirty="0">
+                <a:latin typeface="+mj-lt"/>
+              </a:rPr>
               <a:t>OpenCompass</a:t>
             </a:r>
             <a:r>
@@ -5148,15 +5808,25 @@
           <a:p>
             <a:pPr lvl="1"/>
             <a:r>
-              <a:rPr lang="en-US" altLang="zh-CN" dirty="0"/>
+              <a:rPr lang="en-US" altLang="zh-CN" dirty="0">
+                <a:latin typeface="+mj-lt"/>
+              </a:rPr>
               <a:t>Zero-shot</a:t>
             </a:r>
             <a:r>
+              <a:rPr lang="zh-CN" altLang="en-US" dirty="0">
+                <a:latin typeface="+mj-lt"/>
+              </a:rPr>
+              <a:t> </a:t>
+            </a:r>
+            <a:r>
               <a:rPr lang="zh-CN" altLang="en-US" dirty="0"/>
-              <a:t> 和 </a:t>
-            </a:r>
-            <a:r>
-              <a:rPr lang="en-US" altLang="zh-CN" dirty="0"/>
+              <a:t>和 </a:t>
+            </a:r>
+            <a:r>
+              <a:rPr lang="en-US" altLang="zh-CN" dirty="0">
+                <a:latin typeface="+mj-lt"/>
+              </a:rPr>
               <a:t>One-shot</a:t>
             </a:r>
             <a:r>
@@ -5259,13 +5929,13 @@
           <a:p>
             <a:r>
               <a:rPr lang="en-CA" dirty="0" err="1">
-                <a:latin typeface="Times New Roman" panose="02020603050405020304" pitchFamily="18" charset="0"/>
-                <a:cs typeface="Times New Roman" panose="02020603050405020304" pitchFamily="18" charset="0"/>
-              </a:rPr>
-              <a:t>测试结果</a:t>
+                <a:latin typeface="+mn-ea"/>
+                <a:cs typeface="Times New Roman" panose="02020603050405020304" pitchFamily="18" charset="0"/>
+              </a:rPr>
+              <a:t>测评结果</a:t>
             </a:r>
             <a:endParaRPr lang="en-CA" dirty="0">
-              <a:latin typeface="Times New Roman" panose="02020603050405020304" pitchFamily="18" charset="0"/>
+              <a:latin typeface="+mn-ea"/>
               <a:cs typeface="Times New Roman" panose="02020603050405020304" pitchFamily="18" charset="0"/>
             </a:endParaRPr>
           </a:p>
@@ -5563,7 +6233,9 @@
               <a:t>所有任务上的平均水平：</a:t>
             </a:r>
             <a:r>
-              <a:rPr kumimoji="1" lang="en-US" altLang="zh-CN" dirty="0"/>
+              <a:rPr kumimoji="1" lang="en-US" altLang="zh-CN" dirty="0">
+                <a:latin typeface="+mj-lt"/>
+              </a:rPr>
               <a:t>Qwen-1.5-72B</a:t>
             </a:r>
             <a:r>
@@ -5571,7 +6243,9 @@
               <a:t> 和 </a:t>
             </a:r>
             <a:r>
-              <a:rPr kumimoji="1" lang="en-US" altLang="zh-CN" dirty="0"/>
+              <a:rPr kumimoji="1" lang="en-US" altLang="zh-CN" dirty="0">
+                <a:latin typeface="+mj-lt"/>
+              </a:rPr>
               <a:t>GPT-4</a:t>
             </a:r>
             <a:r>
@@ -5587,7 +6261,10 @@
               <a:t>难度较大的是 </a:t>
             </a:r>
             <a:r>
-              <a:rPr kumimoji="1" lang="en-US" altLang="zh-CN" dirty="0"/>
+              <a:rPr kumimoji="1" lang="en-US" altLang="zh-CN" dirty="0">
+                <a:latin typeface="Times New Roman" panose="02020603050405020304" pitchFamily="18" charset="0"/>
+                <a:cs typeface="Times New Roman" panose="02020603050405020304" pitchFamily="18" charset="0"/>
+              </a:rPr>
               <a:t>Understanding</a:t>
             </a:r>
             <a:r>
@@ -5595,7 +6272,9 @@
               <a:t> 和 </a:t>
             </a:r>
             <a:r>
-              <a:rPr kumimoji="1" lang="en-US" altLang="zh-CN" dirty="0"/>
+              <a:rPr kumimoji="1" lang="en-US" altLang="zh-CN" dirty="0">
+                <a:latin typeface="+mj-lt"/>
+              </a:rPr>
               <a:t>Applying</a:t>
             </a:r>
             <a:r>
@@ -5612,7 +6291,17 @@
             </a:r>
             <a:r>
               <a:rPr kumimoji="1" lang="en-US" altLang="zh-CN" dirty="0"/>
-              <a:t> go wild.</a:t>
+              <a:t> </a:t>
+            </a:r>
+            <a:r>
+              <a:rPr kumimoji="1" lang="en-US" altLang="zh-CN" dirty="0">
+                <a:latin typeface="+mj-lt"/>
+              </a:rPr>
+              <a:t>go wild</a:t>
+            </a:r>
+            <a:r>
+              <a:rPr kumimoji="1" lang="en-US" altLang="zh-CN" dirty="0"/>
+              <a:t>.</a:t>
             </a:r>
           </a:p>
           <a:p>
@@ -5645,7 +6334,9 @@
               <a:t>指标比如生成任务使用的 </a:t>
             </a:r>
             <a:r>
-              <a:rPr kumimoji="1" lang="en-US" altLang="zh-CN" dirty="0"/>
+              <a:rPr kumimoji="1" lang="en-US" altLang="zh-CN" dirty="0">
+                <a:latin typeface="+mj-lt"/>
+              </a:rPr>
               <a:t>Rogue-L</a:t>
             </a:r>
             <a:r>
@@ -5691,7 +6382,7 @@
           <p:cNvPr id="2" name="标题 1">
             <a:extLst>
               <a:ext uri="{FF2B5EF4-FFF2-40B4-BE49-F238E27FC236}">
-                <a16:creationId xmlns:a16="http://schemas.microsoft.com/office/drawing/2014/main" id="{B2B12C30-7D0A-A0FE-36FE-80BAA342A318}"/>
+                <a16:creationId xmlns:a16="http://schemas.microsoft.com/office/drawing/2014/main" id="{6743FAFD-69B5-53BF-BB9C-63DD420770D5}"/>
               </a:ext>
             </a:extLst>
           </p:cNvPr>
@@ -5708,12 +6399,10 @@
           <a:lstStyle/>
           <a:p>
             <a:r>
-              <a:rPr lang="en-CA" dirty="0">
-                <a:latin typeface="Times New Roman" panose="02020603050405020304" pitchFamily="18" charset="0"/>
-                <a:cs typeface="Times New Roman" panose="02020603050405020304" pitchFamily="18" charset="0"/>
-              </a:rPr>
+              <a:rPr kumimoji="1" lang="en-US" altLang="zh-CN" dirty="0"/>
               <a:t>QR-LJP</a:t>
             </a:r>
+            <a:endParaRPr kumimoji="1" lang="zh-CN" altLang="en-US" dirty="0"/>
           </a:p>
         </p:txBody>
       </p:sp>
@@ -5722,7 +6411,7 @@
           <p:cNvPr id="3" name="内容占位符 2">
             <a:extLst>
               <a:ext uri="{FF2B5EF4-FFF2-40B4-BE49-F238E27FC236}">
-                <a16:creationId xmlns:a16="http://schemas.microsoft.com/office/drawing/2014/main" id="{762723CF-D998-0D59-D6A1-64014D1D3B40}"/>
+                <a16:creationId xmlns:a16="http://schemas.microsoft.com/office/drawing/2014/main" id="{68E92352-A8E7-D0C7-AFF6-2AE464EE2C9F}"/>
               </a:ext>
             </a:extLst>
           </p:cNvPr>
@@ -5739,34 +6428,39 @@
           <a:lstStyle/>
           <a:p>
             <a:r>
-              <a:rPr lang="en-CA" dirty="0" err="1"/>
-              <a:t>中文LJP</a:t>
-            </a:r>
-            <a:r>
-              <a:rPr lang="zh-CN" altLang="en-US" dirty="0"/>
-              <a:t>：罪名预测，法条预测，刑期预测。</a:t>
-            </a:r>
-            <a:endParaRPr lang="en-US" altLang="zh-CN" dirty="0"/>
-          </a:p>
-          <a:p>
-            <a:r>
-              <a:rPr lang="en-US" altLang="zh-CN" dirty="0"/>
-              <a:t>QR-LJP</a:t>
-            </a:r>
-            <a:r>
-              <a:rPr lang="zh-CN" altLang="en-US" dirty="0"/>
-              <a:t>：罪行严重程度的量化。</a:t>
-            </a:r>
-            <a:endParaRPr lang="en-CA" dirty="0"/>
+              <a:rPr kumimoji="1" lang="zh-CN" altLang="en-US" dirty="0"/>
+              <a:t>任务：法律判决预测（</a:t>
+            </a:r>
+            <a:r>
+              <a:rPr kumimoji="1" lang="en-US" altLang="zh-CN" dirty="0">
+                <a:latin typeface="+mj-lt"/>
+              </a:rPr>
+              <a:t>LJP</a:t>
+            </a:r>
+            <a:r>
+              <a:rPr kumimoji="1" lang="zh-CN" altLang="en-US" dirty="0"/>
+              <a:t>）根据案件过程描述对罪名、法条、刑期作出预测（中国大陆语境里）。</a:t>
+            </a:r>
+            <a:endParaRPr kumimoji="1" lang="en-US" altLang="zh-CN" dirty="0"/>
+          </a:p>
+          <a:p>
+            <a:r>
+              <a:rPr kumimoji="1" lang="zh-CN" altLang="en-US" dirty="0"/>
+              <a:t>现实流程：法官看事实，决定犯罪严重的程度之后量刑。现有的模型都跳过了这个量化过程。</a:t>
+            </a:r>
+            <a:endParaRPr kumimoji="1" lang="en-US" altLang="zh-CN" dirty="0"/>
+          </a:p>
+          <a:p>
+            <a:endParaRPr kumimoji="1" lang="en-US" altLang="zh-CN" dirty="0"/>
           </a:p>
         </p:txBody>
       </p:sp>
       <p:pic>
         <p:nvPicPr>
-          <p:cNvPr id="5" name="图片 4">
-            <a:extLst>
-              <a:ext uri="{FF2B5EF4-FFF2-40B4-BE49-F238E27FC236}">
-                <a16:creationId xmlns:a16="http://schemas.microsoft.com/office/drawing/2014/main" id="{903CFA53-EE57-98CA-E4B7-57D243D9508A}"/>
+          <p:cNvPr id="4" name="图片 3">
+            <a:extLst>
+              <a:ext uri="{FF2B5EF4-FFF2-40B4-BE49-F238E27FC236}">
+                <a16:creationId xmlns:a16="http://schemas.microsoft.com/office/drawing/2014/main" id="{EEDF50A4-C969-EFBD-F682-EF80CD583730}"/>
               </a:ext>
             </a:extLst>
           </p:cNvPr>
@@ -5783,8 +6477,8 @@
         </p:blipFill>
         <p:spPr>
           <a:xfrm>
-            <a:off x="2209800" y="2895365"/>
-            <a:ext cx="7772400" cy="3597510"/>
+            <a:off x="1928686" y="3803650"/>
+            <a:ext cx="8334627" cy="2373313"/>
           </a:xfrm>
           <a:prstGeom prst="rect">
             <a:avLst/>
@@ -5794,7 +6488,7 @@
     </p:spTree>
     <p:extLst>
       <p:ext uri="{BB962C8B-B14F-4D97-AF65-F5344CB8AC3E}">
-        <p14:creationId xmlns:p14="http://schemas.microsoft.com/office/powerpoint/2010/main" val="3462803669"/>
+        <p14:creationId xmlns:p14="http://schemas.microsoft.com/office/powerpoint/2010/main" val="3586515404"/>
       </p:ext>
     </p:extLst>
   </p:cSld>
@@ -5845,43 +6539,8 @@
         <a:srgbClr val="96607D"/>
       </a:folHlink>
     </a:clrScheme>
-    <a:fontScheme name="Arial-Times New Roman">
+    <a:fontScheme name="Times New Roman-Arial">
       <a:majorFont>
-        <a:latin typeface="Arial" panose="020B0604020202020204"/>
-        <a:ea typeface=""/>
-        <a:cs typeface=""/>
-        <a:font script="Jpan" typeface="ＭＳ Ｐゴシック"/>
-        <a:font script="Hang" typeface="굴림"/>
-        <a:font script="Hans" typeface="黑体"/>
-        <a:font script="Hant" typeface="微軟正黑體"/>
-        <a:font script="Arab" typeface="Arial"/>
-        <a:font script="Hebr" typeface="Arial"/>
-        <a:font script="Thai" typeface="Cordia New"/>
-        <a:font script="Ethi" typeface="Nyala"/>
-        <a:font script="Beng" typeface="Vrinda"/>
-        <a:font script="Gujr" typeface="Shruti"/>
-        <a:font script="Khmr" typeface="DaunPenh"/>
-        <a:font script="Knda" typeface="Tunga"/>
-        <a:font script="Guru" typeface="Raavi"/>
-        <a:font script="Cans" typeface="Euphemia"/>
-        <a:font script="Cher" typeface="Plantagenet Cherokee"/>
-        <a:font script="Yiii" typeface="Microsoft Yi Baiti"/>
-        <a:font script="Tibt" typeface="Microsoft Himalaya"/>
-        <a:font script="Thaa" typeface="MV Boli"/>
-        <a:font script="Deva" typeface="Mangal"/>
-        <a:font script="Telu" typeface="Gautami"/>
-        <a:font script="Taml" typeface="Latha"/>
-        <a:font script="Syrc" typeface="Estrangelo Edessa"/>
-        <a:font script="Orya" typeface="Kalinga"/>
-        <a:font script="Mlym" typeface="Kartika"/>
-        <a:font script="Laoo" typeface="DokChampa"/>
-        <a:font script="Sinh" typeface="Iskoola Pota"/>
-        <a:font script="Mong" typeface="Mongolian Baiti"/>
-        <a:font script="Viet" typeface="Arial"/>
-        <a:font script="Uigh" typeface="Microsoft Uighur"/>
-        <a:font script="Geor" typeface="Sylfaen"/>
-      </a:majorFont>
-      <a:minorFont>
         <a:latin typeface="Times New Roman" panose="02020603050405020304"/>
         <a:ea typeface=""/>
         <a:cs typeface=""/>
@@ -5913,6 +6572,41 @@
         <a:font script="Sinh" typeface="Iskoola Pota"/>
         <a:font script="Mong" typeface="Mongolian Baiti"/>
         <a:font script="Viet" typeface="Times New Roman"/>
+        <a:font script="Uigh" typeface="Microsoft Uighur"/>
+        <a:font script="Geor" typeface="Sylfaen"/>
+      </a:majorFont>
+      <a:minorFont>
+        <a:latin typeface="Arial" panose="020B0604020202020204"/>
+        <a:ea typeface=""/>
+        <a:cs typeface=""/>
+        <a:font script="Jpan" typeface="ＭＳ Ｐゴシック"/>
+        <a:font script="Hang" typeface="돋움"/>
+        <a:font script="Hans" typeface="黑体"/>
+        <a:font script="Hant" typeface="微軟正黑體"/>
+        <a:font script="Arab" typeface="Arial"/>
+        <a:font script="Hebr" typeface="Arial"/>
+        <a:font script="Thai" typeface="Cordia New"/>
+        <a:font script="Ethi" typeface="Nyala"/>
+        <a:font script="Beng" typeface="Vrinda"/>
+        <a:font script="Gujr" typeface="Shruti"/>
+        <a:font script="Khmr" typeface="DaunPenh"/>
+        <a:font script="Knda" typeface="Tunga"/>
+        <a:font script="Guru" typeface="Raavi"/>
+        <a:font script="Cans" typeface="Euphemia"/>
+        <a:font script="Cher" typeface="Plantagenet Cherokee"/>
+        <a:font script="Yiii" typeface="Microsoft Yi Baiti"/>
+        <a:font script="Tibt" typeface="Microsoft Himalaya"/>
+        <a:font script="Thaa" typeface="MV Boli"/>
+        <a:font script="Deva" typeface="Mangal"/>
+        <a:font script="Telu" typeface="Gautami"/>
+        <a:font script="Taml" typeface="Latha"/>
+        <a:font script="Syrc" typeface="Estrangelo Edessa"/>
+        <a:font script="Orya" typeface="Kalinga"/>
+        <a:font script="Mlym" typeface="Kartika"/>
+        <a:font script="Laoo" typeface="DokChampa"/>
+        <a:font script="Sinh" typeface="Iskoola Pota"/>
+        <a:font script="Mong" typeface="Mongolian Baiti"/>
+        <a:font script="Viet" typeface="Arial"/>
         <a:font script="Uigh" typeface="Microsoft Uighur"/>
         <a:font script="Geor" typeface="Sylfaen"/>
       </a:minorFont>

</xml_diff>

<commit_message>
add: lawshift part slides done
</commit_message>
<xml_diff>
--- a/legal_ai/20251107_intro_legal_ai_works.pptx
+++ b/legal_ai/20251107_intro_legal_ai_works.pptx
@@ -19,7 +19,13 @@
     <p:sldId id="271" r:id="rId13"/>
     <p:sldId id="272" r:id="rId14"/>
     <p:sldId id="260" r:id="rId15"/>
-    <p:sldId id="261" r:id="rId16"/>
+    <p:sldId id="273" r:id="rId16"/>
+    <p:sldId id="274" r:id="rId17"/>
+    <p:sldId id="275" r:id="rId18"/>
+    <p:sldId id="276" r:id="rId19"/>
+    <p:sldId id="277" r:id="rId20"/>
+    <p:sldId id="278" r:id="rId21"/>
+    <p:sldId id="261" r:id="rId22"/>
   </p:sldIdLst>
   <p:sldSz cx="12192000" cy="6858000"/>
   <p:notesSz cx="6858000" cy="9144000"/>
@@ -275,7 +281,7 @@
           <a:p>
             <a:fld id="{1900F6BE-B067-BE42-AE82-598173A6B0F9}" type="datetimeFigureOut">
               <a:rPr lang="en-CA" smtClean="0"/>
-              <a:t>2025-11-11</a:t>
+              <a:t>2025-11-16</a:t>
             </a:fld>
             <a:endParaRPr lang="en-CA"/>
           </a:p>
@@ -475,7 +481,7 @@
           <a:p>
             <a:fld id="{1900F6BE-B067-BE42-AE82-598173A6B0F9}" type="datetimeFigureOut">
               <a:rPr lang="en-CA" smtClean="0"/>
-              <a:t>2025-11-11</a:t>
+              <a:t>2025-11-16</a:t>
             </a:fld>
             <a:endParaRPr lang="en-CA"/>
           </a:p>
@@ -685,7 +691,7 @@
           <a:p>
             <a:fld id="{1900F6BE-B067-BE42-AE82-598173A6B0F9}" type="datetimeFigureOut">
               <a:rPr lang="en-CA" smtClean="0"/>
-              <a:t>2025-11-11</a:t>
+              <a:t>2025-11-16</a:t>
             </a:fld>
             <a:endParaRPr lang="en-CA"/>
           </a:p>
@@ -885,7 +891,7 @@
           <a:p>
             <a:fld id="{1900F6BE-B067-BE42-AE82-598173A6B0F9}" type="datetimeFigureOut">
               <a:rPr lang="en-CA" smtClean="0"/>
-              <a:t>2025-11-11</a:t>
+              <a:t>2025-11-16</a:t>
             </a:fld>
             <a:endParaRPr lang="en-CA"/>
           </a:p>
@@ -1161,7 +1167,7 @@
           <a:p>
             <a:fld id="{1900F6BE-B067-BE42-AE82-598173A6B0F9}" type="datetimeFigureOut">
               <a:rPr lang="en-CA" smtClean="0"/>
-              <a:t>2025-11-11</a:t>
+              <a:t>2025-11-16</a:t>
             </a:fld>
             <a:endParaRPr lang="en-CA"/>
           </a:p>
@@ -1429,7 +1435,7 @@
           <a:p>
             <a:fld id="{1900F6BE-B067-BE42-AE82-598173A6B0F9}" type="datetimeFigureOut">
               <a:rPr lang="en-CA" smtClean="0"/>
-              <a:t>2025-11-11</a:t>
+              <a:t>2025-11-16</a:t>
             </a:fld>
             <a:endParaRPr lang="en-CA"/>
           </a:p>
@@ -1844,7 +1850,7 @@
           <a:p>
             <a:fld id="{1900F6BE-B067-BE42-AE82-598173A6B0F9}" type="datetimeFigureOut">
               <a:rPr lang="en-CA" smtClean="0"/>
-              <a:t>2025-11-11</a:t>
+              <a:t>2025-11-16</a:t>
             </a:fld>
             <a:endParaRPr lang="en-CA"/>
           </a:p>
@@ -1986,7 +1992,7 @@
           <a:p>
             <a:fld id="{1900F6BE-B067-BE42-AE82-598173A6B0F9}" type="datetimeFigureOut">
               <a:rPr lang="en-CA" smtClean="0"/>
-              <a:t>2025-11-11</a:t>
+              <a:t>2025-11-16</a:t>
             </a:fld>
             <a:endParaRPr lang="en-CA"/>
           </a:p>
@@ -2099,7 +2105,7 @@
           <a:p>
             <a:fld id="{1900F6BE-B067-BE42-AE82-598173A6B0F9}" type="datetimeFigureOut">
               <a:rPr lang="en-CA" smtClean="0"/>
-              <a:t>2025-11-11</a:t>
+              <a:t>2025-11-16</a:t>
             </a:fld>
             <a:endParaRPr lang="en-CA"/>
           </a:p>
@@ -2412,7 +2418,7 @@
           <a:p>
             <a:fld id="{1900F6BE-B067-BE42-AE82-598173A6B0F9}" type="datetimeFigureOut">
               <a:rPr lang="en-CA" smtClean="0"/>
-              <a:t>2025-11-11</a:t>
+              <a:t>2025-11-16</a:t>
             </a:fld>
             <a:endParaRPr lang="en-CA"/>
           </a:p>
@@ -2701,7 +2707,7 @@
           <a:p>
             <a:fld id="{1900F6BE-B067-BE42-AE82-598173A6B0F9}" type="datetimeFigureOut">
               <a:rPr lang="en-CA" smtClean="0"/>
-              <a:t>2025-11-11</a:t>
+              <a:t>2025-11-16</a:t>
             </a:fld>
             <a:endParaRPr lang="en-CA"/>
           </a:p>
@@ -2944,7 +2950,7 @@
           <a:p>
             <a:fld id="{1900F6BE-B067-BE42-AE82-598173A6B0F9}" type="datetimeFigureOut">
               <a:rPr lang="en-CA" smtClean="0"/>
-              <a:t>2025-11-11</a:t>
+              <a:t>2025-11-16</a:t>
             </a:fld>
             <a:endParaRPr lang="en-CA"/>
           </a:p>
@@ -4281,19 +4287,27 @@
           <a:lstStyle/>
           <a:p>
             <a:r>
-              <a:rPr lang="en-CA" dirty="0" err="1"/>
-              <a:t>动机</a:t>
+              <a:rPr lang="zh-CN" altLang="en-CA" dirty="0"/>
+              <a:t>背景</a:t>
             </a:r>
             <a:r>
               <a:rPr lang="zh-CN" altLang="en-US" dirty="0"/>
-              <a:t>：法律会变。</a:t>
+              <a:t>：现有 </a:t>
+            </a:r>
+            <a:r>
+              <a:rPr lang="en-US" altLang="zh-CN" dirty="0"/>
+              <a:t>LJP </a:t>
+            </a:r>
+            <a:r>
+              <a:rPr lang="zh-CN" altLang="en-US" dirty="0"/>
+              <a:t>模型通常假设法律静态不变，只在固定版本的法条上训练和评测。</a:t>
             </a:r>
             <a:endParaRPr lang="en-US" altLang="zh-CN" dirty="0"/>
           </a:p>
           <a:p>
             <a:r>
               <a:rPr lang="zh-CN" altLang="en-US" dirty="0"/>
-              <a:t>思路：同一案件事实，在旧法和新法下能不能给出符合当前版本的判决结果。</a:t>
+              <a:t>现实：法条持续修订，同一事实在旧法与新法下的判决可能完全不同（例如“有毒物质”变为“有毒或放射性物质”导致无罪变有罪）。</a:t>
             </a:r>
             <a:endParaRPr lang="en-US" altLang="zh-CN" dirty="0"/>
           </a:p>
@@ -4317,14 +4331,6 @@
             <a:r>
               <a:rPr lang="zh-CN" altLang="en-US" dirty="0"/>
               <a:t>细粒度功能点，功能点符合实际法条更新情况。</a:t>
-            </a:r>
-            <a:endParaRPr lang="en-US" altLang="zh-CN" dirty="0"/>
-          </a:p>
-          <a:p>
-            <a:pPr lvl="1"/>
-            <a:r>
-              <a:rPr lang="zh-CN" altLang="en-US" dirty="0"/>
-              <a:t>如何解决？</a:t>
             </a:r>
             <a:endParaRPr lang="en-CA" dirty="0"/>
           </a:p>
@@ -4365,7 +4371,7 @@
           <p:cNvPr id="2" name="标题 1">
             <a:extLst>
               <a:ext uri="{FF2B5EF4-FFF2-40B4-BE49-F238E27FC236}">
-                <a16:creationId xmlns:a16="http://schemas.microsoft.com/office/drawing/2014/main" id="{16C24E9E-08B6-B96B-3385-508B3B0F0ABF}"/>
+                <a16:creationId xmlns:a16="http://schemas.microsoft.com/office/drawing/2014/main" id="{4C319767-5417-6F49-0874-7E5C7E682883}"/>
               </a:ext>
             </a:extLst>
           </p:cNvPr>
@@ -4382,30 +4388,14 @@
           <a:lstStyle/>
           <a:p>
             <a:r>
-              <a:rPr lang="en-CA" dirty="0">
-                <a:latin typeface="Times New Roman" panose="02020603050405020304" pitchFamily="18" charset="0"/>
-                <a:cs typeface="Times New Roman" panose="02020603050405020304" pitchFamily="18" charset="0"/>
-              </a:rPr>
-              <a:t>Next?</a:t>
-            </a:r>
-            <a:r>
-              <a:rPr lang="zh-CN" altLang="en-US" dirty="0">
-                <a:latin typeface="Times New Roman" panose="02020603050405020304" pitchFamily="18" charset="0"/>
-                <a:cs typeface="Times New Roman" panose="02020603050405020304" pitchFamily="18" charset="0"/>
-              </a:rPr>
-              <a:t> </a:t>
-            </a:r>
-            <a:r>
-              <a:rPr lang="en-US" altLang="zh-CN" dirty="0">
-                <a:latin typeface="Times New Roman" panose="02020603050405020304" pitchFamily="18" charset="0"/>
-                <a:cs typeface="Times New Roman" panose="02020603050405020304" pitchFamily="18" charset="0"/>
-              </a:rPr>
-              <a:t>Raw!</a:t>
-            </a:r>
-            <a:endParaRPr lang="en-CA" dirty="0">
-              <a:latin typeface="Times New Roman" panose="02020603050405020304" pitchFamily="18" charset="0"/>
-              <a:cs typeface="Times New Roman" panose="02020603050405020304" pitchFamily="18" charset="0"/>
-            </a:endParaRPr>
+              <a:rPr kumimoji="1" lang="en-US" altLang="zh-CN" dirty="0" err="1"/>
+              <a:t>LawShift</a:t>
+            </a:r>
+            <a:r>
+              <a:rPr kumimoji="1" lang="en-US" altLang="zh-CN" dirty="0"/>
+              <a:t> (cont.)</a:t>
+            </a:r>
+            <a:endParaRPr kumimoji="1" lang="zh-CN" altLang="en-US" dirty="0"/>
           </a:p>
         </p:txBody>
       </p:sp>
@@ -4414,7 +4404,7 @@
           <p:cNvPr id="3" name="内容占位符 2">
             <a:extLst>
               <a:ext uri="{FF2B5EF4-FFF2-40B4-BE49-F238E27FC236}">
-                <a16:creationId xmlns:a16="http://schemas.microsoft.com/office/drawing/2014/main" id="{88D38D43-E894-0BC1-922D-B0A31B6C701D}"/>
+                <a16:creationId xmlns:a16="http://schemas.microsoft.com/office/drawing/2014/main" id="{1F956345-2EFD-7DA0-FB39-1B9ED7A69D28}"/>
               </a:ext>
             </a:extLst>
           </p:cNvPr>
@@ -4431,162 +4421,896 @@
           <a:lstStyle/>
           <a:p>
             <a:r>
-              <a:rPr lang="en-CA" dirty="0" err="1">
-                <a:latin typeface="Times New Roman" panose="02020603050405020304" pitchFamily="18" charset="0"/>
-                <a:cs typeface="Times New Roman" panose="02020603050405020304" pitchFamily="18" charset="0"/>
-              </a:rPr>
-              <a:t>从LawShift来</a:t>
-            </a:r>
-            <a:r>
-              <a:rPr lang="zh-CN" altLang="en-US" dirty="0">
-                <a:latin typeface="Times New Roman" panose="02020603050405020304" pitchFamily="18" charset="0"/>
-                <a:cs typeface="Times New Roman" panose="02020603050405020304" pitchFamily="18" charset="0"/>
-              </a:rPr>
-              <a:t>：通过知识编辑更新模型（</a:t>
-            </a:r>
-            <a:r>
-              <a:rPr lang="en-US" altLang="zh-CN" dirty="0">
-                <a:latin typeface="Times New Roman" panose="02020603050405020304" pitchFamily="18" charset="0"/>
-                <a:cs typeface="Times New Roman" panose="02020603050405020304" pitchFamily="18" charset="0"/>
-              </a:rPr>
-              <a:t>Beyond</a:t>
-            </a:r>
-            <a:r>
-              <a:rPr lang="zh-CN" altLang="en-US" dirty="0">
-                <a:latin typeface="Times New Roman" panose="02020603050405020304" pitchFamily="18" charset="0"/>
-                <a:cs typeface="Times New Roman" panose="02020603050405020304" pitchFamily="18" charset="0"/>
-              </a:rPr>
-              <a:t>法律领域）。</a:t>
-            </a:r>
-            <a:endParaRPr lang="en-US" altLang="zh-CN" dirty="0">
-              <a:latin typeface="Times New Roman" panose="02020603050405020304" pitchFamily="18" charset="0"/>
-              <a:cs typeface="Times New Roman" panose="02020603050405020304" pitchFamily="18" charset="0"/>
-            </a:endParaRPr>
+              <a:rPr kumimoji="1" lang="zh-CN" altLang="en-US" dirty="0"/>
+              <a:t>法律条文视作一个知识，符合法律条文的</a:t>
+            </a:r>
+            <a:r>
+              <a:rPr kumimoji="1" lang="en-US" altLang="zh-CN" dirty="0"/>
+              <a:t>template</a:t>
+            </a:r>
+            <a:r>
+              <a:rPr kumimoji="1" lang="zh-CN" altLang="en-US" dirty="0"/>
+              <a:t>。</a:t>
+            </a:r>
+            <a:endParaRPr kumimoji="1" lang="en-US" altLang="zh-CN" dirty="0"/>
+          </a:p>
+          <a:p>
+            <a:r>
+              <a:rPr kumimoji="1" lang="zh-CN" altLang="en-US" dirty="0"/>
+              <a:t>这个</a:t>
+            </a:r>
+            <a:r>
+              <a:rPr kumimoji="1" lang="en-US" altLang="zh-CN" dirty="0"/>
+              <a:t>template</a:t>
+            </a:r>
+            <a:r>
+              <a:rPr kumimoji="1" lang="zh-CN" altLang="en-US" dirty="0"/>
+              <a:t>的每个</a:t>
+            </a:r>
+            <a:r>
+              <a:rPr kumimoji="1" lang="en-US" altLang="zh-CN" dirty="0"/>
+              <a:t>component</a:t>
+            </a:r>
+            <a:r>
+              <a:rPr kumimoji="1" lang="zh-CN" altLang="en-US" dirty="0"/>
+              <a:t>固定类型的变化，组成了法条实际的变化。</a:t>
+            </a:r>
+            <a:endParaRPr kumimoji="1" lang="en-US" altLang="zh-CN" dirty="0"/>
+          </a:p>
+          <a:p>
+            <a:r>
+              <a:rPr kumimoji="1" lang="zh-CN" altLang="en-US" dirty="0"/>
+              <a:t>测试集设计：</a:t>
+            </a:r>
+            <a:endParaRPr kumimoji="1" lang="en-US" altLang="zh-CN" dirty="0"/>
           </a:p>
           <a:p>
             <a:pPr lvl="1"/>
             <a:r>
-              <a:rPr lang="zh-CN" altLang="en-US" dirty="0">
-                <a:latin typeface="Times New Roman" panose="02020603050405020304" pitchFamily="18" charset="0"/>
-                <a:cs typeface="Times New Roman" panose="02020603050405020304" pitchFamily="18" charset="0"/>
-              </a:rPr>
-              <a:t>知识定位。</a:t>
-            </a:r>
-            <a:endParaRPr lang="en-US" altLang="zh-CN" dirty="0">
-              <a:latin typeface="Times New Roman" panose="02020603050405020304" pitchFamily="18" charset="0"/>
-              <a:cs typeface="Times New Roman" panose="02020603050405020304" pitchFamily="18" charset="0"/>
-            </a:endParaRPr>
+              <a:rPr kumimoji="1" lang="zh-CN" altLang="en-US" dirty="0"/>
+              <a:t>法条解构：六个部分（</a:t>
+            </a:r>
+            <a:r>
+              <a:rPr kumimoji="1" lang="en-US" altLang="zh-CN" dirty="0"/>
+              <a:t>5</a:t>
+            </a:r>
+            <a:r>
+              <a:rPr kumimoji="1" lang="zh-CN" altLang="en-US" dirty="0"/>
+              <a:t>构成要件，</a:t>
+            </a:r>
+            <a:r>
+              <a:rPr kumimoji="1" lang="en-US" altLang="zh-CN" dirty="0"/>
+              <a:t>1</a:t>
+            </a:r>
+            <a:r>
+              <a:rPr kumimoji="1" lang="zh-CN" altLang="en-US" dirty="0"/>
+              <a:t>法律后果）。</a:t>
+            </a:r>
+            <a:endParaRPr kumimoji="1" lang="en-US" altLang="zh-CN" dirty="0"/>
           </a:p>
           <a:p>
             <a:pPr lvl="1"/>
             <a:r>
-              <a:rPr lang="zh-CN" altLang="en-US" dirty="0">
-                <a:latin typeface="Times New Roman" panose="02020603050405020304" pitchFamily="18" charset="0"/>
-                <a:cs typeface="Times New Roman" panose="02020603050405020304" pitchFamily="18" charset="0"/>
-              </a:rPr>
-              <a:t>编辑本身（有效性</a:t>
-            </a:r>
-            <a:r>
-              <a:rPr lang="en-US" altLang="zh-CN" dirty="0">
-                <a:latin typeface="Times New Roman" panose="02020603050405020304" pitchFamily="18" charset="0"/>
-                <a:cs typeface="Times New Roman" panose="02020603050405020304" pitchFamily="18" charset="0"/>
-              </a:rPr>
-              <a:t>/</a:t>
-            </a:r>
-            <a:r>
-              <a:rPr lang="zh-CN" altLang="en-US" dirty="0">
-                <a:latin typeface="Times New Roman" panose="02020603050405020304" pitchFamily="18" charset="0"/>
-                <a:cs typeface="Times New Roman" panose="02020603050405020304" pitchFamily="18" charset="0"/>
-              </a:rPr>
-              <a:t>局部性</a:t>
-            </a:r>
-            <a:r>
-              <a:rPr lang="en-US" altLang="zh-CN" dirty="0">
-                <a:latin typeface="Times New Roman" panose="02020603050405020304" pitchFamily="18" charset="0"/>
-                <a:cs typeface="Times New Roman" panose="02020603050405020304" pitchFamily="18" charset="0"/>
-              </a:rPr>
-              <a:t>/</a:t>
-            </a:r>
-            <a:r>
-              <a:rPr lang="zh-CN" altLang="en-US" dirty="0">
-                <a:latin typeface="Times New Roman" panose="02020603050405020304" pitchFamily="18" charset="0"/>
-                <a:cs typeface="Times New Roman" panose="02020603050405020304" pitchFamily="18" charset="0"/>
-              </a:rPr>
-              <a:t>可推理</a:t>
-            </a:r>
-            <a:r>
-              <a:rPr lang="en-US" altLang="zh-CN" dirty="0">
-                <a:latin typeface="Times New Roman" panose="02020603050405020304" pitchFamily="18" charset="0"/>
-                <a:cs typeface="Times New Roman" panose="02020603050405020304" pitchFamily="18" charset="0"/>
-              </a:rPr>
-              <a:t>/</a:t>
-            </a:r>
-            <a:r>
-              <a:rPr lang="zh-CN" altLang="en-US" dirty="0">
-                <a:latin typeface="Times New Roman" panose="02020603050405020304" pitchFamily="18" charset="0"/>
-                <a:cs typeface="Times New Roman" panose="02020603050405020304" pitchFamily="18" charset="0"/>
-              </a:rPr>
-              <a:t>可串行）。</a:t>
-            </a:r>
-            <a:endParaRPr lang="en-US" altLang="zh-CN" dirty="0">
-              <a:latin typeface="Times New Roman" panose="02020603050405020304" pitchFamily="18" charset="0"/>
-              <a:cs typeface="Times New Roman" panose="02020603050405020304" pitchFamily="18" charset="0"/>
-            </a:endParaRPr>
-          </a:p>
-          <a:p>
-            <a:r>
-              <a:rPr lang="zh-CN" altLang="en-US" dirty="0">
-                <a:latin typeface="Times New Roman" panose="02020603050405020304" pitchFamily="18" charset="0"/>
-                <a:cs typeface="Times New Roman" panose="02020603050405020304" pitchFamily="18" charset="0"/>
-              </a:rPr>
-              <a:t>在这个框架下：</a:t>
-            </a:r>
-            <a:endParaRPr lang="en-US" altLang="zh-CN" dirty="0">
-              <a:latin typeface="Times New Roman" panose="02020603050405020304" pitchFamily="18" charset="0"/>
-              <a:cs typeface="Times New Roman" panose="02020603050405020304" pitchFamily="18" charset="0"/>
-            </a:endParaRPr>
+              <a:rPr kumimoji="1" lang="zh-CN" altLang="en-US" dirty="0"/>
+              <a:t>修订维度：范围变动，条件变动，刑期变动。</a:t>
+            </a:r>
+            <a:endParaRPr kumimoji="1" lang="en-US" altLang="zh-CN" dirty="0"/>
           </a:p>
           <a:p>
             <a:pPr lvl="1"/>
             <a:r>
-              <a:rPr lang="zh-CN" altLang="en-US" dirty="0">
-                <a:latin typeface="Times New Roman" panose="02020603050405020304" pitchFamily="18" charset="0"/>
-                <a:cs typeface="Times New Roman" panose="02020603050405020304" pitchFamily="18" charset="0"/>
-              </a:rPr>
-              <a:t>把一次回答拆成循环：按照任务</a:t>
-            </a:r>
-            <a:r>
-              <a:rPr lang="en-US" altLang="zh-CN" dirty="0">
-                <a:latin typeface="Times New Roman" panose="02020603050405020304" pitchFamily="18" charset="0"/>
-                <a:cs typeface="Times New Roman" panose="02020603050405020304" pitchFamily="18" charset="0"/>
-              </a:rPr>
-              <a:t>schema</a:t>
-            </a:r>
-            <a:r>
-              <a:rPr lang="zh-CN" altLang="en-US" dirty="0">
-                <a:latin typeface="Times New Roman" panose="02020603050405020304" pitchFamily="18" charset="0"/>
-                <a:cs typeface="Times New Roman" panose="02020603050405020304" pitchFamily="18" charset="0"/>
-              </a:rPr>
-              <a:t>规划原子步，激活对应知识片段（定位后的），生成一小段，并交验该步是否正确运用知识。</a:t>
-            </a:r>
-            <a:endParaRPr lang="en-US" altLang="zh-CN" dirty="0">
-              <a:latin typeface="Times New Roman" panose="02020603050405020304" pitchFamily="18" charset="0"/>
-              <a:cs typeface="Times New Roman" panose="02020603050405020304" pitchFamily="18" charset="0"/>
-            </a:endParaRPr>
-          </a:p>
-          <a:p>
-            <a:pPr lvl="1"/>
-            <a:endParaRPr lang="en-CA" dirty="0">
-              <a:latin typeface="Times New Roman" panose="02020603050405020304" pitchFamily="18" charset="0"/>
-              <a:cs typeface="Times New Roman" panose="02020603050405020304" pitchFamily="18" charset="0"/>
-            </a:endParaRPr>
+              <a:rPr kumimoji="1" lang="zh-CN" altLang="en-US" dirty="0"/>
+              <a:t>最终形成覆盖六个组件、</a:t>
+            </a:r>
+            <a:r>
+              <a:rPr kumimoji="1" lang="en-US" altLang="zh-CN" dirty="0"/>
+              <a:t>31</a:t>
+            </a:r>
+            <a:r>
+              <a:rPr kumimoji="1" lang="zh-CN" altLang="en-US" dirty="0"/>
+              <a:t>种细粒度修订类型的</a:t>
+            </a:r>
+            <a:r>
+              <a:rPr kumimoji="1" lang="en-US" altLang="zh-CN" dirty="0"/>
+              <a:t>taxonomy</a:t>
+            </a:r>
+            <a:r>
+              <a:rPr kumimoji="1" lang="zh-CN" altLang="en-US" dirty="0"/>
+              <a:t>。</a:t>
+            </a:r>
+            <a:endParaRPr kumimoji="1" lang="en-US" altLang="zh-CN" dirty="0"/>
           </a:p>
         </p:txBody>
       </p:sp>
     </p:spTree>
     <p:extLst>
       <p:ext uri="{BB962C8B-B14F-4D97-AF65-F5344CB8AC3E}">
-        <p14:creationId xmlns:p14="http://schemas.microsoft.com/office/powerpoint/2010/main" val="513386680"/>
+        <p14:creationId xmlns:p14="http://schemas.microsoft.com/office/powerpoint/2010/main" val="3961300745"/>
+      </p:ext>
+    </p:extLst>
+  </p:cSld>
+  <p:clrMapOvr>
+    <a:masterClrMapping/>
+  </p:clrMapOvr>
+</p:sld>
+</file>
+
+<file path=ppt/slides/slide16.xml><?xml version="1.0" encoding="utf-8"?>
+<p:sld xmlns:a="http://schemas.openxmlformats.org/drawingml/2006/main" xmlns:r="http://schemas.openxmlformats.org/officeDocument/2006/relationships" xmlns:p="http://schemas.openxmlformats.org/presentationml/2006/main">
+  <p:cSld>
+    <p:spTree>
+      <p:nvGrpSpPr>
+        <p:cNvPr id="1" name=""/>
+        <p:cNvGrpSpPr/>
+        <p:nvPr/>
+      </p:nvGrpSpPr>
+      <p:grpSpPr>
+        <a:xfrm>
+          <a:off x="0" y="0"/>
+          <a:ext cx="0" cy="0"/>
+          <a:chOff x="0" y="0"/>
+          <a:chExt cx="0" cy="0"/>
+        </a:xfrm>
+      </p:grpSpPr>
+      <p:sp>
+        <p:nvSpPr>
+          <p:cNvPr id="2" name="标题 1">
+            <a:extLst>
+              <a:ext uri="{FF2B5EF4-FFF2-40B4-BE49-F238E27FC236}">
+                <a16:creationId xmlns:a16="http://schemas.microsoft.com/office/drawing/2014/main" id="{A3A2A835-02E0-6E62-E24F-194A7C0ED8BF}"/>
+              </a:ext>
+            </a:extLst>
+          </p:cNvPr>
+          <p:cNvSpPr>
+            <a:spLocks noGrp="1"/>
+          </p:cNvSpPr>
+          <p:nvPr>
+            <p:ph type="title"/>
+          </p:nvPr>
+        </p:nvSpPr>
+        <p:spPr/>
+        <p:txBody>
+          <a:bodyPr/>
+          <a:lstStyle/>
+          <a:p>
+            <a:r>
+              <a:rPr kumimoji="1" lang="en-US" altLang="zh-CN" dirty="0" err="1"/>
+              <a:t>LawShift</a:t>
+            </a:r>
+            <a:r>
+              <a:rPr kumimoji="1" lang="en-US" altLang="zh-CN" dirty="0"/>
+              <a:t> (cont.)</a:t>
+            </a:r>
+            <a:endParaRPr kumimoji="1" lang="zh-CN" altLang="en-US" dirty="0"/>
+          </a:p>
+        </p:txBody>
+      </p:sp>
+      <p:sp>
+        <p:nvSpPr>
+          <p:cNvPr id="3" name="内容占位符 2">
+            <a:extLst>
+              <a:ext uri="{FF2B5EF4-FFF2-40B4-BE49-F238E27FC236}">
+                <a16:creationId xmlns:a16="http://schemas.microsoft.com/office/drawing/2014/main" id="{A879CA27-9DC9-F518-9AEC-2071CC7ED0E0}"/>
+              </a:ext>
+            </a:extLst>
+          </p:cNvPr>
+          <p:cNvSpPr>
+            <a:spLocks noGrp="1"/>
+          </p:cNvSpPr>
+          <p:nvPr>
+            <p:ph idx="1"/>
+          </p:nvPr>
+        </p:nvSpPr>
+        <p:spPr/>
+        <p:txBody>
+          <a:bodyPr/>
+          <a:lstStyle/>
+          <a:p>
+            <a:r>
+              <a:rPr kumimoji="1" lang="zh-CN" altLang="en-US" dirty="0"/>
+              <a:t>评测方法：蜕变测试。没有金标准，也能够测试“有没有按照新法的逻辑判决”。</a:t>
+            </a:r>
+            <a:endParaRPr kumimoji="1" lang="en-US" altLang="zh-CN" dirty="0"/>
+          </a:p>
+          <a:p>
+            <a:pPr lvl="1"/>
+            <a:r>
+              <a:rPr kumimoji="1" lang="zh-CN" altLang="en-US" dirty="0"/>
+              <a:t>传统测评：依赖固定标签，但在新法刚修订时，往往没有真实判决案例，难以构造金标准。</a:t>
+            </a:r>
+            <a:endParaRPr kumimoji="1" lang="en-US" altLang="zh-CN" dirty="0"/>
+          </a:p>
+          <a:p>
+            <a:r>
+              <a:rPr kumimoji="1" lang="zh-CN" altLang="en-US" dirty="0"/>
+              <a:t>测试思路：</a:t>
+            </a:r>
+            <a:endParaRPr kumimoji="1" lang="en-US" altLang="zh-CN" dirty="0"/>
+          </a:p>
+          <a:p>
+            <a:pPr lvl="1"/>
+            <a:r>
+              <a:rPr kumimoji="1" lang="zh-CN" altLang="en-US" dirty="0"/>
+              <a:t>旧法条</a:t>
+            </a:r>
+            <a:r>
+              <a:rPr kumimoji="1" lang="en-US" altLang="zh-CN" dirty="0"/>
+              <a:t>+</a:t>
+            </a:r>
+            <a:r>
+              <a:rPr kumimoji="1" lang="zh-CN" altLang="en-US" dirty="0"/>
+              <a:t>原事实：旧预测。</a:t>
+            </a:r>
+            <a:endParaRPr kumimoji="1" lang="en-US" altLang="zh-CN" dirty="0"/>
+          </a:p>
+          <a:p>
+            <a:pPr lvl="1"/>
+            <a:r>
+              <a:rPr kumimoji="1" lang="zh-CN" altLang="en-US" dirty="0"/>
+              <a:t>新法条</a:t>
+            </a:r>
+            <a:r>
+              <a:rPr kumimoji="1" lang="en-US" altLang="zh-CN" dirty="0"/>
+              <a:t>+</a:t>
+            </a:r>
+            <a:r>
+              <a:rPr kumimoji="1" lang="zh-CN" altLang="en-US" dirty="0"/>
+              <a:t>微调后事实：期望新预测。</a:t>
+            </a:r>
+            <a:endParaRPr kumimoji="1" lang="en-US" altLang="zh-CN" dirty="0"/>
+          </a:p>
+        </p:txBody>
+      </p:sp>
+    </p:spTree>
+    <p:extLst>
+      <p:ext uri="{BB962C8B-B14F-4D97-AF65-F5344CB8AC3E}">
+        <p14:creationId xmlns:p14="http://schemas.microsoft.com/office/powerpoint/2010/main" val="1368157353"/>
+      </p:ext>
+    </p:extLst>
+  </p:cSld>
+  <p:clrMapOvr>
+    <a:masterClrMapping/>
+  </p:clrMapOvr>
+</p:sld>
+</file>
+
+<file path=ppt/slides/slide17.xml><?xml version="1.0" encoding="utf-8"?>
+<p:sld xmlns:a="http://schemas.openxmlformats.org/drawingml/2006/main" xmlns:r="http://schemas.openxmlformats.org/officeDocument/2006/relationships" xmlns:p="http://schemas.openxmlformats.org/presentationml/2006/main">
+  <p:cSld>
+    <p:spTree>
+      <p:nvGrpSpPr>
+        <p:cNvPr id="1" name=""/>
+        <p:cNvGrpSpPr/>
+        <p:nvPr/>
+      </p:nvGrpSpPr>
+      <p:grpSpPr>
+        <a:xfrm>
+          <a:off x="0" y="0"/>
+          <a:ext cx="0" cy="0"/>
+          <a:chOff x="0" y="0"/>
+          <a:chExt cx="0" cy="0"/>
+        </a:xfrm>
+      </p:grpSpPr>
+      <p:sp>
+        <p:nvSpPr>
+          <p:cNvPr id="2" name="标题 1">
+            <a:extLst>
+              <a:ext uri="{FF2B5EF4-FFF2-40B4-BE49-F238E27FC236}">
+                <a16:creationId xmlns:a16="http://schemas.microsoft.com/office/drawing/2014/main" id="{B712E4DB-7FF4-44C0-276F-29BA7A7BF096}"/>
+              </a:ext>
+            </a:extLst>
+          </p:cNvPr>
+          <p:cNvSpPr>
+            <a:spLocks noGrp="1"/>
+          </p:cNvSpPr>
+          <p:nvPr>
+            <p:ph type="title"/>
+          </p:nvPr>
+        </p:nvSpPr>
+        <p:spPr/>
+        <p:txBody>
+          <a:bodyPr/>
+          <a:lstStyle/>
+          <a:p>
+            <a:r>
+              <a:rPr kumimoji="1" lang="en-US" altLang="zh-CN" dirty="0" err="1"/>
+              <a:t>LawShift</a:t>
+            </a:r>
+            <a:r>
+              <a:rPr kumimoji="1" lang="en-US" altLang="zh-CN" dirty="0"/>
+              <a:t> (cont.)</a:t>
+            </a:r>
+            <a:endParaRPr kumimoji="1" lang="zh-CN" altLang="en-US" dirty="0"/>
+          </a:p>
+        </p:txBody>
+      </p:sp>
+      <p:sp>
+        <p:nvSpPr>
+          <p:cNvPr id="3" name="内容占位符 2">
+            <a:extLst>
+              <a:ext uri="{FF2B5EF4-FFF2-40B4-BE49-F238E27FC236}">
+                <a16:creationId xmlns:a16="http://schemas.microsoft.com/office/drawing/2014/main" id="{78C9441F-2CD1-130B-CFB4-59645B90431F}"/>
+              </a:ext>
+            </a:extLst>
+          </p:cNvPr>
+          <p:cNvSpPr>
+            <a:spLocks noGrp="1"/>
+          </p:cNvSpPr>
+          <p:nvPr>
+            <p:ph idx="1"/>
+          </p:nvPr>
+        </p:nvSpPr>
+        <p:spPr/>
+        <p:txBody>
+          <a:bodyPr>
+            <a:normAutofit lnSpcReduction="10000"/>
+          </a:bodyPr>
+          <a:lstStyle/>
+          <a:p>
+            <a:r>
+              <a:rPr kumimoji="1" lang="zh-CN" altLang="en-US" dirty="0"/>
+              <a:t>数据来源：中国裁判文书网</a:t>
+            </a:r>
+            <a:r>
+              <a:rPr kumimoji="1" lang="en-US" altLang="zh-CN" dirty="0"/>
+              <a:t>CJO</a:t>
+            </a:r>
+            <a:r>
+              <a:rPr kumimoji="1" lang="zh-CN" altLang="en-US" dirty="0"/>
+              <a:t>的文书。选用</a:t>
+            </a:r>
+            <a:r>
+              <a:rPr kumimoji="1" lang="en-US" altLang="zh-CN" dirty="0"/>
+              <a:t>2017/11/4-2021/2/28</a:t>
+            </a:r>
+            <a:r>
+              <a:rPr kumimoji="1" lang="zh-CN" altLang="en-US" dirty="0"/>
+              <a:t>期间的案件，确保在同一班刑法框架下裁判。</a:t>
+            </a:r>
+            <a:endParaRPr kumimoji="1" lang="en-US" altLang="zh-CN" dirty="0"/>
+          </a:p>
+          <a:p>
+            <a:r>
+              <a:rPr kumimoji="1" lang="zh-CN" altLang="en-US" dirty="0"/>
+              <a:t>每个测试实例包括三部分：</a:t>
+            </a:r>
+            <a:endParaRPr kumimoji="1" lang="en-US" altLang="zh-CN" dirty="0"/>
+          </a:p>
+          <a:p>
+            <a:pPr lvl="1"/>
+            <a:r>
+              <a:rPr kumimoji="1" lang="zh-CN" altLang="en-US" dirty="0"/>
+              <a:t>一对法条：修订前、修订后的版本。</a:t>
+            </a:r>
+            <a:endParaRPr kumimoji="1" lang="en-US" altLang="zh-CN" dirty="0"/>
+          </a:p>
+          <a:p>
+            <a:pPr lvl="1"/>
+            <a:r>
+              <a:rPr kumimoji="1" lang="zh-CN" altLang="en-US" dirty="0"/>
+              <a:t>一对事实描述：原始事实、编辑后的事实。</a:t>
+            </a:r>
+            <a:endParaRPr kumimoji="1" lang="en-US" altLang="zh-CN" dirty="0"/>
+          </a:p>
+          <a:p>
+            <a:pPr lvl="1"/>
+            <a:r>
+              <a:rPr kumimoji="1" lang="zh-CN" altLang="en-US" dirty="0"/>
+              <a:t>一个与修订后法条对其的期望输出。</a:t>
+            </a:r>
+            <a:endParaRPr kumimoji="1" lang="en-US" altLang="zh-CN" dirty="0"/>
+          </a:p>
+          <a:p>
+            <a:r>
+              <a:rPr kumimoji="1" lang="zh-CN" altLang="en-US" dirty="0"/>
+              <a:t>事实编辑策略：</a:t>
+            </a:r>
+            <a:endParaRPr kumimoji="1" lang="en-US" altLang="zh-CN" dirty="0"/>
+          </a:p>
+          <a:p>
+            <a:pPr lvl="1"/>
+            <a:r>
+              <a:rPr kumimoji="1" lang="zh-CN" altLang="en-US" dirty="0"/>
+              <a:t>规则扰动：用正则</a:t>
+            </a:r>
+            <a:r>
+              <a:rPr kumimoji="1" lang="en-US" altLang="zh-CN" dirty="0"/>
+              <a:t>+</a:t>
+            </a:r>
+            <a:r>
+              <a:rPr kumimoji="1" lang="zh-CN" altLang="en-US" dirty="0"/>
+              <a:t>短语表替换主体、课题、条件等。</a:t>
+            </a:r>
+            <a:endParaRPr kumimoji="1" lang="en-US" altLang="zh-CN" dirty="0"/>
+          </a:p>
+          <a:p>
+            <a:pPr lvl="1"/>
+            <a:r>
+              <a:rPr kumimoji="1" lang="en-US" altLang="zh-CN" dirty="0"/>
+              <a:t>LLM</a:t>
+            </a:r>
+            <a:r>
+              <a:rPr kumimoji="1" lang="zh-CN" altLang="en-US" dirty="0"/>
+              <a:t>生成：对于行为类嵌在事件叙事里的成分，用</a:t>
+            </a:r>
+            <a:r>
+              <a:rPr kumimoji="1" lang="en-US" altLang="zh-CN" dirty="0"/>
+              <a:t>GPT-4o</a:t>
+            </a:r>
+            <a:r>
+              <a:rPr kumimoji="1" lang="zh-CN" altLang="en-US" dirty="0"/>
+              <a:t>按样例</a:t>
+            </a:r>
+            <a:r>
+              <a:rPr kumimoji="1" lang="en-US" altLang="zh-CN" dirty="0"/>
+              <a:t>one-shot</a:t>
+            </a:r>
+            <a:r>
+              <a:rPr kumimoji="1" lang="zh-CN" altLang="en-US" dirty="0"/>
+              <a:t>生成事实。</a:t>
+            </a:r>
+            <a:endParaRPr kumimoji="1" lang="en-US" altLang="zh-CN" dirty="0"/>
+          </a:p>
+          <a:p>
+            <a:pPr lvl="1"/>
+            <a:r>
+              <a:rPr kumimoji="1" lang="zh-CN" altLang="en-US" dirty="0"/>
+              <a:t>直接复用：刑期修订只改法条，不改事实。</a:t>
+            </a:r>
+          </a:p>
+        </p:txBody>
+      </p:sp>
+    </p:spTree>
+    <p:extLst>
+      <p:ext uri="{BB962C8B-B14F-4D97-AF65-F5344CB8AC3E}">
+        <p14:creationId xmlns:p14="http://schemas.microsoft.com/office/powerpoint/2010/main" val="1657204917"/>
+      </p:ext>
+    </p:extLst>
+  </p:cSld>
+  <p:clrMapOvr>
+    <a:masterClrMapping/>
+  </p:clrMapOvr>
+</p:sld>
+</file>
+
+<file path=ppt/slides/slide18.xml><?xml version="1.0" encoding="utf-8"?>
+<p:sld xmlns:a="http://schemas.openxmlformats.org/drawingml/2006/main" xmlns:r="http://schemas.openxmlformats.org/officeDocument/2006/relationships" xmlns:p="http://schemas.openxmlformats.org/presentationml/2006/main">
+  <p:cSld>
+    <p:spTree>
+      <p:nvGrpSpPr>
+        <p:cNvPr id="1" name=""/>
+        <p:cNvGrpSpPr/>
+        <p:nvPr/>
+      </p:nvGrpSpPr>
+      <p:grpSpPr>
+        <a:xfrm>
+          <a:off x="0" y="0"/>
+          <a:ext cx="0" cy="0"/>
+          <a:chOff x="0" y="0"/>
+          <a:chExt cx="0" cy="0"/>
+        </a:xfrm>
+      </p:grpSpPr>
+      <p:sp>
+        <p:nvSpPr>
+          <p:cNvPr id="2" name="标题 1">
+            <a:extLst>
+              <a:ext uri="{FF2B5EF4-FFF2-40B4-BE49-F238E27FC236}">
+                <a16:creationId xmlns:a16="http://schemas.microsoft.com/office/drawing/2014/main" id="{DAE38686-B9BC-E801-BEF8-6BF0545B2223}"/>
+              </a:ext>
+            </a:extLst>
+          </p:cNvPr>
+          <p:cNvSpPr>
+            <a:spLocks noGrp="1"/>
+          </p:cNvSpPr>
+          <p:nvPr>
+            <p:ph type="title"/>
+          </p:nvPr>
+        </p:nvSpPr>
+        <p:spPr/>
+        <p:txBody>
+          <a:bodyPr/>
+          <a:lstStyle/>
+          <a:p>
+            <a:r>
+              <a:rPr kumimoji="1" lang="en-US" altLang="zh-CN" dirty="0" err="1"/>
+              <a:t>LawShift</a:t>
+            </a:r>
+            <a:r>
+              <a:rPr kumimoji="1" lang="en-US" altLang="zh-CN" dirty="0"/>
+              <a:t> (cont.)</a:t>
+            </a:r>
+            <a:endParaRPr kumimoji="1" lang="zh-CN" altLang="en-US" dirty="0"/>
+          </a:p>
+        </p:txBody>
+      </p:sp>
+      <p:sp>
+        <p:nvSpPr>
+          <p:cNvPr id="6" name="内容占位符 5">
+            <a:extLst>
+              <a:ext uri="{FF2B5EF4-FFF2-40B4-BE49-F238E27FC236}">
+                <a16:creationId xmlns:a16="http://schemas.microsoft.com/office/drawing/2014/main" id="{72F1A881-8FF9-4453-3EB4-16EEE3B9E497}"/>
+              </a:ext>
+            </a:extLst>
+          </p:cNvPr>
+          <p:cNvSpPr>
+            <a:spLocks noGrp="1"/>
+          </p:cNvSpPr>
+          <p:nvPr>
+            <p:ph idx="1"/>
+          </p:nvPr>
+        </p:nvSpPr>
+        <p:spPr>
+          <a:xfrm>
+            <a:off x="838200" y="1825625"/>
+            <a:ext cx="4023732" cy="4351338"/>
+          </a:xfrm>
+        </p:spPr>
+        <p:txBody>
+          <a:bodyPr>
+            <a:normAutofit lnSpcReduction="10000"/>
+          </a:bodyPr>
+          <a:lstStyle/>
+          <a:p>
+            <a:r>
+              <a:rPr lang="zh-CN" altLang="en-US" dirty="0"/>
+              <a:t>在</a:t>
+            </a:r>
+            <a:r>
+              <a:rPr lang="en-US" altLang="zh-CN" dirty="0"/>
+              <a:t>9</a:t>
+            </a:r>
+            <a:r>
+              <a:rPr lang="zh-CN" altLang="en-US" dirty="0"/>
+              <a:t>个基线模型上进行测试：</a:t>
+            </a:r>
+            <a:endParaRPr lang="en-US" altLang="zh-CN" dirty="0"/>
+          </a:p>
+          <a:p>
+            <a:pPr lvl="1"/>
+            <a:r>
+              <a:rPr lang="zh-CN" altLang="en-US" dirty="0"/>
+              <a:t>传统</a:t>
+            </a:r>
+            <a:r>
+              <a:rPr lang="en-US" altLang="zh-CN" dirty="0"/>
+              <a:t>LJP</a:t>
+            </a:r>
+            <a:r>
+              <a:rPr lang="zh-CN" altLang="en-US" dirty="0"/>
+              <a:t>模型</a:t>
+            </a:r>
+            <a:endParaRPr lang="en-US" altLang="zh-CN" dirty="0"/>
+          </a:p>
+          <a:p>
+            <a:pPr lvl="1"/>
+            <a:r>
+              <a:rPr lang="zh-CN" altLang="en-US" dirty="0"/>
+              <a:t>法律</a:t>
+            </a:r>
+            <a:r>
+              <a:rPr lang="en-US" altLang="zh-CN" dirty="0"/>
+              <a:t>PLM</a:t>
+            </a:r>
+          </a:p>
+          <a:p>
+            <a:pPr lvl="1"/>
+            <a:r>
+              <a:rPr lang="zh-CN" altLang="en-US" dirty="0"/>
+              <a:t>通用</a:t>
+            </a:r>
+            <a:r>
+              <a:rPr lang="en-US" altLang="zh-CN" dirty="0"/>
+              <a:t>LLM</a:t>
+            </a:r>
+          </a:p>
+          <a:p>
+            <a:pPr lvl="1"/>
+            <a:r>
+              <a:rPr lang="zh-CN" altLang="en-US" dirty="0"/>
+              <a:t>法律</a:t>
+            </a:r>
+            <a:r>
+              <a:rPr lang="en-US" altLang="zh-CN" dirty="0"/>
+              <a:t>LLM</a:t>
+            </a:r>
+          </a:p>
+          <a:p>
+            <a:r>
+              <a:rPr lang="en-US" altLang="zh-CN" dirty="0"/>
+              <a:t>Report</a:t>
+            </a:r>
+            <a:r>
+              <a:rPr lang="zh-CN" altLang="en-US" dirty="0"/>
+              <a:t>指标：</a:t>
+            </a:r>
+            <a:r>
+              <a:rPr lang="en-US" altLang="zh-CN" dirty="0"/>
+              <a:t>Pass</a:t>
+            </a:r>
+            <a:r>
+              <a:rPr lang="zh-CN" altLang="en-US" dirty="0"/>
+              <a:t> </a:t>
+            </a:r>
+            <a:r>
+              <a:rPr lang="en-US" altLang="zh-CN" dirty="0"/>
+              <a:t>Rate</a:t>
+            </a:r>
+            <a:r>
+              <a:rPr lang="zh-CN" altLang="en-US" dirty="0"/>
+              <a:t>，在某一修订类型的测试集中，模型输出满足预期关系的样本占比。</a:t>
+            </a:r>
+          </a:p>
+        </p:txBody>
+      </p:sp>
+      <p:pic>
+        <p:nvPicPr>
+          <p:cNvPr id="7" name="内容占位符 3">
+            <a:extLst>
+              <a:ext uri="{FF2B5EF4-FFF2-40B4-BE49-F238E27FC236}">
+                <a16:creationId xmlns:a16="http://schemas.microsoft.com/office/drawing/2014/main" id="{2325FE37-667F-0323-EDCC-2CEEC1A0DB49}"/>
+              </a:ext>
+            </a:extLst>
+          </p:cNvPr>
+          <p:cNvPicPr>
+            <a:picLocks noChangeAspect="1"/>
+          </p:cNvPicPr>
+          <p:nvPr/>
+        </p:nvPicPr>
+        <p:blipFill>
+          <a:blip r:embed="rId2"/>
+          <a:stretch>
+            <a:fillRect/>
+          </a:stretch>
+        </p:blipFill>
+        <p:spPr>
+          <a:xfrm>
+            <a:off x="6217319" y="131325"/>
+            <a:ext cx="5480309" cy="6595350"/>
+          </a:xfrm>
+          <a:prstGeom prst="rect">
+            <a:avLst/>
+          </a:prstGeom>
+        </p:spPr>
+      </p:pic>
+    </p:spTree>
+    <p:extLst>
+      <p:ext uri="{BB962C8B-B14F-4D97-AF65-F5344CB8AC3E}">
+        <p14:creationId xmlns:p14="http://schemas.microsoft.com/office/powerpoint/2010/main" val="725017392"/>
+      </p:ext>
+    </p:extLst>
+  </p:cSld>
+  <p:clrMapOvr>
+    <a:masterClrMapping/>
+  </p:clrMapOvr>
+</p:sld>
+</file>
+
+<file path=ppt/slides/slide19.xml><?xml version="1.0" encoding="utf-8"?>
+<p:sld xmlns:a="http://schemas.openxmlformats.org/drawingml/2006/main" xmlns:r="http://schemas.openxmlformats.org/officeDocument/2006/relationships" xmlns:p="http://schemas.openxmlformats.org/presentationml/2006/main">
+  <p:cSld>
+    <p:spTree>
+      <p:nvGrpSpPr>
+        <p:cNvPr id="1" name=""/>
+        <p:cNvGrpSpPr/>
+        <p:nvPr/>
+      </p:nvGrpSpPr>
+      <p:grpSpPr>
+        <a:xfrm>
+          <a:off x="0" y="0"/>
+          <a:ext cx="0" cy="0"/>
+          <a:chOff x="0" y="0"/>
+          <a:chExt cx="0" cy="0"/>
+        </a:xfrm>
+      </p:grpSpPr>
+      <p:sp>
+        <p:nvSpPr>
+          <p:cNvPr id="2" name="标题 1">
+            <a:extLst>
+              <a:ext uri="{FF2B5EF4-FFF2-40B4-BE49-F238E27FC236}">
+                <a16:creationId xmlns:a16="http://schemas.microsoft.com/office/drawing/2014/main" id="{3A51E80B-18CC-DCFB-758E-57369E626EA7}"/>
+              </a:ext>
+            </a:extLst>
+          </p:cNvPr>
+          <p:cNvSpPr>
+            <a:spLocks noGrp="1"/>
+          </p:cNvSpPr>
+          <p:nvPr>
+            <p:ph type="title"/>
+          </p:nvPr>
+        </p:nvSpPr>
+        <p:spPr/>
+        <p:txBody>
+          <a:bodyPr/>
+          <a:lstStyle/>
+          <a:p>
+            <a:r>
+              <a:rPr kumimoji="1" lang="en-US" altLang="zh-CN" dirty="0" err="1"/>
+              <a:t>LawShift</a:t>
+            </a:r>
+            <a:r>
+              <a:rPr kumimoji="1" lang="zh-CN" altLang="en-US" dirty="0"/>
+              <a:t> </a:t>
+            </a:r>
+            <a:r>
+              <a:rPr kumimoji="1" lang="en-US" altLang="zh-CN" dirty="0"/>
+              <a:t>(cont.)</a:t>
+            </a:r>
+            <a:endParaRPr kumimoji="1" lang="zh-CN" altLang="en-US" dirty="0"/>
+          </a:p>
+        </p:txBody>
+      </p:sp>
+      <p:sp>
+        <p:nvSpPr>
+          <p:cNvPr id="3" name="内容占位符 2">
+            <a:extLst>
+              <a:ext uri="{FF2B5EF4-FFF2-40B4-BE49-F238E27FC236}">
+                <a16:creationId xmlns:a16="http://schemas.microsoft.com/office/drawing/2014/main" id="{71C5F911-7988-AB6D-C445-4936EC92C6C3}"/>
+              </a:ext>
+            </a:extLst>
+          </p:cNvPr>
+          <p:cNvSpPr>
+            <a:spLocks noGrp="1"/>
+          </p:cNvSpPr>
+          <p:nvPr>
+            <p:ph idx="1"/>
+          </p:nvPr>
+        </p:nvSpPr>
+        <p:spPr/>
+        <p:txBody>
+          <a:bodyPr/>
+          <a:lstStyle/>
+          <a:p>
+            <a:r>
+              <a:rPr kumimoji="1" lang="zh-CN" altLang="en-US" dirty="0"/>
+              <a:t>主要结论：</a:t>
+            </a:r>
+            <a:endParaRPr kumimoji="1" lang="en-US" altLang="zh-CN" dirty="0"/>
+          </a:p>
+          <a:p>
+            <a:pPr lvl="1"/>
+            <a:r>
+              <a:rPr lang="zh-CN" altLang="en-US" dirty="0"/>
+              <a:t>多数传统神经 </a:t>
+            </a:r>
+            <a:r>
+              <a:rPr lang="en-US" altLang="zh-CN" dirty="0"/>
+              <a:t>LJP </a:t>
+            </a:r>
+            <a:r>
+              <a:rPr lang="zh-CN" altLang="en-US" dirty="0"/>
+              <a:t>模型在“判决应保持不变”的类型上表现稳定，但在“应改变判决”的修订上</a:t>
+            </a:r>
+            <a:r>
+              <a:rPr lang="zh-CN" altLang="en-US" b="1" dirty="0"/>
+              <a:t>适应较差</a:t>
+            </a:r>
+            <a:r>
+              <a:rPr lang="zh-CN" altLang="en-US" dirty="0"/>
+              <a:t>，常常还停留在旧法逻辑。</a:t>
+            </a:r>
+          </a:p>
+          <a:p>
+            <a:pPr lvl="1"/>
+            <a:r>
+              <a:rPr lang="en-US" altLang="zh-CN" dirty="0"/>
+              <a:t>LLM </a:t>
+            </a:r>
+            <a:r>
+              <a:rPr lang="zh-CN" altLang="en-US" dirty="0"/>
+              <a:t>方案在“需要改变判决”的场景（如刑期上调</a:t>
+            </a:r>
+            <a:r>
+              <a:rPr lang="en-US" altLang="zh-CN" dirty="0"/>
+              <a:t>/</a:t>
+            </a:r>
+            <a:r>
+              <a:rPr lang="zh-CN" altLang="en-US" dirty="0"/>
+              <a:t>下调）上更有弹性，但输出受 </a:t>
+            </a:r>
+            <a:r>
+              <a:rPr lang="en-US" altLang="zh-CN" dirty="0"/>
+              <a:t>prompt</a:t>
+            </a:r>
+            <a:r>
+              <a:rPr lang="zh-CN" altLang="en-US" dirty="0"/>
+              <a:t>、先验偏置影响，</a:t>
+            </a:r>
+            <a:r>
+              <a:rPr lang="zh-CN" altLang="en-US" b="1" dirty="0"/>
+              <a:t>稳定性不足</a:t>
+            </a:r>
+            <a:r>
+              <a:rPr lang="zh-CN" altLang="en-US" dirty="0"/>
+              <a:t>。</a:t>
+            </a:r>
+          </a:p>
+          <a:p>
+            <a:pPr lvl="1"/>
+            <a:r>
+              <a:rPr lang="zh-CN" altLang="en-US" dirty="0"/>
+              <a:t>与刑期相关的类型（</a:t>
+            </a:r>
+            <a:r>
+              <a:rPr lang="en-US" altLang="zh-CN" dirty="0"/>
+              <a:t>T6.x</a:t>
+            </a:r>
+            <a:r>
+              <a:rPr lang="zh-CN" altLang="en-US" dirty="0"/>
+              <a:t>）整体通过率偏低，特别是需要“精确判断量刑区间边界”的场景。</a:t>
+            </a:r>
+          </a:p>
+          <a:p>
+            <a:pPr lvl="1"/>
+            <a:r>
+              <a:rPr lang="zh-CN" altLang="en-US" dirty="0"/>
+              <a:t>行为相关修订（</a:t>
+            </a:r>
+            <a:r>
+              <a:rPr lang="en-US" altLang="zh-CN" dirty="0"/>
+              <a:t>T2.x</a:t>
+            </a:r>
+            <a:r>
+              <a:rPr lang="zh-CN" altLang="en-US" dirty="0"/>
+              <a:t>）最难，模型容易错归因到完全不同的罪名（例如误分类为毒品持有），暴露出对复杂行为叙事理解不足。</a:t>
+            </a:r>
+          </a:p>
+          <a:p>
+            <a:pPr lvl="1"/>
+            <a:r>
+              <a:rPr lang="zh-CN" altLang="en-US" dirty="0"/>
+              <a:t>在刑期修订中，模型更容易</a:t>
+            </a:r>
+            <a:r>
+              <a:rPr lang="zh-CN" altLang="en-US" b="1" dirty="0"/>
+              <a:t>接受减刑</a:t>
+            </a:r>
+            <a:r>
+              <a:rPr lang="zh-CN" altLang="en-US" dirty="0"/>
+              <a:t>（</a:t>
+            </a:r>
+            <a:r>
+              <a:rPr lang="en-US" altLang="zh-CN" dirty="0"/>
+              <a:t>T6.2</a:t>
+            </a:r>
+            <a:r>
+              <a:rPr lang="zh-CN" altLang="en-US" dirty="0"/>
+              <a:t>、</a:t>
+            </a:r>
+            <a:r>
+              <a:rPr lang="en-US" altLang="zh-CN" dirty="0"/>
+              <a:t>T6.4</a:t>
+            </a:r>
+            <a:r>
+              <a:rPr lang="zh-CN" altLang="en-US" dirty="0"/>
+              <a:t>）而不是加刑（</a:t>
+            </a:r>
+            <a:r>
+              <a:rPr lang="en-US" altLang="zh-CN" dirty="0"/>
+              <a:t>T6.1</a:t>
+            </a:r>
+            <a:r>
+              <a:rPr lang="zh-CN" altLang="en-US" dirty="0"/>
+              <a:t>、</a:t>
+            </a:r>
+            <a:r>
+              <a:rPr lang="en-US" altLang="zh-CN" dirty="0"/>
+              <a:t>T6.3</a:t>
+            </a:r>
+            <a:r>
+              <a:rPr lang="zh-CN" altLang="en-US" dirty="0"/>
+              <a:t>），显示出明显的“倾向轻判”的趋势。</a:t>
+            </a:r>
+          </a:p>
+          <a:p>
+            <a:pPr lvl="1"/>
+            <a:endParaRPr kumimoji="1" lang="zh-CN" altLang="en-US" dirty="0"/>
+          </a:p>
+        </p:txBody>
+      </p:sp>
+    </p:spTree>
+    <p:extLst>
+      <p:ext uri="{BB962C8B-B14F-4D97-AF65-F5344CB8AC3E}">
+        <p14:creationId xmlns:p14="http://schemas.microsoft.com/office/powerpoint/2010/main" val="1253161550"/>
       </p:ext>
     </p:extLst>
   </p:cSld>
@@ -4907,6 +5631,511 @@
     <p:extLst>
       <p:ext uri="{BB962C8B-B14F-4D97-AF65-F5344CB8AC3E}">
         <p14:creationId xmlns:p14="http://schemas.microsoft.com/office/powerpoint/2010/main" val="1362299403"/>
+      </p:ext>
+    </p:extLst>
+  </p:cSld>
+  <p:clrMapOvr>
+    <a:masterClrMapping/>
+  </p:clrMapOvr>
+</p:sld>
+</file>
+
+<file path=ppt/slides/slide20.xml><?xml version="1.0" encoding="utf-8"?>
+<p:sld xmlns:a="http://schemas.openxmlformats.org/drawingml/2006/main" xmlns:r="http://schemas.openxmlformats.org/officeDocument/2006/relationships" xmlns:p="http://schemas.openxmlformats.org/presentationml/2006/main">
+  <p:cSld>
+    <p:spTree>
+      <p:nvGrpSpPr>
+        <p:cNvPr id="1" name=""/>
+        <p:cNvGrpSpPr/>
+        <p:nvPr/>
+      </p:nvGrpSpPr>
+      <p:grpSpPr>
+        <a:xfrm>
+          <a:off x="0" y="0"/>
+          <a:ext cx="0" cy="0"/>
+          <a:chOff x="0" y="0"/>
+          <a:chExt cx="0" cy="0"/>
+        </a:xfrm>
+      </p:grpSpPr>
+      <p:sp>
+        <p:nvSpPr>
+          <p:cNvPr id="2" name="标题 1">
+            <a:extLst>
+              <a:ext uri="{FF2B5EF4-FFF2-40B4-BE49-F238E27FC236}">
+                <a16:creationId xmlns:a16="http://schemas.microsoft.com/office/drawing/2014/main" id="{CD832A59-3D6E-B182-1C81-232113D65498}"/>
+              </a:ext>
+            </a:extLst>
+          </p:cNvPr>
+          <p:cNvSpPr>
+            <a:spLocks noGrp="1"/>
+          </p:cNvSpPr>
+          <p:nvPr>
+            <p:ph type="title"/>
+          </p:nvPr>
+        </p:nvSpPr>
+        <p:spPr/>
+        <p:txBody>
+          <a:bodyPr/>
+          <a:lstStyle/>
+          <a:p>
+            <a:r>
+              <a:rPr kumimoji="1" lang="en-US" altLang="zh-CN" dirty="0" err="1"/>
+              <a:t>LawShift</a:t>
+            </a:r>
+            <a:r>
+              <a:rPr kumimoji="1" lang="en-US" altLang="zh-CN" dirty="0"/>
+              <a:t> (cont.)</a:t>
+            </a:r>
+            <a:endParaRPr kumimoji="1" lang="zh-CN" altLang="en-US" dirty="0"/>
+          </a:p>
+        </p:txBody>
+      </p:sp>
+      <p:sp>
+        <p:nvSpPr>
+          <p:cNvPr id="3" name="内容占位符 2">
+            <a:extLst>
+              <a:ext uri="{FF2B5EF4-FFF2-40B4-BE49-F238E27FC236}">
+                <a16:creationId xmlns:a16="http://schemas.microsoft.com/office/drawing/2014/main" id="{07DB34E5-F4FC-7A68-C56C-08E6B148ED75}"/>
+              </a:ext>
+            </a:extLst>
+          </p:cNvPr>
+          <p:cNvSpPr>
+            <a:spLocks noGrp="1"/>
+          </p:cNvSpPr>
+          <p:nvPr>
+            <p:ph idx="1"/>
+          </p:nvPr>
+        </p:nvSpPr>
+        <p:spPr/>
+        <p:txBody>
+          <a:bodyPr/>
+          <a:lstStyle/>
+          <a:p>
+            <a:r>
+              <a:rPr kumimoji="1" lang="zh-CN" altLang="en-US" dirty="0"/>
+              <a:t>主要结论（续）：</a:t>
+            </a:r>
+            <a:endParaRPr kumimoji="1" lang="en-US" altLang="zh-CN" dirty="0"/>
+          </a:p>
+          <a:p>
+            <a:pPr lvl="1"/>
+            <a:r>
+              <a:rPr lang="zh-CN" altLang="en-US" dirty="0"/>
+              <a:t>传统神经模型：对主体 </a:t>
+            </a:r>
+            <a:r>
+              <a:rPr lang="en-US" altLang="zh-CN" dirty="0"/>
+              <a:t>subject </a:t>
+            </a:r>
+            <a:r>
+              <a:rPr lang="zh-CN" altLang="en-US" dirty="0"/>
+              <a:t>与客体 </a:t>
+            </a:r>
+            <a:r>
+              <a:rPr lang="en-US" altLang="zh-CN" dirty="0"/>
+              <a:t>object </a:t>
+            </a:r>
+            <a:r>
+              <a:rPr lang="zh-CN" altLang="en-US" dirty="0"/>
+              <a:t>的修订敏感度相近，但在客观条件 </a:t>
+            </a:r>
+            <a:r>
+              <a:rPr lang="en-US" altLang="zh-CN" dirty="0" err="1"/>
+              <a:t>objCon</a:t>
+            </a:r>
+            <a:r>
+              <a:rPr lang="en-US" altLang="zh-CN" dirty="0"/>
+              <a:t> </a:t>
+            </a:r>
+            <a:r>
+              <a:rPr lang="zh-CN" altLang="en-US" dirty="0"/>
+              <a:t>上明显更吃力，需要额外的“条件逻辑”推理。</a:t>
+            </a:r>
+          </a:p>
+          <a:p>
+            <a:pPr lvl="1"/>
+            <a:r>
+              <a:rPr lang="zh-CN" altLang="en-US" dirty="0"/>
+              <a:t>通用 </a:t>
+            </a:r>
+            <a:r>
+              <a:rPr lang="en-US" altLang="zh-CN" dirty="0"/>
+              <a:t>LLM</a:t>
+            </a:r>
+            <a:r>
+              <a:rPr lang="zh-CN" altLang="en-US" dirty="0"/>
+              <a:t>：在客体 </a:t>
+            </a:r>
+            <a:r>
+              <a:rPr lang="en-US" altLang="zh-CN" dirty="0"/>
+              <a:t>object </a:t>
+            </a:r>
+            <a:r>
+              <a:rPr lang="zh-CN" altLang="en-US" dirty="0"/>
+              <a:t>与主观条件 </a:t>
+            </a:r>
+            <a:r>
+              <a:rPr lang="en-US" altLang="zh-CN" dirty="0" err="1"/>
+              <a:t>sbCon</a:t>
+            </a:r>
+            <a:r>
+              <a:rPr lang="en-US" altLang="zh-CN" dirty="0"/>
+              <a:t> </a:t>
+            </a:r>
+            <a:r>
+              <a:rPr lang="zh-CN" altLang="en-US" dirty="0"/>
+              <a:t>上的变化最敏感，说明它们更擅长处理角色语义和动机类条件。</a:t>
+            </a:r>
+          </a:p>
+          <a:p>
+            <a:pPr lvl="1"/>
+            <a:r>
+              <a:rPr lang="zh-CN" altLang="en-US" dirty="0"/>
+              <a:t>所有模型对</a:t>
+            </a:r>
+            <a:r>
+              <a:rPr lang="zh-CN" altLang="en-US" b="1" dirty="0"/>
+              <a:t>刑期 </a:t>
+            </a:r>
+            <a:r>
+              <a:rPr lang="en-US" altLang="zh-CN" b="1" dirty="0"/>
+              <a:t>term </a:t>
+            </a:r>
+            <a:r>
+              <a:rPr lang="zh-CN" altLang="en-US" b="1" dirty="0"/>
+              <a:t>以及行为 </a:t>
+            </a:r>
+            <a:r>
+              <a:rPr lang="en-US" altLang="zh-CN" b="1" dirty="0"/>
+              <a:t>action </a:t>
+            </a:r>
+            <a:r>
+              <a:rPr lang="zh-CN" altLang="en-US" b="1" dirty="0"/>
+              <a:t>修订</a:t>
+            </a:r>
+            <a:r>
+              <a:rPr lang="zh-CN" altLang="en-US" dirty="0"/>
+              <a:t>都最不稳定，说明“量刑数值 </a:t>
+            </a:r>
+            <a:r>
+              <a:rPr lang="en-US" altLang="zh-CN" dirty="0"/>
+              <a:t>+ </a:t>
+            </a:r>
+            <a:r>
+              <a:rPr lang="zh-CN" altLang="en-US" dirty="0"/>
+              <a:t>行为抽象描述”是 </a:t>
+            </a:r>
+            <a:r>
+              <a:rPr lang="en-US" altLang="zh-CN" dirty="0"/>
+              <a:t>LJP </a:t>
+            </a:r>
+            <a:r>
+              <a:rPr lang="zh-CN" altLang="en-US" dirty="0"/>
+              <a:t>的顽疾。</a:t>
+            </a:r>
+          </a:p>
+          <a:p>
+            <a:pPr lvl="1"/>
+            <a:r>
+              <a:rPr lang="zh-CN" altLang="en-US" dirty="0"/>
+              <a:t>同一组件下，</a:t>
+            </a:r>
+            <a:r>
+              <a:rPr lang="zh-CN" altLang="en-US" b="1" dirty="0"/>
+              <a:t>显式扩展</a:t>
+            </a:r>
+            <a:r>
+              <a:rPr lang="en-US" altLang="zh-CN" b="1" dirty="0"/>
+              <a:t>/</a:t>
+            </a:r>
+            <a:r>
+              <a:rPr lang="zh-CN" altLang="en-US" b="1" dirty="0"/>
+              <a:t>删除</a:t>
+            </a:r>
+            <a:r>
+              <a:rPr lang="zh-CN" altLang="en-US" dirty="0"/>
+              <a:t>（如“有毒物质”→“有毒或放射性物质”）通过率普遍高于</a:t>
+            </a:r>
+            <a:r>
+              <a:rPr lang="zh-CN" altLang="en-US" b="1" dirty="0"/>
+              <a:t>隐式改写</a:t>
+            </a:r>
+            <a:r>
+              <a:rPr lang="zh-CN" altLang="en-US" dirty="0"/>
+              <a:t>（如“成年人”→“</a:t>
+            </a:r>
+            <a:r>
+              <a:rPr lang="en-US" altLang="zh-CN" dirty="0"/>
+              <a:t>16 </a:t>
+            </a:r>
+            <a:r>
+              <a:rPr lang="zh-CN" altLang="en-US" dirty="0"/>
+              <a:t>岁以上的任何人”）。</a:t>
+            </a:r>
+          </a:p>
+          <a:p>
+            <a:pPr lvl="1"/>
+            <a:endParaRPr kumimoji="1" lang="zh-CN" altLang="en-US" dirty="0"/>
+          </a:p>
+        </p:txBody>
+      </p:sp>
+    </p:spTree>
+    <p:extLst>
+      <p:ext uri="{BB962C8B-B14F-4D97-AF65-F5344CB8AC3E}">
+        <p14:creationId xmlns:p14="http://schemas.microsoft.com/office/powerpoint/2010/main" val="3395304349"/>
+      </p:ext>
+    </p:extLst>
+  </p:cSld>
+  <p:clrMapOvr>
+    <a:masterClrMapping/>
+  </p:clrMapOvr>
+</p:sld>
+</file>
+
+<file path=ppt/slides/slide21.xml><?xml version="1.0" encoding="utf-8"?>
+<p:sld xmlns:a="http://schemas.openxmlformats.org/drawingml/2006/main" xmlns:r="http://schemas.openxmlformats.org/officeDocument/2006/relationships" xmlns:p="http://schemas.openxmlformats.org/presentationml/2006/main">
+  <p:cSld>
+    <p:spTree>
+      <p:nvGrpSpPr>
+        <p:cNvPr id="1" name=""/>
+        <p:cNvGrpSpPr/>
+        <p:nvPr/>
+      </p:nvGrpSpPr>
+      <p:grpSpPr>
+        <a:xfrm>
+          <a:off x="0" y="0"/>
+          <a:ext cx="0" cy="0"/>
+          <a:chOff x="0" y="0"/>
+          <a:chExt cx="0" cy="0"/>
+        </a:xfrm>
+      </p:grpSpPr>
+      <p:sp>
+        <p:nvSpPr>
+          <p:cNvPr id="2" name="标题 1">
+            <a:extLst>
+              <a:ext uri="{FF2B5EF4-FFF2-40B4-BE49-F238E27FC236}">
+                <a16:creationId xmlns:a16="http://schemas.microsoft.com/office/drawing/2014/main" id="{16C24E9E-08B6-B96B-3385-508B3B0F0ABF}"/>
+              </a:ext>
+            </a:extLst>
+          </p:cNvPr>
+          <p:cNvSpPr>
+            <a:spLocks noGrp="1"/>
+          </p:cNvSpPr>
+          <p:nvPr>
+            <p:ph type="title"/>
+          </p:nvPr>
+        </p:nvSpPr>
+        <p:spPr/>
+        <p:txBody>
+          <a:bodyPr/>
+          <a:lstStyle/>
+          <a:p>
+            <a:r>
+              <a:rPr lang="en-CA" dirty="0">
+                <a:latin typeface="Times New Roman" panose="02020603050405020304" pitchFamily="18" charset="0"/>
+                <a:cs typeface="Times New Roman" panose="02020603050405020304" pitchFamily="18" charset="0"/>
+              </a:rPr>
+              <a:t>Next?</a:t>
+            </a:r>
+            <a:r>
+              <a:rPr lang="zh-CN" altLang="en-US" dirty="0">
+                <a:latin typeface="Times New Roman" panose="02020603050405020304" pitchFamily="18" charset="0"/>
+                <a:cs typeface="Times New Roman" panose="02020603050405020304" pitchFamily="18" charset="0"/>
+              </a:rPr>
+              <a:t> </a:t>
+            </a:r>
+            <a:r>
+              <a:rPr lang="en-US" altLang="zh-CN" dirty="0">
+                <a:latin typeface="Times New Roman" panose="02020603050405020304" pitchFamily="18" charset="0"/>
+                <a:cs typeface="Times New Roman" panose="02020603050405020304" pitchFamily="18" charset="0"/>
+              </a:rPr>
+              <a:t>Raw!</a:t>
+            </a:r>
+            <a:endParaRPr lang="en-CA" dirty="0">
+              <a:latin typeface="Times New Roman" panose="02020603050405020304" pitchFamily="18" charset="0"/>
+              <a:cs typeface="Times New Roman" panose="02020603050405020304" pitchFamily="18" charset="0"/>
+            </a:endParaRPr>
+          </a:p>
+        </p:txBody>
+      </p:sp>
+      <p:sp>
+        <p:nvSpPr>
+          <p:cNvPr id="3" name="内容占位符 2">
+            <a:extLst>
+              <a:ext uri="{FF2B5EF4-FFF2-40B4-BE49-F238E27FC236}">
+                <a16:creationId xmlns:a16="http://schemas.microsoft.com/office/drawing/2014/main" id="{88D38D43-E894-0BC1-922D-B0A31B6C701D}"/>
+              </a:ext>
+            </a:extLst>
+          </p:cNvPr>
+          <p:cNvSpPr>
+            <a:spLocks noGrp="1"/>
+          </p:cNvSpPr>
+          <p:nvPr>
+            <p:ph idx="1"/>
+          </p:nvPr>
+        </p:nvSpPr>
+        <p:spPr/>
+        <p:txBody>
+          <a:bodyPr/>
+          <a:lstStyle/>
+          <a:p>
+            <a:r>
+              <a:rPr lang="en-CA" dirty="0" err="1">
+                <a:latin typeface="Times New Roman" panose="02020603050405020304" pitchFamily="18" charset="0"/>
+                <a:cs typeface="Times New Roman" panose="02020603050405020304" pitchFamily="18" charset="0"/>
+              </a:rPr>
+              <a:t>从LawShift来</a:t>
+            </a:r>
+            <a:r>
+              <a:rPr lang="zh-CN" altLang="en-US" dirty="0">
+                <a:latin typeface="Times New Roman" panose="02020603050405020304" pitchFamily="18" charset="0"/>
+                <a:cs typeface="Times New Roman" panose="02020603050405020304" pitchFamily="18" charset="0"/>
+              </a:rPr>
+              <a:t>：通过知识编辑更新模型（</a:t>
+            </a:r>
+            <a:r>
+              <a:rPr lang="en-US" altLang="zh-CN" dirty="0">
+                <a:latin typeface="Times New Roman" panose="02020603050405020304" pitchFamily="18" charset="0"/>
+                <a:cs typeface="Times New Roman" panose="02020603050405020304" pitchFamily="18" charset="0"/>
+              </a:rPr>
+              <a:t>Beyond</a:t>
+            </a:r>
+            <a:r>
+              <a:rPr lang="zh-CN" altLang="en-US" dirty="0">
+                <a:latin typeface="Times New Roman" panose="02020603050405020304" pitchFamily="18" charset="0"/>
+                <a:cs typeface="Times New Roman" panose="02020603050405020304" pitchFamily="18" charset="0"/>
+              </a:rPr>
+              <a:t>法律领域）。</a:t>
+            </a:r>
+            <a:endParaRPr lang="en-US" altLang="zh-CN" dirty="0">
+              <a:latin typeface="Times New Roman" panose="02020603050405020304" pitchFamily="18" charset="0"/>
+              <a:cs typeface="Times New Roman" panose="02020603050405020304" pitchFamily="18" charset="0"/>
+            </a:endParaRPr>
+          </a:p>
+          <a:p>
+            <a:pPr lvl="1"/>
+            <a:r>
+              <a:rPr lang="zh-CN" altLang="en-US" dirty="0">
+                <a:latin typeface="Times New Roman" panose="02020603050405020304" pitchFamily="18" charset="0"/>
+                <a:cs typeface="Times New Roman" panose="02020603050405020304" pitchFamily="18" charset="0"/>
+              </a:rPr>
+              <a:t>知识定位。</a:t>
+            </a:r>
+            <a:endParaRPr lang="en-US" altLang="zh-CN" dirty="0">
+              <a:latin typeface="Times New Roman" panose="02020603050405020304" pitchFamily="18" charset="0"/>
+              <a:cs typeface="Times New Roman" panose="02020603050405020304" pitchFamily="18" charset="0"/>
+            </a:endParaRPr>
+          </a:p>
+          <a:p>
+            <a:pPr lvl="1"/>
+            <a:r>
+              <a:rPr lang="zh-CN" altLang="en-US" dirty="0">
+                <a:latin typeface="Times New Roman" panose="02020603050405020304" pitchFamily="18" charset="0"/>
+                <a:cs typeface="Times New Roman" panose="02020603050405020304" pitchFamily="18" charset="0"/>
+              </a:rPr>
+              <a:t>编辑本身（有效性</a:t>
+            </a:r>
+            <a:r>
+              <a:rPr lang="en-US" altLang="zh-CN" dirty="0">
+                <a:latin typeface="Times New Roman" panose="02020603050405020304" pitchFamily="18" charset="0"/>
+                <a:cs typeface="Times New Roman" panose="02020603050405020304" pitchFamily="18" charset="0"/>
+              </a:rPr>
+              <a:t>/</a:t>
+            </a:r>
+            <a:r>
+              <a:rPr lang="zh-CN" altLang="en-US" dirty="0">
+                <a:latin typeface="Times New Roman" panose="02020603050405020304" pitchFamily="18" charset="0"/>
+                <a:cs typeface="Times New Roman" panose="02020603050405020304" pitchFamily="18" charset="0"/>
+              </a:rPr>
+              <a:t>局部性</a:t>
+            </a:r>
+            <a:r>
+              <a:rPr lang="en-US" altLang="zh-CN" dirty="0">
+                <a:latin typeface="Times New Roman" panose="02020603050405020304" pitchFamily="18" charset="0"/>
+                <a:cs typeface="Times New Roman" panose="02020603050405020304" pitchFamily="18" charset="0"/>
+              </a:rPr>
+              <a:t>/</a:t>
+            </a:r>
+            <a:r>
+              <a:rPr lang="zh-CN" altLang="en-US" dirty="0">
+                <a:latin typeface="Times New Roman" panose="02020603050405020304" pitchFamily="18" charset="0"/>
+                <a:cs typeface="Times New Roman" panose="02020603050405020304" pitchFamily="18" charset="0"/>
+              </a:rPr>
+              <a:t>可推理</a:t>
+            </a:r>
+            <a:r>
+              <a:rPr lang="en-US" altLang="zh-CN" dirty="0">
+                <a:latin typeface="Times New Roman" panose="02020603050405020304" pitchFamily="18" charset="0"/>
+                <a:cs typeface="Times New Roman" panose="02020603050405020304" pitchFamily="18" charset="0"/>
+              </a:rPr>
+              <a:t>/</a:t>
+            </a:r>
+            <a:r>
+              <a:rPr lang="zh-CN" altLang="en-US" dirty="0">
+                <a:latin typeface="Times New Roman" panose="02020603050405020304" pitchFamily="18" charset="0"/>
+                <a:cs typeface="Times New Roman" panose="02020603050405020304" pitchFamily="18" charset="0"/>
+              </a:rPr>
+              <a:t>可串行）。</a:t>
+            </a:r>
+            <a:endParaRPr lang="en-US" altLang="zh-CN" dirty="0">
+              <a:latin typeface="Times New Roman" panose="02020603050405020304" pitchFamily="18" charset="0"/>
+              <a:cs typeface="Times New Roman" panose="02020603050405020304" pitchFamily="18" charset="0"/>
+            </a:endParaRPr>
+          </a:p>
+          <a:p>
+            <a:r>
+              <a:rPr lang="zh-CN" altLang="en-US" dirty="0">
+                <a:latin typeface="Times New Roman" panose="02020603050405020304" pitchFamily="18" charset="0"/>
+                <a:cs typeface="Times New Roman" panose="02020603050405020304" pitchFamily="18" charset="0"/>
+              </a:rPr>
+              <a:t>在这个框架下：</a:t>
+            </a:r>
+            <a:endParaRPr lang="en-US" altLang="zh-CN" dirty="0">
+              <a:latin typeface="Times New Roman" panose="02020603050405020304" pitchFamily="18" charset="0"/>
+              <a:cs typeface="Times New Roman" panose="02020603050405020304" pitchFamily="18" charset="0"/>
+            </a:endParaRPr>
+          </a:p>
+          <a:p>
+            <a:pPr lvl="1"/>
+            <a:r>
+              <a:rPr lang="zh-CN" altLang="en-US" dirty="0">
+                <a:latin typeface="Times New Roman" panose="02020603050405020304" pitchFamily="18" charset="0"/>
+                <a:cs typeface="Times New Roman" panose="02020603050405020304" pitchFamily="18" charset="0"/>
+              </a:rPr>
+              <a:t>把一次回答拆成循环：按照任务</a:t>
+            </a:r>
+            <a:r>
+              <a:rPr lang="en-US" altLang="zh-CN" dirty="0">
+                <a:latin typeface="Times New Roman" panose="02020603050405020304" pitchFamily="18" charset="0"/>
+                <a:cs typeface="Times New Roman" panose="02020603050405020304" pitchFamily="18" charset="0"/>
+              </a:rPr>
+              <a:t>schema</a:t>
+            </a:r>
+            <a:r>
+              <a:rPr lang="zh-CN" altLang="en-US" dirty="0">
+                <a:latin typeface="Times New Roman" panose="02020603050405020304" pitchFamily="18" charset="0"/>
+                <a:cs typeface="Times New Roman" panose="02020603050405020304" pitchFamily="18" charset="0"/>
+              </a:rPr>
+              <a:t>规划原子步，激活对应知识片段（定位后的），生成一小段，并交验该步是否正确运用知识。</a:t>
+            </a:r>
+            <a:endParaRPr lang="en-US" altLang="zh-CN" dirty="0">
+              <a:latin typeface="Times New Roman" panose="02020603050405020304" pitchFamily="18" charset="0"/>
+              <a:cs typeface="Times New Roman" panose="02020603050405020304" pitchFamily="18" charset="0"/>
+            </a:endParaRPr>
+          </a:p>
+          <a:p>
+            <a:pPr lvl="1"/>
+            <a:endParaRPr lang="en-CA" dirty="0">
+              <a:latin typeface="Times New Roman" panose="02020603050405020304" pitchFamily="18" charset="0"/>
+              <a:cs typeface="Times New Roman" panose="02020603050405020304" pitchFamily="18" charset="0"/>
+            </a:endParaRPr>
+          </a:p>
+        </p:txBody>
+      </p:sp>
+    </p:spTree>
+    <p:extLst>
+      <p:ext uri="{BB962C8B-B14F-4D97-AF65-F5344CB8AC3E}">
+        <p14:creationId xmlns:p14="http://schemas.microsoft.com/office/powerpoint/2010/main" val="513386680"/>
       </p:ext>
     </p:extLst>
   </p:cSld>

</xml_diff>